<commit_message>
Segmentation ppt and Structure
</commit_message>
<xml_diff>
--- a/presentation.pptx
+++ b/presentation.pptx
@@ -4,22 +4,24 @@
   <p:sldMasterIdLst>
     <p:sldMasterId id="2147483780" r:id="rId1"/>
   </p:sldMasterIdLst>
+  <p:notesMasterIdLst>
+    <p:notesMasterId r:id="rId16"/>
+  </p:notesMasterIdLst>
   <p:sldIdLst>
     <p:sldId id="256" r:id="rId2"/>
     <p:sldId id="258" r:id="rId3"/>
     <p:sldId id="257" r:id="rId4"/>
     <p:sldId id="260" r:id="rId5"/>
     <p:sldId id="271" r:id="rId6"/>
-    <p:sldId id="261" r:id="rId7"/>
-    <p:sldId id="262" r:id="rId8"/>
-    <p:sldId id="263" r:id="rId9"/>
-    <p:sldId id="266" r:id="rId10"/>
-    <p:sldId id="264" r:id="rId11"/>
-    <p:sldId id="267" r:id="rId12"/>
-    <p:sldId id="265" r:id="rId13"/>
-    <p:sldId id="268" r:id="rId14"/>
-    <p:sldId id="269" r:id="rId15"/>
-    <p:sldId id="270" r:id="rId16"/>
+    <p:sldId id="262" r:id="rId7"/>
+    <p:sldId id="263" r:id="rId8"/>
+    <p:sldId id="266" r:id="rId9"/>
+    <p:sldId id="264" r:id="rId10"/>
+    <p:sldId id="267" r:id="rId11"/>
+    <p:sldId id="265" r:id="rId12"/>
+    <p:sldId id="268" r:id="rId13"/>
+    <p:sldId id="269" r:id="rId14"/>
+    <p:sldId id="270" r:id="rId15"/>
   </p:sldIdLst>
   <p:sldSz cx="9144000" cy="6858000" type="screen4x3"/>
   <p:notesSz cx="6858000" cy="9144000"/>
@@ -119,6 +121,434 @@
     </a:lvl9pPr>
   </p:defaultTextStyle>
 </p:presentation>
+</file>
+
+<file path=ppt/notesMasters/notesMaster1.xml><?xml version="1.0" encoding="utf-8"?>
+<p:notesMaster xmlns:a="http://schemas.openxmlformats.org/drawingml/2006/main" xmlns:r="http://schemas.openxmlformats.org/officeDocument/2006/relationships" xmlns:p="http://schemas.openxmlformats.org/presentationml/2006/main">
+  <p:cSld>
+    <p:bg>
+      <p:bgRef idx="1001">
+        <a:schemeClr val="bg1"/>
+      </p:bgRef>
+    </p:bg>
+    <p:spTree>
+      <p:nvGrpSpPr>
+        <p:cNvPr id="1" name=""/>
+        <p:cNvGrpSpPr/>
+        <p:nvPr/>
+      </p:nvGrpSpPr>
+      <p:grpSpPr>
+        <a:xfrm>
+          <a:off x="0" y="0"/>
+          <a:ext cx="0" cy="0"/>
+          <a:chOff x="0" y="0"/>
+          <a:chExt cx="0" cy="0"/>
+        </a:xfrm>
+      </p:grpSpPr>
+      <p:sp>
+        <p:nvSpPr>
+          <p:cNvPr id="2" name="1 Marcador de encabezado"/>
+          <p:cNvSpPr>
+            <a:spLocks noGrp="1"/>
+          </p:cNvSpPr>
+          <p:nvPr>
+            <p:ph type="hdr" sz="quarter"/>
+          </p:nvPr>
+        </p:nvSpPr>
+        <p:spPr>
+          <a:xfrm>
+            <a:off x="0" y="0"/>
+            <a:ext cx="2971800" cy="457200"/>
+          </a:xfrm>
+          <a:prstGeom prst="rect">
+            <a:avLst/>
+          </a:prstGeom>
+        </p:spPr>
+        <p:txBody>
+          <a:bodyPr vert="horz" lIns="91440" tIns="45720" rIns="91440" bIns="45720" rtlCol="0"/>
+          <a:lstStyle>
+            <a:lvl1pPr algn="l">
+              <a:defRPr sz="1200"/>
+            </a:lvl1pPr>
+          </a:lstStyle>
+          <a:p>
+            <a:endParaRPr lang="es-ES"/>
+          </a:p>
+        </p:txBody>
+      </p:sp>
+      <p:sp>
+        <p:nvSpPr>
+          <p:cNvPr id="3" name="2 Marcador de fecha"/>
+          <p:cNvSpPr>
+            <a:spLocks noGrp="1"/>
+          </p:cNvSpPr>
+          <p:nvPr>
+            <p:ph type="dt" idx="1"/>
+          </p:nvPr>
+        </p:nvSpPr>
+        <p:spPr>
+          <a:xfrm>
+            <a:off x="3884613" y="0"/>
+            <a:ext cx="2971800" cy="457200"/>
+          </a:xfrm>
+          <a:prstGeom prst="rect">
+            <a:avLst/>
+          </a:prstGeom>
+        </p:spPr>
+        <p:txBody>
+          <a:bodyPr vert="horz" lIns="91440" tIns="45720" rIns="91440" bIns="45720" rtlCol="0"/>
+          <a:lstStyle>
+            <a:lvl1pPr algn="r">
+              <a:defRPr sz="1200"/>
+            </a:lvl1pPr>
+          </a:lstStyle>
+          <a:p>
+            <a:fld id="{5B2BE946-F476-4DC5-A295-0C01519C15BC}" type="datetimeFigureOut">
+              <a:rPr lang="es-ES" smtClean="0"/>
+              <a:t>02/10/2014</a:t>
+            </a:fld>
+            <a:endParaRPr lang="es-ES"/>
+          </a:p>
+        </p:txBody>
+      </p:sp>
+      <p:sp>
+        <p:nvSpPr>
+          <p:cNvPr id="4" name="3 Marcador de imagen de diapositiva"/>
+          <p:cNvSpPr>
+            <a:spLocks noGrp="1" noRot="1" noChangeAspect="1"/>
+          </p:cNvSpPr>
+          <p:nvPr>
+            <p:ph type="sldImg" idx="2"/>
+          </p:nvPr>
+        </p:nvSpPr>
+        <p:spPr>
+          <a:xfrm>
+            <a:off x="1143000" y="685800"/>
+            <a:ext cx="4572000" cy="3429000"/>
+          </a:xfrm>
+          <a:prstGeom prst="rect">
+            <a:avLst/>
+          </a:prstGeom>
+          <a:noFill/>
+          <a:ln w="12700">
+            <a:solidFill>
+              <a:prstClr val="black"/>
+            </a:solidFill>
+          </a:ln>
+        </p:spPr>
+        <p:txBody>
+          <a:bodyPr vert="horz" lIns="91440" tIns="45720" rIns="91440" bIns="45720" rtlCol="0" anchor="ctr"/>
+          <a:lstStyle/>
+          <a:p>
+            <a:endParaRPr lang="es-ES"/>
+          </a:p>
+        </p:txBody>
+      </p:sp>
+      <p:sp>
+        <p:nvSpPr>
+          <p:cNvPr id="5" name="4 Marcador de notas"/>
+          <p:cNvSpPr>
+            <a:spLocks noGrp="1"/>
+          </p:cNvSpPr>
+          <p:nvPr>
+            <p:ph type="body" sz="quarter" idx="3"/>
+          </p:nvPr>
+        </p:nvSpPr>
+        <p:spPr>
+          <a:xfrm>
+            <a:off x="685800" y="4343400"/>
+            <a:ext cx="5486400" cy="4114800"/>
+          </a:xfrm>
+          <a:prstGeom prst="rect">
+            <a:avLst/>
+          </a:prstGeom>
+        </p:spPr>
+        <p:txBody>
+          <a:bodyPr vert="horz" lIns="91440" tIns="45720" rIns="91440" bIns="45720" rtlCol="0">
+            <a:normAutofit/>
+          </a:bodyPr>
+          <a:lstStyle/>
+          <a:p>
+            <a:pPr lvl="0"/>
+            <a:r>
+              <a:rPr lang="es-ES" smtClean="0"/>
+              <a:t>Haga clic para modificar el estilo de texto del patrón</a:t>
+            </a:r>
+          </a:p>
+          <a:p>
+            <a:pPr lvl="1"/>
+            <a:r>
+              <a:rPr lang="es-ES" smtClean="0"/>
+              <a:t>Segundo nivel</a:t>
+            </a:r>
+          </a:p>
+          <a:p>
+            <a:pPr lvl="2"/>
+            <a:r>
+              <a:rPr lang="es-ES" smtClean="0"/>
+              <a:t>Tercer nivel</a:t>
+            </a:r>
+          </a:p>
+          <a:p>
+            <a:pPr lvl="3"/>
+            <a:r>
+              <a:rPr lang="es-ES" smtClean="0"/>
+              <a:t>Cuarto nivel</a:t>
+            </a:r>
+          </a:p>
+          <a:p>
+            <a:pPr lvl="4"/>
+            <a:r>
+              <a:rPr lang="es-ES" smtClean="0"/>
+              <a:t>Quinto nivel</a:t>
+            </a:r>
+            <a:endParaRPr lang="es-ES"/>
+          </a:p>
+        </p:txBody>
+      </p:sp>
+      <p:sp>
+        <p:nvSpPr>
+          <p:cNvPr id="6" name="5 Marcador de pie de página"/>
+          <p:cNvSpPr>
+            <a:spLocks noGrp="1"/>
+          </p:cNvSpPr>
+          <p:nvPr>
+            <p:ph type="ftr" sz="quarter" idx="4"/>
+          </p:nvPr>
+        </p:nvSpPr>
+        <p:spPr>
+          <a:xfrm>
+            <a:off x="0" y="8685213"/>
+            <a:ext cx="2971800" cy="457200"/>
+          </a:xfrm>
+          <a:prstGeom prst="rect">
+            <a:avLst/>
+          </a:prstGeom>
+        </p:spPr>
+        <p:txBody>
+          <a:bodyPr vert="horz" lIns="91440" tIns="45720" rIns="91440" bIns="45720" rtlCol="0" anchor="b"/>
+          <a:lstStyle>
+            <a:lvl1pPr algn="l">
+              <a:defRPr sz="1200"/>
+            </a:lvl1pPr>
+          </a:lstStyle>
+          <a:p>
+            <a:endParaRPr lang="es-ES"/>
+          </a:p>
+        </p:txBody>
+      </p:sp>
+      <p:sp>
+        <p:nvSpPr>
+          <p:cNvPr id="7" name="6 Marcador de número de diapositiva"/>
+          <p:cNvSpPr>
+            <a:spLocks noGrp="1"/>
+          </p:cNvSpPr>
+          <p:nvPr>
+            <p:ph type="sldNum" sz="quarter" idx="5"/>
+          </p:nvPr>
+        </p:nvSpPr>
+        <p:spPr>
+          <a:xfrm>
+            <a:off x="3884613" y="8685213"/>
+            <a:ext cx="2971800" cy="457200"/>
+          </a:xfrm>
+          <a:prstGeom prst="rect">
+            <a:avLst/>
+          </a:prstGeom>
+        </p:spPr>
+        <p:txBody>
+          <a:bodyPr vert="horz" lIns="91440" tIns="45720" rIns="91440" bIns="45720" rtlCol="0" anchor="b"/>
+          <a:lstStyle>
+            <a:lvl1pPr algn="r">
+              <a:defRPr sz="1200"/>
+            </a:lvl1pPr>
+          </a:lstStyle>
+          <a:p>
+            <a:fld id="{711BE477-5C25-4A2F-B7F3-E0DA24DFBF67}" type="slidenum">
+              <a:rPr lang="es-ES" smtClean="0"/>
+              <a:t>‹Nº›</a:t>
+            </a:fld>
+            <a:endParaRPr lang="es-ES"/>
+          </a:p>
+        </p:txBody>
+      </p:sp>
+    </p:spTree>
+  </p:cSld>
+  <p:clrMap bg1="lt1" tx1="dk1" bg2="lt2" tx2="dk2" accent1="accent1" accent2="accent2" accent3="accent3" accent4="accent4" accent5="accent5" accent6="accent6" hlink="hlink" folHlink="folHlink"/>
+  <p:notesStyle>
+    <a:lvl1pPr marL="0" algn="l" defTabSz="914400" rtl="0" eaLnBrk="1" latinLnBrk="0" hangingPunct="1">
+      <a:defRPr sz="1200" kern="1200">
+        <a:solidFill>
+          <a:schemeClr val="tx1"/>
+        </a:solidFill>
+        <a:latin typeface="+mn-lt"/>
+        <a:ea typeface="+mn-ea"/>
+        <a:cs typeface="+mn-cs"/>
+      </a:defRPr>
+    </a:lvl1pPr>
+    <a:lvl2pPr marL="457200" algn="l" defTabSz="914400" rtl="0" eaLnBrk="1" latinLnBrk="0" hangingPunct="1">
+      <a:defRPr sz="1200" kern="1200">
+        <a:solidFill>
+          <a:schemeClr val="tx1"/>
+        </a:solidFill>
+        <a:latin typeface="+mn-lt"/>
+        <a:ea typeface="+mn-ea"/>
+        <a:cs typeface="+mn-cs"/>
+      </a:defRPr>
+    </a:lvl2pPr>
+    <a:lvl3pPr marL="914400" algn="l" defTabSz="914400" rtl="0" eaLnBrk="1" latinLnBrk="0" hangingPunct="1">
+      <a:defRPr sz="1200" kern="1200">
+        <a:solidFill>
+          <a:schemeClr val="tx1"/>
+        </a:solidFill>
+        <a:latin typeface="+mn-lt"/>
+        <a:ea typeface="+mn-ea"/>
+        <a:cs typeface="+mn-cs"/>
+      </a:defRPr>
+    </a:lvl3pPr>
+    <a:lvl4pPr marL="1371600" algn="l" defTabSz="914400" rtl="0" eaLnBrk="1" latinLnBrk="0" hangingPunct="1">
+      <a:defRPr sz="1200" kern="1200">
+        <a:solidFill>
+          <a:schemeClr val="tx1"/>
+        </a:solidFill>
+        <a:latin typeface="+mn-lt"/>
+        <a:ea typeface="+mn-ea"/>
+        <a:cs typeface="+mn-cs"/>
+      </a:defRPr>
+    </a:lvl4pPr>
+    <a:lvl5pPr marL="1828800" algn="l" defTabSz="914400" rtl="0" eaLnBrk="1" latinLnBrk="0" hangingPunct="1">
+      <a:defRPr sz="1200" kern="1200">
+        <a:solidFill>
+          <a:schemeClr val="tx1"/>
+        </a:solidFill>
+        <a:latin typeface="+mn-lt"/>
+        <a:ea typeface="+mn-ea"/>
+        <a:cs typeface="+mn-cs"/>
+      </a:defRPr>
+    </a:lvl5pPr>
+    <a:lvl6pPr marL="2286000" algn="l" defTabSz="914400" rtl="0" eaLnBrk="1" latinLnBrk="0" hangingPunct="1">
+      <a:defRPr sz="1200" kern="1200">
+        <a:solidFill>
+          <a:schemeClr val="tx1"/>
+        </a:solidFill>
+        <a:latin typeface="+mn-lt"/>
+        <a:ea typeface="+mn-ea"/>
+        <a:cs typeface="+mn-cs"/>
+      </a:defRPr>
+    </a:lvl6pPr>
+    <a:lvl7pPr marL="2743200" algn="l" defTabSz="914400" rtl="0" eaLnBrk="1" latinLnBrk="0" hangingPunct="1">
+      <a:defRPr sz="1200" kern="1200">
+        <a:solidFill>
+          <a:schemeClr val="tx1"/>
+        </a:solidFill>
+        <a:latin typeface="+mn-lt"/>
+        <a:ea typeface="+mn-ea"/>
+        <a:cs typeface="+mn-cs"/>
+      </a:defRPr>
+    </a:lvl7pPr>
+    <a:lvl8pPr marL="3200400" algn="l" defTabSz="914400" rtl="0" eaLnBrk="1" latinLnBrk="0" hangingPunct="1">
+      <a:defRPr sz="1200" kern="1200">
+        <a:solidFill>
+          <a:schemeClr val="tx1"/>
+        </a:solidFill>
+        <a:latin typeface="+mn-lt"/>
+        <a:ea typeface="+mn-ea"/>
+        <a:cs typeface="+mn-cs"/>
+      </a:defRPr>
+    </a:lvl8pPr>
+    <a:lvl9pPr marL="3657600" algn="l" defTabSz="914400" rtl="0" eaLnBrk="1" latinLnBrk="0" hangingPunct="1">
+      <a:defRPr sz="1200" kern="1200">
+        <a:solidFill>
+          <a:schemeClr val="tx1"/>
+        </a:solidFill>
+        <a:latin typeface="+mn-lt"/>
+        <a:ea typeface="+mn-ea"/>
+        <a:cs typeface="+mn-cs"/>
+      </a:defRPr>
+    </a:lvl9pPr>
+  </p:notesStyle>
+</p:notesMaster>
+</file>
+
+<file path=ppt/notesSlides/notesSlide1.xml><?xml version="1.0" encoding="utf-8"?>
+<p:notes xmlns:a="http://schemas.openxmlformats.org/drawingml/2006/main" xmlns:r="http://schemas.openxmlformats.org/officeDocument/2006/relationships" xmlns:p="http://schemas.openxmlformats.org/presentationml/2006/main">
+  <p:cSld>
+    <p:spTree>
+      <p:nvGrpSpPr>
+        <p:cNvPr id="1" name=""/>
+        <p:cNvGrpSpPr/>
+        <p:nvPr/>
+      </p:nvGrpSpPr>
+      <p:grpSpPr>
+        <a:xfrm>
+          <a:off x="0" y="0"/>
+          <a:ext cx="0" cy="0"/>
+          <a:chOff x="0" y="0"/>
+          <a:chExt cx="0" cy="0"/>
+        </a:xfrm>
+      </p:grpSpPr>
+      <p:sp>
+        <p:nvSpPr>
+          <p:cNvPr id="2" name="1 Marcador de imagen de diapositiva"/>
+          <p:cNvSpPr>
+            <a:spLocks noGrp="1" noRot="1" noChangeAspect="1"/>
+          </p:cNvSpPr>
+          <p:nvPr>
+            <p:ph type="sldImg"/>
+          </p:nvPr>
+        </p:nvSpPr>
+        <p:spPr/>
+      </p:sp>
+      <p:sp>
+        <p:nvSpPr>
+          <p:cNvPr id="3" name="2 Marcador de notas"/>
+          <p:cNvSpPr>
+            <a:spLocks noGrp="1"/>
+          </p:cNvSpPr>
+          <p:nvPr>
+            <p:ph type="body" idx="1"/>
+          </p:nvPr>
+        </p:nvSpPr>
+        <p:spPr/>
+        <p:txBody>
+          <a:bodyPr>
+            <a:normAutofit/>
+          </a:bodyPr>
+          <a:lstStyle/>
+          <a:p>
+            <a:endParaRPr lang="es-ES" dirty="0"/>
+          </a:p>
+        </p:txBody>
+      </p:sp>
+      <p:sp>
+        <p:nvSpPr>
+          <p:cNvPr id="4" name="3 Marcador de número de diapositiva"/>
+          <p:cNvSpPr>
+            <a:spLocks noGrp="1"/>
+          </p:cNvSpPr>
+          <p:nvPr>
+            <p:ph type="sldNum" sz="quarter" idx="10"/>
+          </p:nvPr>
+        </p:nvSpPr>
+        <p:spPr/>
+        <p:txBody>
+          <a:bodyPr/>
+          <a:lstStyle/>
+          <a:p>
+            <a:fld id="{711BE477-5C25-4A2F-B7F3-E0DA24DFBF67}" type="slidenum">
+              <a:rPr lang="es-ES" smtClean="0"/>
+              <a:t>5</a:t>
+            </a:fld>
+            <a:endParaRPr lang="es-ES"/>
+          </a:p>
+        </p:txBody>
+      </p:sp>
+    </p:spTree>
+  </p:cSld>
+  <p:clrMapOvr>
+    <a:masterClrMapping/>
+  </p:clrMapOvr>
+</p:notes>
 </file>
 
 <file path=ppt/slideLayouts/slideLayout1.xml><?xml version="1.0" encoding="utf-8"?>
@@ -3890,9 +4320,7 @@
         </p:nvSpPr>
         <p:spPr/>
         <p:txBody>
-          <a:bodyPr>
-            <a:normAutofit/>
-          </a:bodyPr>
+          <a:bodyPr/>
           <a:lstStyle/>
           <a:p>
             <a:r>
@@ -3920,7 +4348,7 @@
           <a:p>
             <a:r>
               <a:rPr lang="es-ES" dirty="0" smtClean="0"/>
-              <a:t>Experimento</a:t>
+              <a:t>resultados</a:t>
             </a:r>
             <a:endParaRPr lang="es-ES" dirty="0"/>
           </a:p>
@@ -3931,6 +4359,13 @@
   <p:clrMapOvr>
     <a:masterClrMapping/>
   </p:clrMapOvr>
+  <p:timing>
+    <p:tnLst>
+      <p:par>
+        <p:cTn id="1" dur="indefinite" restart="never" nodeType="tmRoot"/>
+      </p:par>
+    </p:tnLst>
+  </p:timing>
 </p:sld>
 </file>
 
@@ -3968,7 +4403,7 @@
           <a:p>
             <a:r>
               <a:rPr lang="es-ES" dirty="0" err="1" smtClean="0"/>
-              <a:t>Vrep</a:t>
+              <a:t>DataSets</a:t>
             </a:r>
             <a:endParaRPr lang="es-ES" dirty="0"/>
           </a:p>
@@ -3991,7 +4426,7 @@
           <a:p>
             <a:r>
               <a:rPr lang="es-ES" dirty="0" smtClean="0"/>
-              <a:t>resultados</a:t>
+              <a:t>Estructura</a:t>
             </a:r>
             <a:endParaRPr lang="es-ES" dirty="0"/>
           </a:p>
@@ -4002,6 +4437,13 @@
   <p:clrMapOvr>
     <a:masterClrMapping/>
   </p:clrMapOvr>
+  <p:timing>
+    <p:tnLst>
+      <p:par>
+        <p:cTn id="1" dur="indefinite" restart="never" nodeType="tmRoot"/>
+      </p:par>
+    </p:tnLst>
+  </p:timing>
 </p:sld>
 </file>
 
@@ -4062,7 +4504,7 @@
           <a:p>
             <a:r>
               <a:rPr lang="es-ES" dirty="0" smtClean="0"/>
-              <a:t>Estructura</a:t>
+              <a:t>Resultados</a:t>
             </a:r>
             <a:endParaRPr lang="es-ES" dirty="0"/>
           </a:p>
@@ -4073,6 +4515,13 @@
   <p:clrMapOvr>
     <a:masterClrMapping/>
   </p:clrMapOvr>
+  <p:timing>
+    <p:tnLst>
+      <p:par>
+        <p:cTn id="1" dur="indefinite" restart="never" nodeType="tmRoot"/>
+      </p:par>
+    </p:tnLst>
+  </p:timing>
 </p:sld>
 </file>
 
@@ -4110,7 +4559,11 @@
           <a:p>
             <a:r>
               <a:rPr lang="es-ES" dirty="0" err="1" smtClean="0"/>
-              <a:t>DataSets</a:t>
+              <a:t>Future</a:t>
+            </a:r>
+            <a:r>
+              <a:rPr lang="es-ES" dirty="0" smtClean="0"/>
+              <a:t> Works</a:t>
             </a:r>
             <a:endParaRPr lang="es-ES" dirty="0"/>
           </a:p>
@@ -4131,11 +4584,7 @@
           <a:bodyPr/>
           <a:lstStyle/>
           <a:p>
-            <a:r>
-              <a:rPr lang="es-ES" dirty="0" smtClean="0"/>
-              <a:t>Resultados</a:t>
-            </a:r>
-            <a:endParaRPr lang="es-ES" dirty="0"/>
+            <a:endParaRPr lang="es-ES"/>
           </a:p>
         </p:txBody>
       </p:sp>
@@ -4144,6 +4593,13 @@
   <p:clrMapOvr>
     <a:masterClrMapping/>
   </p:clrMapOvr>
+  <p:timing>
+    <p:tnLst>
+      <p:par>
+        <p:cTn id="1" dur="indefinite" restart="never" nodeType="tmRoot"/>
+      </p:par>
+    </p:tnLst>
+  </p:timing>
 </p:sld>
 </file>
 
@@ -4181,11 +4637,7 @@
           <a:p>
             <a:r>
               <a:rPr lang="es-ES" dirty="0" err="1" smtClean="0"/>
-              <a:t>Future</a:t>
-            </a:r>
-            <a:r>
-              <a:rPr lang="es-ES" dirty="0" smtClean="0"/>
-              <a:t> Works</a:t>
+              <a:t>BOViL</a:t>
             </a:r>
             <a:endParaRPr lang="es-ES" dirty="0"/>
           </a:p>
@@ -4215,73 +4667,13 @@
   <p:clrMapOvr>
     <a:masterClrMapping/>
   </p:clrMapOvr>
-</p:sld>
-</file>
-
-<file path=ppt/slides/slide15.xml><?xml version="1.0" encoding="utf-8"?>
-<p:sld xmlns:a="http://schemas.openxmlformats.org/drawingml/2006/main" xmlns:r="http://schemas.openxmlformats.org/officeDocument/2006/relationships" xmlns:p="http://schemas.openxmlformats.org/presentationml/2006/main">
-  <p:cSld>
-    <p:spTree>
-      <p:nvGrpSpPr>
-        <p:cNvPr id="1" name=""/>
-        <p:cNvGrpSpPr/>
-        <p:nvPr/>
-      </p:nvGrpSpPr>
-      <p:grpSpPr>
-        <a:xfrm>
-          <a:off x="0" y="0"/>
-          <a:ext cx="0" cy="0"/>
-          <a:chOff x="0" y="0"/>
-          <a:chExt cx="0" cy="0"/>
-        </a:xfrm>
-      </p:grpSpPr>
-      <p:sp>
-        <p:nvSpPr>
-          <p:cNvPr id="2" name="1 Título"/>
-          <p:cNvSpPr>
-            <a:spLocks noGrp="1"/>
-          </p:cNvSpPr>
-          <p:nvPr>
-            <p:ph type="title"/>
-          </p:nvPr>
-        </p:nvSpPr>
-        <p:spPr/>
-        <p:txBody>
-          <a:bodyPr/>
-          <a:lstStyle/>
-          <a:p>
-            <a:r>
-              <a:rPr lang="es-ES" dirty="0" err="1" smtClean="0"/>
-              <a:t>BOViL</a:t>
-            </a:r>
-            <a:endParaRPr lang="es-ES" dirty="0"/>
-          </a:p>
-        </p:txBody>
-      </p:sp>
-      <p:sp>
-        <p:nvSpPr>
-          <p:cNvPr id="3" name="2 Marcador de contenido"/>
-          <p:cNvSpPr>
-            <a:spLocks noGrp="1"/>
-          </p:cNvSpPr>
-          <p:nvPr>
-            <p:ph sz="quarter" idx="1"/>
-          </p:nvPr>
-        </p:nvSpPr>
-        <p:spPr/>
-        <p:txBody>
-          <a:bodyPr/>
-          <a:lstStyle/>
-          <a:p>
-            <a:endParaRPr lang="es-ES"/>
-          </a:p>
-        </p:txBody>
-      </p:sp>
-    </p:spTree>
-  </p:cSld>
-  <p:clrMapOvr>
-    <a:masterClrMapping/>
-  </p:clrMapOvr>
+  <p:timing>
+    <p:tnLst>
+      <p:par>
+        <p:cTn id="1" dur="indefinite" restart="never" nodeType="tmRoot"/>
+      </p:par>
+    </p:tnLst>
+  </p:timing>
 </p:sld>
 </file>
 
@@ -4337,12 +4729,72 @@
         </p:nvSpPr>
         <p:spPr/>
         <p:txBody>
-          <a:bodyPr/>
+          <a:bodyPr>
+            <a:normAutofit lnSpcReduction="10000"/>
+          </a:bodyPr>
           <a:lstStyle/>
           <a:p>
             <a:r>
               <a:rPr lang="es-ES" dirty="0" smtClean="0"/>
               <a:t>Estructura</a:t>
+            </a:r>
+          </a:p>
+          <a:p>
+            <a:r>
+              <a:rPr lang="es-ES" dirty="0" smtClean="0"/>
+              <a:t>Segmentación</a:t>
+            </a:r>
+          </a:p>
+          <a:p>
+            <a:r>
+              <a:rPr lang="es-ES" dirty="0" smtClean="0"/>
+              <a:t>Estimación</a:t>
+            </a:r>
+          </a:p>
+          <a:p>
+            <a:r>
+              <a:rPr lang="es-ES" dirty="0" smtClean="0"/>
+              <a:t>Simulaciones</a:t>
+            </a:r>
+          </a:p>
+          <a:p>
+            <a:r>
+              <a:rPr lang="es-ES" dirty="0" smtClean="0"/>
+              <a:t>Estructura </a:t>
+            </a:r>
+            <a:r>
+              <a:rPr lang="es-ES" dirty="0" smtClean="0"/>
+              <a:t>de los Programas</a:t>
+            </a:r>
+            <a:endParaRPr lang="es-ES" dirty="0" smtClean="0"/>
+          </a:p>
+          <a:p>
+            <a:r>
+              <a:rPr lang="es-ES" dirty="0" err="1" smtClean="0"/>
+              <a:t>Vrep</a:t>
+            </a:r>
+            <a:endParaRPr lang="es-ES" dirty="0" smtClean="0"/>
+          </a:p>
+          <a:p>
+            <a:r>
+              <a:rPr lang="es-ES" dirty="0" smtClean="0"/>
+              <a:t>Experimentos</a:t>
+            </a:r>
+          </a:p>
+          <a:p>
+            <a:r>
+              <a:rPr lang="es-ES" dirty="0" err="1" smtClean="0"/>
+              <a:t>Future</a:t>
+            </a:r>
+            <a:r>
+              <a:rPr lang="es-ES" dirty="0" smtClean="0"/>
+              <a:t> Works</a:t>
+            </a:r>
+          </a:p>
+          <a:p>
+            <a:r>
+              <a:rPr lang="es-ES" dirty="0" err="1" smtClean="0"/>
+              <a:t>BOViL</a:t>
             </a:r>
             <a:endParaRPr lang="es-ES" dirty="0"/>
           </a:p>
@@ -4406,7 +4858,7 @@
       </p:sp>
       <p:pic>
         <p:nvPicPr>
-          <p:cNvPr id="1026" name="Picture 2"/>
+          <p:cNvPr id="1027" name="Picture 3"/>
           <p:cNvPicPr>
             <a:picLocks noGrp="1" noChangeAspect="1" noChangeArrowheads="1"/>
           </p:cNvPicPr>
@@ -4415,7 +4867,7 @@
           </p:nvPr>
         </p:nvPicPr>
         <p:blipFill>
-          <a:blip r:embed="rId2"/>
+          <a:blip r:embed="rId2" cstate="print"/>
           <a:srcRect/>
           <a:stretch>
             <a:fillRect/>
@@ -4423,8 +4875,8 @@
         </p:blipFill>
         <p:spPr bwMode="auto">
           <a:xfrm>
-            <a:off x="485804" y="1601570"/>
-            <a:ext cx="8229600" cy="3970570"/>
+            <a:off x="857224" y="4714884"/>
+            <a:ext cx="1357321" cy="864664"/>
           </a:xfrm>
           <a:prstGeom prst="rect">
             <a:avLst/>
@@ -4439,16 +4891,992 @@
           <a:effectLst/>
         </p:spPr>
       </p:pic>
-      <p:sp>
-        <p:nvSpPr>
-          <p:cNvPr id="5" name="4 CuadroTexto"/>
+      <p:pic>
+        <p:nvPicPr>
+          <p:cNvPr id="7" name="Picture 3"/>
+          <p:cNvPicPr>
+            <a:picLocks noChangeAspect="1" noChangeArrowheads="1"/>
+          </p:cNvPicPr>
+          <p:nvPr/>
+        </p:nvPicPr>
+        <p:blipFill>
+          <a:blip r:embed="rId2" cstate="print"/>
+          <a:srcRect/>
+          <a:stretch>
+            <a:fillRect/>
+          </a:stretch>
+        </p:blipFill>
+        <p:spPr bwMode="auto">
+          <a:xfrm>
+            <a:off x="3000364" y="4286256"/>
+            <a:ext cx="1357321" cy="864664"/>
+          </a:xfrm>
+          <a:prstGeom prst="rect">
+            <a:avLst/>
+          </a:prstGeom>
+          <a:noFill/>
+          <a:ln w="9525">
+            <a:noFill/>
+            <a:miter lim="800000"/>
+            <a:headEnd/>
+            <a:tailEnd/>
+          </a:ln>
+          <a:effectLst/>
+        </p:spPr>
+      </p:pic>
+      <p:pic>
+        <p:nvPicPr>
+          <p:cNvPr id="8" name="Picture 3"/>
+          <p:cNvPicPr>
+            <a:picLocks noChangeAspect="1" noChangeArrowheads="1"/>
+          </p:cNvPicPr>
+          <p:nvPr/>
+        </p:nvPicPr>
+        <p:blipFill>
+          <a:blip r:embed="rId2" cstate="print"/>
+          <a:srcRect/>
+          <a:stretch>
+            <a:fillRect/>
+          </a:stretch>
+        </p:blipFill>
+        <p:spPr bwMode="auto">
+          <a:xfrm>
+            <a:off x="4500562" y="5072074"/>
+            <a:ext cx="1357321" cy="864664"/>
+          </a:xfrm>
+          <a:prstGeom prst="rect">
+            <a:avLst/>
+          </a:prstGeom>
+          <a:noFill/>
+          <a:ln w="9525">
+            <a:noFill/>
+            <a:miter lim="800000"/>
+            <a:headEnd/>
+            <a:tailEnd/>
+          </a:ln>
+          <a:effectLst/>
+        </p:spPr>
+      </p:pic>
+      <p:pic>
+        <p:nvPicPr>
+          <p:cNvPr id="1028" name="Picture 4"/>
+          <p:cNvPicPr>
+            <a:picLocks noChangeAspect="1" noChangeArrowheads="1"/>
+          </p:cNvPicPr>
+          <p:nvPr/>
+        </p:nvPicPr>
+        <p:blipFill>
+          <a:blip r:embed="rId3" cstate="print"/>
+          <a:srcRect/>
+          <a:stretch>
+            <a:fillRect/>
+          </a:stretch>
+        </p:blipFill>
+        <p:spPr bwMode="auto">
+          <a:xfrm>
+            <a:off x="6536092" y="3214686"/>
+            <a:ext cx="1491291" cy="1085825"/>
+          </a:xfrm>
+          <a:prstGeom prst="rect">
+            <a:avLst/>
+          </a:prstGeom>
+          <a:noFill/>
+          <a:ln w="9525">
+            <a:noFill/>
+            <a:miter lim="800000"/>
+            <a:headEnd/>
+            <a:tailEnd/>
+          </a:ln>
+          <a:effectLst/>
+        </p:spPr>
+      </p:pic>
+      <p:pic>
+        <p:nvPicPr>
+          <p:cNvPr id="1029" name="Picture 5"/>
+          <p:cNvPicPr>
+            <a:picLocks noChangeAspect="1" noChangeArrowheads="1"/>
+          </p:cNvPicPr>
+          <p:nvPr/>
+        </p:nvPicPr>
+        <p:blipFill>
+          <a:blip r:embed="rId4"/>
+          <a:srcRect/>
+          <a:stretch>
+            <a:fillRect/>
+          </a:stretch>
+        </p:blipFill>
+        <p:spPr bwMode="auto">
+          <a:xfrm>
+            <a:off x="2786050" y="2000240"/>
+            <a:ext cx="2713284" cy="1685924"/>
+          </a:xfrm>
+          <a:prstGeom prst="rect">
+            <a:avLst/>
+          </a:prstGeom>
+          <a:noFill/>
+          <a:ln w="9525">
+            <a:noFill/>
+            <a:miter lim="800000"/>
+            <a:headEnd/>
+            <a:tailEnd/>
+          </a:ln>
+          <a:effectLst/>
+        </p:spPr>
+      </p:pic>
+      <p:grpSp>
+        <p:nvGrpSpPr>
+          <p:cNvPr id="31" name="30 Grupo"/>
+          <p:cNvGrpSpPr/>
+          <p:nvPr/>
+        </p:nvGrpSpPr>
+        <p:grpSpPr>
+          <a:xfrm>
+            <a:off x="1643044" y="3286124"/>
+            <a:ext cx="4643468" cy="2218282"/>
+            <a:chOff x="1643044" y="3286124"/>
+            <a:chExt cx="4643468" cy="2218282"/>
+          </a:xfrm>
+        </p:grpSpPr>
+        <p:cxnSp>
+          <p:nvCxnSpPr>
+            <p:cNvPr id="12" name="11 Conector recto"/>
+            <p:cNvCxnSpPr/>
+            <p:nvPr/>
+          </p:nvCxnSpPr>
+          <p:spPr>
+            <a:xfrm flipV="1">
+              <a:off x="1643044" y="3429001"/>
+              <a:ext cx="1714509" cy="1285883"/>
+            </a:xfrm>
+            <a:prstGeom prst="line">
+              <a:avLst/>
+            </a:prstGeom>
+            <a:ln w="25400">
+              <a:solidFill>
+                <a:srgbClr val="92D050"/>
+              </a:solidFill>
+            </a:ln>
+          </p:spPr>
+          <p:style>
+            <a:lnRef idx="1">
+              <a:schemeClr val="accent1"/>
+            </a:lnRef>
+            <a:fillRef idx="0">
+              <a:schemeClr val="accent1"/>
+            </a:fillRef>
+            <a:effectRef idx="0">
+              <a:schemeClr val="accent1"/>
+            </a:effectRef>
+            <a:fontRef idx="minor">
+              <a:schemeClr val="tx1"/>
+            </a:fontRef>
+          </p:style>
+        </p:cxnSp>
+        <p:cxnSp>
+          <p:nvCxnSpPr>
+            <p:cNvPr id="14" name="13 Conector recto"/>
+            <p:cNvCxnSpPr/>
+            <p:nvPr/>
+          </p:nvCxnSpPr>
+          <p:spPr>
+            <a:xfrm rot="5400000" flipH="1" flipV="1">
+              <a:off x="3464711" y="3964785"/>
+              <a:ext cx="714380" cy="71438"/>
+            </a:xfrm>
+            <a:prstGeom prst="line">
+              <a:avLst/>
+            </a:prstGeom>
+            <a:ln w="25400">
+              <a:solidFill>
+                <a:srgbClr val="92D050"/>
+              </a:solidFill>
+            </a:ln>
+          </p:spPr>
+          <p:style>
+            <a:lnRef idx="1">
+              <a:schemeClr val="accent1"/>
+            </a:lnRef>
+            <a:fillRef idx="0">
+              <a:schemeClr val="accent1"/>
+            </a:fillRef>
+            <a:effectRef idx="0">
+              <a:schemeClr val="accent1"/>
+            </a:effectRef>
+            <a:fontRef idx="minor">
+              <a:schemeClr val="tx1"/>
+            </a:fontRef>
+          </p:style>
+        </p:cxnSp>
+        <p:cxnSp>
+          <p:nvCxnSpPr>
+            <p:cNvPr id="16" name="15 Conector recto"/>
+            <p:cNvCxnSpPr>
+              <a:stCxn id="8" idx="0"/>
+            </p:cNvCxnSpPr>
+            <p:nvPr/>
+          </p:nvCxnSpPr>
+          <p:spPr>
+            <a:xfrm rot="16200000" flipV="1">
+              <a:off x="4125513" y="4018363"/>
+              <a:ext cx="1428760" cy="678661"/>
+            </a:xfrm>
+            <a:prstGeom prst="line">
+              <a:avLst/>
+            </a:prstGeom>
+            <a:ln w="25400">
+              <a:solidFill>
+                <a:srgbClr val="92D050"/>
+              </a:solidFill>
+            </a:ln>
+          </p:spPr>
+          <p:style>
+            <a:lnRef idx="1">
+              <a:schemeClr val="accent1"/>
+            </a:lnRef>
+            <a:fillRef idx="0">
+              <a:schemeClr val="accent1"/>
+            </a:fillRef>
+            <a:effectRef idx="0">
+              <a:schemeClr val="accent1"/>
+            </a:effectRef>
+            <a:fontRef idx="minor">
+              <a:schemeClr val="tx1"/>
+            </a:fontRef>
+          </p:style>
+        </p:cxnSp>
+        <p:cxnSp>
+          <p:nvCxnSpPr>
+            <p:cNvPr id="19" name="18 Conector recto"/>
+            <p:cNvCxnSpPr/>
+            <p:nvPr/>
+          </p:nvCxnSpPr>
+          <p:spPr>
+            <a:xfrm rot="10800000">
+              <a:off x="5286380" y="3286124"/>
+              <a:ext cx="1000132" cy="428628"/>
+            </a:xfrm>
+            <a:prstGeom prst="line">
+              <a:avLst/>
+            </a:prstGeom>
+            <a:ln w="25400">
+              <a:solidFill>
+                <a:srgbClr val="92D050"/>
+              </a:solidFill>
+            </a:ln>
+          </p:spPr>
+          <p:style>
+            <a:lnRef idx="1">
+              <a:schemeClr val="accent1"/>
+            </a:lnRef>
+            <a:fillRef idx="0">
+              <a:schemeClr val="accent1"/>
+            </a:fillRef>
+            <a:effectRef idx="0">
+              <a:schemeClr val="accent1"/>
+            </a:effectRef>
+            <a:fontRef idx="minor">
+              <a:schemeClr val="tx1"/>
+            </a:fontRef>
+          </p:style>
+        </p:cxnSp>
+        <p:cxnSp>
+          <p:nvCxnSpPr>
+            <p:cNvPr id="21" name="20 Conector recto"/>
+            <p:cNvCxnSpPr>
+              <a:stCxn id="1027" idx="3"/>
+            </p:cNvCxnSpPr>
+            <p:nvPr/>
+          </p:nvCxnSpPr>
+          <p:spPr>
+            <a:xfrm flipV="1">
+              <a:off x="2214545" y="4857760"/>
+              <a:ext cx="785819" cy="289456"/>
+            </a:xfrm>
+            <a:prstGeom prst="line">
+              <a:avLst/>
+            </a:prstGeom>
+            <a:ln w="25400">
+              <a:solidFill>
+                <a:srgbClr val="92D050"/>
+              </a:solidFill>
+            </a:ln>
+          </p:spPr>
+          <p:style>
+            <a:lnRef idx="1">
+              <a:schemeClr val="accent1"/>
+            </a:lnRef>
+            <a:fillRef idx="0">
+              <a:schemeClr val="accent1"/>
+            </a:fillRef>
+            <a:effectRef idx="0">
+              <a:schemeClr val="accent1"/>
+            </a:effectRef>
+            <a:fontRef idx="minor">
+              <a:schemeClr val="tx1"/>
+            </a:fontRef>
+          </p:style>
+        </p:cxnSp>
+        <p:cxnSp>
+          <p:nvCxnSpPr>
+            <p:cNvPr id="23" name="22 Conector recto"/>
+            <p:cNvCxnSpPr>
+              <a:endCxn id="8" idx="1"/>
+            </p:cNvCxnSpPr>
+            <p:nvPr/>
+          </p:nvCxnSpPr>
+          <p:spPr>
+            <a:xfrm>
+              <a:off x="2285984" y="5357826"/>
+              <a:ext cx="2214578" cy="146580"/>
+            </a:xfrm>
+            <a:prstGeom prst="line">
+              <a:avLst/>
+            </a:prstGeom>
+            <a:ln w="25400">
+              <a:solidFill>
+                <a:srgbClr val="92D050"/>
+              </a:solidFill>
+            </a:ln>
+          </p:spPr>
+          <p:style>
+            <a:lnRef idx="1">
+              <a:schemeClr val="accent1"/>
+            </a:lnRef>
+            <a:fillRef idx="0">
+              <a:schemeClr val="accent1"/>
+            </a:fillRef>
+            <a:effectRef idx="0">
+              <a:schemeClr val="accent1"/>
+            </a:effectRef>
+            <a:fontRef idx="minor">
+              <a:schemeClr val="tx1"/>
+            </a:fontRef>
+          </p:style>
+        </p:cxnSp>
+        <p:cxnSp>
+          <p:nvCxnSpPr>
+            <p:cNvPr id="26" name="25 Conector recto"/>
+            <p:cNvCxnSpPr/>
+            <p:nvPr/>
+          </p:nvCxnSpPr>
+          <p:spPr>
+            <a:xfrm>
+              <a:off x="4214810" y="5072074"/>
+              <a:ext cx="428628" cy="214314"/>
+            </a:xfrm>
+            <a:prstGeom prst="line">
+              <a:avLst/>
+            </a:prstGeom>
+            <a:ln w="25400">
+              <a:solidFill>
+                <a:srgbClr val="92D050"/>
+              </a:solidFill>
+            </a:ln>
+          </p:spPr>
+          <p:style>
+            <a:lnRef idx="1">
+              <a:schemeClr val="accent1"/>
+            </a:lnRef>
+            <a:fillRef idx="0">
+              <a:schemeClr val="accent1"/>
+            </a:fillRef>
+            <a:effectRef idx="0">
+              <a:schemeClr val="accent1"/>
+            </a:effectRef>
+            <a:fontRef idx="minor">
+              <a:schemeClr val="tx1"/>
+            </a:fontRef>
+          </p:style>
+        </p:cxnSp>
+      </p:grpSp>
+      <p:pic>
+        <p:nvPicPr>
+          <p:cNvPr id="1032" name="Picture 8"/>
+          <p:cNvPicPr>
+            <a:picLocks noChangeAspect="1" noChangeArrowheads="1"/>
+          </p:cNvPicPr>
+          <p:nvPr/>
+        </p:nvPicPr>
+        <p:blipFill>
+          <a:blip r:embed="rId5"/>
+          <a:srcRect/>
+          <a:stretch>
+            <a:fillRect/>
+          </a:stretch>
+        </p:blipFill>
+        <p:spPr bwMode="auto">
+          <a:xfrm>
+            <a:off x="714348" y="3714752"/>
+            <a:ext cx="1500198" cy="805191"/>
+          </a:xfrm>
+          <a:prstGeom prst="rect">
+            <a:avLst/>
+          </a:prstGeom>
+          <a:noFill/>
+          <a:ln w="9525">
+            <a:noFill/>
+            <a:miter lim="800000"/>
+            <a:headEnd/>
+            <a:tailEnd/>
+          </a:ln>
+          <a:effectLst/>
+        </p:spPr>
+      </p:pic>
+      <p:grpSp>
+        <p:nvGrpSpPr>
+          <p:cNvPr id="44" name="43 Grupo"/>
+          <p:cNvGrpSpPr/>
+          <p:nvPr/>
+        </p:nvGrpSpPr>
+        <p:grpSpPr>
+          <a:xfrm>
+            <a:off x="202140" y="2905134"/>
+            <a:ext cx="2020654" cy="1238246"/>
+            <a:chOff x="202140" y="2905134"/>
+            <a:chExt cx="2020654" cy="1238246"/>
+          </a:xfrm>
+        </p:grpSpPr>
+        <p:pic>
+          <p:nvPicPr>
+            <p:cNvPr id="1034" name="Picture 10"/>
+            <p:cNvPicPr>
+              <a:picLocks noChangeAspect="1" noChangeArrowheads="1"/>
+            </p:cNvPicPr>
+            <p:nvPr/>
+          </p:nvPicPr>
+          <p:blipFill>
+            <a:blip r:embed="rId6"/>
+            <a:srcRect/>
+            <a:stretch>
+              <a:fillRect/>
+            </a:stretch>
+          </p:blipFill>
+          <p:spPr bwMode="auto">
+            <a:xfrm>
+              <a:off x="714348" y="2905134"/>
+              <a:ext cx="1508446" cy="809618"/>
+            </a:xfrm>
+            <a:prstGeom prst="rect">
+              <a:avLst/>
+            </a:prstGeom>
+            <a:noFill/>
+            <a:ln w="9525">
+              <a:noFill/>
+              <a:miter lim="800000"/>
+              <a:headEnd/>
+              <a:tailEnd/>
+            </a:ln>
+            <a:effectLst/>
+          </p:spPr>
+        </p:pic>
+        <p:sp>
+          <p:nvSpPr>
+            <p:cNvPr id="40" name="39 Arco"/>
+            <p:cNvSpPr/>
+            <p:nvPr/>
+          </p:nvSpPr>
+          <p:spPr>
+            <a:xfrm rot="16200000">
+              <a:off x="357174" y="3428984"/>
+              <a:ext cx="714348" cy="428628"/>
+            </a:xfrm>
+            <a:prstGeom prst="arc">
+              <a:avLst>
+                <a:gd name="adj1" fmla="val 10905535"/>
+                <a:gd name="adj2" fmla="val 0"/>
+              </a:avLst>
+            </a:prstGeom>
+            <a:ln w="25400">
+              <a:solidFill>
+                <a:schemeClr val="tx1"/>
+              </a:solidFill>
+              <a:miter lim="800000"/>
+              <a:tailEnd type="triangle"/>
+            </a:ln>
+          </p:spPr>
+          <p:style>
+            <a:lnRef idx="1">
+              <a:schemeClr val="accent1"/>
+            </a:lnRef>
+            <a:fillRef idx="0">
+              <a:schemeClr val="accent1"/>
+            </a:fillRef>
+            <a:effectRef idx="0">
+              <a:schemeClr val="accent1"/>
+            </a:effectRef>
+            <a:fontRef idx="minor">
+              <a:schemeClr val="tx1"/>
+            </a:fontRef>
+          </p:style>
+          <p:txBody>
+            <a:bodyPr rtlCol="0" anchor="ctr"/>
+            <a:lstStyle/>
+            <a:p>
+              <a:pPr algn="ctr"/>
+              <a:endParaRPr lang="es-ES"/>
+            </a:p>
+          </p:txBody>
+        </p:sp>
+        <p:sp>
+          <p:nvSpPr>
+            <p:cNvPr id="42" name="41 CuadroTexto"/>
+            <p:cNvSpPr txBox="1"/>
+            <p:nvPr/>
+          </p:nvSpPr>
+          <p:spPr>
+            <a:xfrm>
+              <a:off x="202140" y="3219088"/>
+              <a:ext cx="369332" cy="924292"/>
+            </a:xfrm>
+            <a:prstGeom prst="rect">
+              <a:avLst/>
+            </a:prstGeom>
+            <a:noFill/>
+          </p:spPr>
+          <p:txBody>
+            <a:bodyPr vert="vert270" wrap="none" rtlCol="0">
+              <a:spAutoFit/>
+            </a:bodyPr>
+            <a:lstStyle/>
+            <a:p>
+              <a:r>
+                <a:rPr lang="es-ES" sz="1200" dirty="0" err="1" smtClean="0"/>
+                <a:t>Segmentation</a:t>
+              </a:r>
+              <a:endParaRPr lang="es-ES" sz="1200" dirty="0"/>
+            </a:p>
+          </p:txBody>
+        </p:sp>
+      </p:grpSp>
+      <p:grpSp>
+        <p:nvGrpSpPr>
+          <p:cNvPr id="45" name="44 Grupo"/>
+          <p:cNvGrpSpPr/>
+          <p:nvPr/>
+        </p:nvGrpSpPr>
+        <p:grpSpPr>
+          <a:xfrm>
+            <a:off x="714348" y="2214554"/>
+            <a:ext cx="2012406" cy="1142976"/>
+            <a:chOff x="714348" y="2214554"/>
+            <a:chExt cx="2012406" cy="1142976"/>
+          </a:xfrm>
+        </p:grpSpPr>
+        <p:sp>
+          <p:nvSpPr>
+            <p:cNvPr id="39" name="38 CuadroTexto"/>
+            <p:cNvSpPr txBox="1"/>
+            <p:nvPr/>
+          </p:nvSpPr>
+          <p:spPr>
+            <a:xfrm>
+              <a:off x="714348" y="2214554"/>
+              <a:ext cx="1500198" cy="661720"/>
+            </a:xfrm>
+            <a:prstGeom prst="rect">
+              <a:avLst/>
+            </a:prstGeom>
+            <a:noFill/>
+            <a:ln>
+              <a:solidFill>
+                <a:srgbClr val="00B050"/>
+              </a:solidFill>
+            </a:ln>
+          </p:spPr>
+          <p:txBody>
+            <a:bodyPr wrap="square" rtlCol="0">
+              <a:spAutoFit/>
+            </a:bodyPr>
+            <a:lstStyle/>
+            <a:p>
+              <a:r>
+                <a:rPr lang="es-ES" sz="800" dirty="0" smtClean="0"/>
+                <a:t>Data{</a:t>
+              </a:r>
+            </a:p>
+            <a:p>
+              <a:r>
+                <a:rPr lang="es-ES" sz="700" dirty="0"/>
+                <a:t> </a:t>
+              </a:r>
+              <a:r>
+                <a:rPr lang="es-ES" sz="700" dirty="0" smtClean="0"/>
+                <a:t>   obj1{T, (X, Y), (</a:t>
+              </a:r>
+              <a:r>
+                <a:rPr lang="es-ES" sz="700" dirty="0" err="1" smtClean="0"/>
+                <a:t>Tx</a:t>
+              </a:r>
+              <a:r>
+                <a:rPr lang="es-ES" sz="700" dirty="0" smtClean="0"/>
+                <a:t>, </a:t>
+              </a:r>
+              <a:r>
+                <a:rPr lang="es-ES" sz="700" dirty="0" err="1" smtClean="0"/>
+                <a:t>Ty</a:t>
+              </a:r>
+              <a:r>
+                <a:rPr lang="es-ES" sz="700" dirty="0" smtClean="0"/>
+                <a:t>, </a:t>
+              </a:r>
+              <a:r>
+                <a:rPr lang="es-ES" sz="700" dirty="0" err="1" smtClean="0"/>
+                <a:t>Bx</a:t>
+              </a:r>
+              <a:r>
+                <a:rPr lang="es-ES" sz="700" dirty="0" smtClean="0"/>
+                <a:t>, </a:t>
+              </a:r>
+              <a:r>
+                <a:rPr lang="es-ES" sz="700" dirty="0" err="1" smtClean="0"/>
+                <a:t>By</a:t>
+              </a:r>
+              <a:r>
+                <a:rPr lang="es-ES" sz="700" dirty="0" smtClean="0"/>
+                <a:t>)}</a:t>
+              </a:r>
+            </a:p>
+            <a:p>
+              <a:r>
+                <a:rPr lang="es-ES" sz="700" dirty="0" smtClean="0"/>
+                <a:t>    obj2{T, (X, Y), (</a:t>
+              </a:r>
+              <a:r>
+                <a:rPr lang="es-ES" sz="700" dirty="0" err="1" smtClean="0"/>
+                <a:t>Tx</a:t>
+              </a:r>
+              <a:r>
+                <a:rPr lang="es-ES" sz="700" dirty="0" smtClean="0"/>
+                <a:t>, </a:t>
+              </a:r>
+              <a:r>
+                <a:rPr lang="es-ES" sz="700" dirty="0" err="1" smtClean="0"/>
+                <a:t>Ty</a:t>
+              </a:r>
+              <a:r>
+                <a:rPr lang="es-ES" sz="700" dirty="0" smtClean="0"/>
+                <a:t>, </a:t>
+              </a:r>
+              <a:r>
+                <a:rPr lang="es-ES" sz="700" dirty="0" err="1" smtClean="0"/>
+                <a:t>Bx</a:t>
+              </a:r>
+              <a:r>
+                <a:rPr lang="es-ES" sz="700" dirty="0" smtClean="0"/>
+                <a:t>, </a:t>
+              </a:r>
+              <a:r>
+                <a:rPr lang="es-ES" sz="700" dirty="0" err="1" smtClean="0"/>
+                <a:t>By</a:t>
+              </a:r>
+              <a:r>
+                <a:rPr lang="es-ES" sz="700" dirty="0" smtClean="0"/>
+                <a:t>)}</a:t>
+              </a:r>
+            </a:p>
+            <a:p>
+              <a:r>
+                <a:rPr lang="es-ES" sz="700" dirty="0" smtClean="0"/>
+                <a:t>    …</a:t>
+              </a:r>
+              <a:endParaRPr lang="es-ES" sz="700" dirty="0"/>
+            </a:p>
+            <a:p>
+              <a:r>
+                <a:rPr lang="es-ES" sz="800" dirty="0" smtClean="0"/>
+                <a:t>}</a:t>
+              </a:r>
+              <a:endParaRPr lang="es-ES" sz="800" dirty="0"/>
+            </a:p>
+          </p:txBody>
+        </p:sp>
+        <p:sp>
+          <p:nvSpPr>
+            <p:cNvPr id="41" name="40 Arco"/>
+            <p:cNvSpPr/>
+            <p:nvPr/>
+          </p:nvSpPr>
+          <p:spPr>
+            <a:xfrm rot="5400000" flipH="1">
+              <a:off x="1857372" y="2786042"/>
+              <a:ext cx="714348" cy="428628"/>
+            </a:xfrm>
+            <a:prstGeom prst="arc">
+              <a:avLst>
+                <a:gd name="adj1" fmla="val 10905535"/>
+                <a:gd name="adj2" fmla="val 0"/>
+              </a:avLst>
+            </a:prstGeom>
+            <a:ln w="25400">
+              <a:solidFill>
+                <a:schemeClr val="tx1"/>
+              </a:solidFill>
+              <a:miter lim="800000"/>
+              <a:tailEnd type="triangle"/>
+            </a:ln>
+          </p:spPr>
+          <p:style>
+            <a:lnRef idx="1">
+              <a:schemeClr val="accent1"/>
+            </a:lnRef>
+            <a:fillRef idx="0">
+              <a:schemeClr val="accent1"/>
+            </a:fillRef>
+            <a:effectRef idx="0">
+              <a:schemeClr val="accent1"/>
+            </a:effectRef>
+            <a:fontRef idx="minor">
+              <a:schemeClr val="tx1"/>
+            </a:fontRef>
+          </p:style>
+          <p:txBody>
+            <a:bodyPr rtlCol="0" anchor="ctr"/>
+            <a:lstStyle/>
+            <a:p>
+              <a:pPr algn="ctr"/>
+              <a:endParaRPr lang="es-ES"/>
+            </a:p>
+          </p:txBody>
+        </p:sp>
+        <p:sp>
+          <p:nvSpPr>
+            <p:cNvPr id="43" name="42 CuadroTexto"/>
+            <p:cNvSpPr txBox="1"/>
+            <p:nvPr/>
+          </p:nvSpPr>
+          <p:spPr>
+            <a:xfrm>
+              <a:off x="2357422" y="2786058"/>
+              <a:ext cx="369332" cy="396904"/>
+            </a:xfrm>
+            <a:prstGeom prst="rect">
+              <a:avLst/>
+            </a:prstGeom>
+            <a:noFill/>
+          </p:spPr>
+          <p:txBody>
+            <a:bodyPr vert="vert270" wrap="square" rtlCol="0">
+              <a:spAutoFit/>
+            </a:bodyPr>
+            <a:lstStyle/>
+            <a:p>
+              <a:r>
+                <a:rPr lang="es-ES" sz="1200" dirty="0" smtClean="0"/>
+                <a:t>Data</a:t>
+              </a:r>
+              <a:endParaRPr lang="es-ES" sz="1200" dirty="0"/>
+            </a:p>
+          </p:txBody>
+        </p:sp>
+      </p:grpSp>
+      <p:grpSp>
+        <p:nvGrpSpPr>
+          <p:cNvPr id="49" name="48 Grupo"/>
+          <p:cNvGrpSpPr/>
+          <p:nvPr/>
+        </p:nvGrpSpPr>
+        <p:grpSpPr>
+          <a:xfrm>
+            <a:off x="2285984" y="2214554"/>
+            <a:ext cx="1095043" cy="312082"/>
+            <a:chOff x="2285984" y="2214554"/>
+            <a:chExt cx="1095043" cy="312082"/>
+          </a:xfrm>
+        </p:grpSpPr>
+        <p:cxnSp>
+          <p:nvCxnSpPr>
+            <p:cNvPr id="47" name="46 Conector recto de flecha"/>
+            <p:cNvCxnSpPr/>
+            <p:nvPr/>
+          </p:nvCxnSpPr>
+          <p:spPr>
+            <a:xfrm>
+              <a:off x="2285984" y="2500306"/>
+              <a:ext cx="857256" cy="26330"/>
+            </a:xfrm>
+            <a:prstGeom prst="straightConnector1">
+              <a:avLst/>
+            </a:prstGeom>
+            <a:ln w="25400">
+              <a:solidFill>
+                <a:schemeClr val="tx1"/>
+              </a:solidFill>
+              <a:tailEnd type="triangle"/>
+            </a:ln>
+          </p:spPr>
+          <p:style>
+            <a:lnRef idx="1">
+              <a:schemeClr val="accent1"/>
+            </a:lnRef>
+            <a:fillRef idx="0">
+              <a:schemeClr val="accent1"/>
+            </a:fillRef>
+            <a:effectRef idx="0">
+              <a:schemeClr val="accent1"/>
+            </a:effectRef>
+            <a:fontRef idx="minor">
+              <a:schemeClr val="tx1"/>
+            </a:fontRef>
+          </p:style>
+        </p:cxnSp>
+        <p:sp>
+          <p:nvSpPr>
+            <p:cNvPr id="48" name="47 CuadroTexto"/>
+            <p:cNvSpPr txBox="1"/>
+            <p:nvPr/>
+          </p:nvSpPr>
+          <p:spPr>
+            <a:xfrm>
+              <a:off x="2285984" y="2214554"/>
+              <a:ext cx="1095043" cy="276999"/>
+            </a:xfrm>
+            <a:prstGeom prst="rect">
+              <a:avLst/>
+            </a:prstGeom>
+            <a:noFill/>
+          </p:spPr>
+          <p:txBody>
+            <a:bodyPr wrap="none" rtlCol="0">
+              <a:spAutoFit/>
+            </a:bodyPr>
+            <a:lstStyle/>
+            <a:p>
+              <a:r>
+                <a:rPr lang="es-ES" sz="1200" dirty="0" err="1" smtClean="0"/>
+                <a:t>Communication</a:t>
+              </a:r>
+              <a:endParaRPr lang="es-ES" sz="1200" dirty="0"/>
+            </a:p>
+          </p:txBody>
+        </p:sp>
+      </p:grpSp>
+      <p:grpSp>
+        <p:nvGrpSpPr>
+          <p:cNvPr id="54" name="53 Grupo"/>
+          <p:cNvGrpSpPr/>
+          <p:nvPr/>
+        </p:nvGrpSpPr>
+        <p:grpSpPr>
+          <a:xfrm>
+            <a:off x="5357818" y="2857496"/>
+            <a:ext cx="1380795" cy="785818"/>
+            <a:chOff x="5357818" y="2857496"/>
+            <a:chExt cx="1380795" cy="785818"/>
+          </a:xfrm>
+        </p:grpSpPr>
+        <p:cxnSp>
+          <p:nvCxnSpPr>
+            <p:cNvPr id="51" name="50 Conector recto de flecha"/>
+            <p:cNvCxnSpPr/>
+            <p:nvPr/>
+          </p:nvCxnSpPr>
+          <p:spPr>
+            <a:xfrm>
+              <a:off x="5429256" y="3000372"/>
+              <a:ext cx="1143008" cy="500066"/>
+            </a:xfrm>
+            <a:prstGeom prst="straightConnector1">
+              <a:avLst/>
+            </a:prstGeom>
+            <a:ln w="25400">
+              <a:solidFill>
+                <a:schemeClr val="tx1"/>
+              </a:solidFill>
+              <a:tailEnd type="triangle"/>
+            </a:ln>
+          </p:spPr>
+          <p:style>
+            <a:lnRef idx="1">
+              <a:schemeClr val="accent1"/>
+            </a:lnRef>
+            <a:fillRef idx="0">
+              <a:schemeClr val="accent1"/>
+            </a:fillRef>
+            <a:effectRef idx="0">
+              <a:schemeClr val="accent1"/>
+            </a:effectRef>
+            <a:fontRef idx="minor">
+              <a:schemeClr val="tx1"/>
+            </a:fontRef>
+          </p:style>
+        </p:cxnSp>
+        <p:cxnSp>
+          <p:nvCxnSpPr>
+            <p:cNvPr id="52" name="51 Conector recto de flecha"/>
+            <p:cNvCxnSpPr/>
+            <p:nvPr/>
+          </p:nvCxnSpPr>
+          <p:spPr>
+            <a:xfrm flipH="1" flipV="1">
+              <a:off x="5357818" y="3143248"/>
+              <a:ext cx="1143008" cy="500066"/>
+            </a:xfrm>
+            <a:prstGeom prst="straightConnector1">
+              <a:avLst/>
+            </a:prstGeom>
+            <a:ln w="25400">
+              <a:solidFill>
+                <a:schemeClr val="tx1"/>
+              </a:solidFill>
+              <a:tailEnd type="triangle"/>
+            </a:ln>
+          </p:spPr>
+          <p:style>
+            <a:lnRef idx="1">
+              <a:schemeClr val="accent1"/>
+            </a:lnRef>
+            <a:fillRef idx="0">
+              <a:schemeClr val="accent1"/>
+            </a:fillRef>
+            <a:effectRef idx="0">
+              <a:schemeClr val="accent1"/>
+            </a:effectRef>
+            <a:fontRef idx="minor">
+              <a:schemeClr val="tx1"/>
+            </a:fontRef>
+          </p:style>
+        </p:cxnSp>
+        <p:sp>
+          <p:nvSpPr>
+            <p:cNvPr id="53" name="52 CuadroTexto"/>
+            <p:cNvSpPr txBox="1"/>
+            <p:nvPr/>
+          </p:nvSpPr>
+          <p:spPr>
+            <a:xfrm>
+              <a:off x="5643570" y="2857496"/>
+              <a:ext cx="1095043" cy="276999"/>
+            </a:xfrm>
+            <a:prstGeom prst="rect">
+              <a:avLst/>
+            </a:prstGeom>
+            <a:noFill/>
+          </p:spPr>
+          <p:txBody>
+            <a:bodyPr wrap="none" rtlCol="0">
+              <a:spAutoFit/>
+            </a:bodyPr>
+            <a:lstStyle/>
+            <a:p>
+              <a:r>
+                <a:rPr lang="es-ES" sz="1200" dirty="0" err="1" smtClean="0"/>
+                <a:t>Communication</a:t>
+              </a:r>
+              <a:endParaRPr lang="es-ES" sz="1200" dirty="0"/>
+            </a:p>
+          </p:txBody>
+        </p:sp>
+      </p:grpSp>
+      <p:sp>
+        <p:nvSpPr>
+          <p:cNvPr id="55" name="54 CuadroTexto"/>
           <p:cNvSpPr txBox="1"/>
           <p:nvPr/>
         </p:nvSpPr>
         <p:spPr>
           <a:xfrm>
-            <a:off x="2786050" y="5357826"/>
-            <a:ext cx="3367397" cy="584775"/>
+            <a:off x="6786578" y="4286256"/>
+            <a:ext cx="1165832" cy="276999"/>
           </a:xfrm>
           <a:prstGeom prst="rect">
             <a:avLst/>
@@ -4462,10 +5890,14 @@
           <a:lstStyle/>
           <a:p>
             <a:r>
-              <a:rPr lang="es-ES" sz="3200" b="1" dirty="0" smtClean="0"/>
-              <a:t>ANIMARLO!!!!!!!!!!!!!!</a:t>
-            </a:r>
-            <a:endParaRPr lang="es-ES" sz="3200" b="1" dirty="0"/>
+              <a:rPr lang="es-ES" sz="1200" dirty="0" smtClean="0"/>
+              <a:t>Data </a:t>
+            </a:r>
+            <a:r>
+              <a:rPr lang="es-ES" sz="1200" dirty="0" err="1" smtClean="0"/>
+              <a:t>processing</a:t>
+            </a:r>
+            <a:endParaRPr lang="es-ES" sz="1200" dirty="0"/>
           </a:p>
         </p:txBody>
       </p:sp>
@@ -4477,9 +5909,332 @@
   <p:timing>
     <p:tnLst>
       <p:par>
-        <p:cTn id="1" dur="indefinite" restart="never" nodeType="tmRoot"/>
+        <p:cTn id="1" dur="indefinite" restart="never" nodeType="tmRoot">
+          <p:childTnLst>
+            <p:seq concurrent="1" nextAc="seek">
+              <p:cTn id="2" dur="indefinite" nodeType="mainSeq">
+                <p:childTnLst>
+                  <p:par>
+                    <p:cTn id="3" fill="hold">
+                      <p:stCondLst>
+                        <p:cond delay="indefinite"/>
+                      </p:stCondLst>
+                      <p:childTnLst>
+                        <p:par>
+                          <p:cTn id="4" fill="hold">
+                            <p:stCondLst>
+                              <p:cond delay="0"/>
+                            </p:stCondLst>
+                            <p:childTnLst>
+                              <p:par>
+                                <p:cTn id="5" presetID="1" presetClass="entr" presetSubtype="0" fill="hold" nodeType="clickEffect">
+                                  <p:stCondLst>
+                                    <p:cond delay="0"/>
+                                  </p:stCondLst>
+                                  <p:childTnLst>
+                                    <p:set>
+                                      <p:cBhvr>
+                                        <p:cTn id="6" dur="1" fill="hold">
+                                          <p:stCondLst>
+                                            <p:cond delay="0"/>
+                                          </p:stCondLst>
+                                        </p:cTn>
+                                        <p:tgtEl>
+                                          <p:spTgt spid="31"/>
+                                        </p:tgtEl>
+                                        <p:attrNameLst>
+                                          <p:attrName>style.visibility</p:attrName>
+                                        </p:attrNameLst>
+                                      </p:cBhvr>
+                                      <p:to>
+                                        <p:strVal val="visible"/>
+                                      </p:to>
+                                    </p:set>
+                                  </p:childTnLst>
+                                </p:cTn>
+                              </p:par>
+                            </p:childTnLst>
+                          </p:cTn>
+                        </p:par>
+                      </p:childTnLst>
+                    </p:cTn>
+                  </p:par>
+                  <p:par>
+                    <p:cTn id="7" fill="hold">
+                      <p:stCondLst>
+                        <p:cond delay="indefinite"/>
+                      </p:stCondLst>
+                      <p:childTnLst>
+                        <p:par>
+                          <p:cTn id="8" fill="hold">
+                            <p:stCondLst>
+                              <p:cond delay="0"/>
+                            </p:stCondLst>
+                            <p:childTnLst>
+                              <p:par>
+                                <p:cTn id="9" presetID="1" presetClass="entr" presetSubtype="0" fill="hold" nodeType="clickEffect">
+                                  <p:stCondLst>
+                                    <p:cond delay="0"/>
+                                  </p:stCondLst>
+                                  <p:childTnLst>
+                                    <p:set>
+                                      <p:cBhvr>
+                                        <p:cTn id="10" dur="1" fill="hold">
+                                          <p:stCondLst>
+                                            <p:cond delay="0"/>
+                                          </p:stCondLst>
+                                        </p:cTn>
+                                        <p:tgtEl>
+                                          <p:spTgt spid="1032"/>
+                                        </p:tgtEl>
+                                        <p:attrNameLst>
+                                          <p:attrName>style.visibility</p:attrName>
+                                        </p:attrNameLst>
+                                      </p:cBhvr>
+                                      <p:to>
+                                        <p:strVal val="visible"/>
+                                      </p:to>
+                                    </p:set>
+                                  </p:childTnLst>
+                                </p:cTn>
+                              </p:par>
+                            </p:childTnLst>
+                          </p:cTn>
+                        </p:par>
+                      </p:childTnLst>
+                    </p:cTn>
+                  </p:par>
+                  <p:par>
+                    <p:cTn id="11" fill="hold">
+                      <p:stCondLst>
+                        <p:cond delay="indefinite"/>
+                      </p:stCondLst>
+                      <p:childTnLst>
+                        <p:par>
+                          <p:cTn id="12" fill="hold">
+                            <p:stCondLst>
+                              <p:cond delay="0"/>
+                            </p:stCondLst>
+                            <p:childTnLst>
+                              <p:par>
+                                <p:cTn id="13" presetID="1" presetClass="entr" presetSubtype="0" fill="hold" nodeType="clickEffect">
+                                  <p:stCondLst>
+                                    <p:cond delay="0"/>
+                                  </p:stCondLst>
+                                  <p:childTnLst>
+                                    <p:set>
+                                      <p:cBhvr>
+                                        <p:cTn id="14" dur="1" fill="hold">
+                                          <p:stCondLst>
+                                            <p:cond delay="0"/>
+                                          </p:stCondLst>
+                                        </p:cTn>
+                                        <p:tgtEl>
+                                          <p:spTgt spid="44"/>
+                                        </p:tgtEl>
+                                        <p:attrNameLst>
+                                          <p:attrName>style.visibility</p:attrName>
+                                        </p:attrNameLst>
+                                      </p:cBhvr>
+                                      <p:to>
+                                        <p:strVal val="visible"/>
+                                      </p:to>
+                                    </p:set>
+                                  </p:childTnLst>
+                                </p:cTn>
+                              </p:par>
+                            </p:childTnLst>
+                          </p:cTn>
+                        </p:par>
+                      </p:childTnLst>
+                    </p:cTn>
+                  </p:par>
+                  <p:par>
+                    <p:cTn id="15" fill="hold">
+                      <p:stCondLst>
+                        <p:cond delay="indefinite"/>
+                      </p:stCondLst>
+                      <p:childTnLst>
+                        <p:par>
+                          <p:cTn id="16" fill="hold">
+                            <p:stCondLst>
+                              <p:cond delay="0"/>
+                            </p:stCondLst>
+                            <p:childTnLst>
+                              <p:par>
+                                <p:cTn id="17" presetID="1" presetClass="entr" presetSubtype="0" fill="hold" nodeType="clickEffect">
+                                  <p:stCondLst>
+                                    <p:cond delay="0"/>
+                                  </p:stCondLst>
+                                  <p:childTnLst>
+                                    <p:set>
+                                      <p:cBhvr>
+                                        <p:cTn id="18" dur="1" fill="hold">
+                                          <p:stCondLst>
+                                            <p:cond delay="0"/>
+                                          </p:stCondLst>
+                                        </p:cTn>
+                                        <p:tgtEl>
+                                          <p:spTgt spid="45"/>
+                                        </p:tgtEl>
+                                        <p:attrNameLst>
+                                          <p:attrName>style.visibility</p:attrName>
+                                        </p:attrNameLst>
+                                      </p:cBhvr>
+                                      <p:to>
+                                        <p:strVal val="visible"/>
+                                      </p:to>
+                                    </p:set>
+                                  </p:childTnLst>
+                                </p:cTn>
+                              </p:par>
+                            </p:childTnLst>
+                          </p:cTn>
+                        </p:par>
+                      </p:childTnLst>
+                    </p:cTn>
+                  </p:par>
+                  <p:par>
+                    <p:cTn id="19" fill="hold">
+                      <p:stCondLst>
+                        <p:cond delay="indefinite"/>
+                      </p:stCondLst>
+                      <p:childTnLst>
+                        <p:par>
+                          <p:cTn id="20" fill="hold">
+                            <p:stCondLst>
+                              <p:cond delay="0"/>
+                            </p:stCondLst>
+                            <p:childTnLst>
+                              <p:par>
+                                <p:cTn id="21" presetID="1" presetClass="entr" presetSubtype="0" fill="hold" nodeType="clickEffect">
+                                  <p:stCondLst>
+                                    <p:cond delay="0"/>
+                                  </p:stCondLst>
+                                  <p:childTnLst>
+                                    <p:set>
+                                      <p:cBhvr>
+                                        <p:cTn id="22" dur="1" fill="hold">
+                                          <p:stCondLst>
+                                            <p:cond delay="0"/>
+                                          </p:stCondLst>
+                                        </p:cTn>
+                                        <p:tgtEl>
+                                          <p:spTgt spid="49"/>
+                                        </p:tgtEl>
+                                        <p:attrNameLst>
+                                          <p:attrName>style.visibility</p:attrName>
+                                        </p:attrNameLst>
+                                      </p:cBhvr>
+                                      <p:to>
+                                        <p:strVal val="visible"/>
+                                      </p:to>
+                                    </p:set>
+                                  </p:childTnLst>
+                                </p:cTn>
+                              </p:par>
+                              <p:par>
+                                <p:cTn id="23" presetID="1" presetClass="entr" presetSubtype="0" fill="hold" nodeType="withEffect">
+                                  <p:stCondLst>
+                                    <p:cond delay="0"/>
+                                  </p:stCondLst>
+                                  <p:childTnLst>
+                                    <p:set>
+                                      <p:cBhvr>
+                                        <p:cTn id="24" dur="1" fill="hold">
+                                          <p:stCondLst>
+                                            <p:cond delay="0"/>
+                                          </p:stCondLst>
+                                        </p:cTn>
+                                        <p:tgtEl>
+                                          <p:spTgt spid="54"/>
+                                        </p:tgtEl>
+                                        <p:attrNameLst>
+                                          <p:attrName>style.visibility</p:attrName>
+                                        </p:attrNameLst>
+                                      </p:cBhvr>
+                                      <p:to>
+                                        <p:strVal val="visible"/>
+                                      </p:to>
+                                    </p:set>
+                                  </p:childTnLst>
+                                </p:cTn>
+                              </p:par>
+                            </p:childTnLst>
+                          </p:cTn>
+                        </p:par>
+                      </p:childTnLst>
+                    </p:cTn>
+                  </p:par>
+                  <p:par>
+                    <p:cTn id="25" fill="hold">
+                      <p:stCondLst>
+                        <p:cond delay="indefinite"/>
+                      </p:stCondLst>
+                      <p:childTnLst>
+                        <p:par>
+                          <p:cTn id="26" fill="hold">
+                            <p:stCondLst>
+                              <p:cond delay="0"/>
+                            </p:stCondLst>
+                            <p:childTnLst>
+                              <p:par>
+                                <p:cTn id="27" presetID="1" presetClass="entr" presetSubtype="0" fill="hold" grpId="0" nodeType="clickEffect">
+                                  <p:stCondLst>
+                                    <p:cond delay="0"/>
+                                  </p:stCondLst>
+                                  <p:childTnLst>
+                                    <p:set>
+                                      <p:cBhvr>
+                                        <p:cTn id="28" dur="1" fill="hold">
+                                          <p:stCondLst>
+                                            <p:cond delay="0"/>
+                                          </p:stCondLst>
+                                        </p:cTn>
+                                        <p:tgtEl>
+                                          <p:spTgt spid="55"/>
+                                        </p:tgtEl>
+                                        <p:attrNameLst>
+                                          <p:attrName>style.visibility</p:attrName>
+                                        </p:attrNameLst>
+                                      </p:cBhvr>
+                                      <p:to>
+                                        <p:strVal val="visible"/>
+                                      </p:to>
+                                    </p:set>
+                                  </p:childTnLst>
+                                </p:cTn>
+                              </p:par>
+                            </p:childTnLst>
+                          </p:cTn>
+                        </p:par>
+                      </p:childTnLst>
+                    </p:cTn>
+                  </p:par>
+                </p:childTnLst>
+              </p:cTn>
+              <p:prevCondLst>
+                <p:cond evt="onPrev" delay="0">
+                  <p:tgtEl>
+                    <p:sldTgt/>
+                  </p:tgtEl>
+                </p:cond>
+              </p:prevCondLst>
+              <p:nextCondLst>
+                <p:cond evt="onNext" delay="0">
+                  <p:tgtEl>
+                    <p:sldTgt/>
+                  </p:tgtEl>
+                </p:cond>
+              </p:nextCondLst>
+            </p:seq>
+          </p:childTnLst>
+        </p:cTn>
       </p:par>
     </p:tnLst>
+    <p:bldLst>
+      <p:bldP spid="55" grpId="0"/>
+    </p:bldLst>
   </p:timing>
 </p:sld>
 </file>
@@ -4914,6 +6669,88 @@
           </a:p>
         </p:txBody>
       </p:sp>
+      <p:sp>
+        <p:nvSpPr>
+          <p:cNvPr id="28" name="27 Flecha abajo"/>
+          <p:cNvSpPr/>
+          <p:nvPr/>
+        </p:nvSpPr>
+        <p:spPr>
+          <a:xfrm>
+            <a:off x="7643834" y="2571744"/>
+            <a:ext cx="571504" cy="1500198"/>
+          </a:xfrm>
+          <a:prstGeom prst="downArrow">
+            <a:avLst/>
+          </a:prstGeom>
+        </p:spPr>
+        <p:style>
+          <a:lnRef idx="2">
+            <a:schemeClr val="accent1">
+              <a:shade val="50000"/>
+            </a:schemeClr>
+          </a:lnRef>
+          <a:fillRef idx="1">
+            <a:schemeClr val="accent1"/>
+          </a:fillRef>
+          <a:effectRef idx="0">
+            <a:schemeClr val="accent1"/>
+          </a:effectRef>
+          <a:fontRef idx="minor">
+            <a:schemeClr val="lt1"/>
+          </a:fontRef>
+        </p:style>
+        <p:txBody>
+          <a:bodyPr vert="vert270" rtlCol="0" anchor="ctr"/>
+          <a:lstStyle/>
+          <a:p>
+            <a:pPr algn="ctr"/>
+            <a:r>
+              <a:rPr lang="es-ES" sz="1400" dirty="0" err="1" smtClean="0"/>
+              <a:t>Fast</a:t>
+            </a:r>
+            <a:r>
+              <a:rPr lang="es-ES" sz="1400" dirty="0" smtClean="0"/>
+              <a:t> </a:t>
+            </a:r>
+            <a:r>
+              <a:rPr lang="es-ES" sz="1400" dirty="0" err="1" smtClean="0"/>
+              <a:t>Comparison</a:t>
+            </a:r>
+            <a:endParaRPr lang="es-ES" sz="1400" dirty="0"/>
+          </a:p>
+        </p:txBody>
+      </p:sp>
+      <p:sp>
+        <p:nvSpPr>
+          <p:cNvPr id="29" name="28 CuadroTexto"/>
+          <p:cNvSpPr txBox="1"/>
+          <p:nvPr/>
+        </p:nvSpPr>
+        <p:spPr>
+          <a:xfrm>
+            <a:off x="7572396" y="4143380"/>
+            <a:ext cx="771365" cy="369332"/>
+          </a:xfrm>
+          <a:prstGeom prst="rect">
+            <a:avLst/>
+          </a:prstGeom>
+          <a:noFill/>
+        </p:spPr>
+        <p:txBody>
+          <a:bodyPr wrap="none" rtlCol="0">
+            <a:spAutoFit/>
+          </a:bodyPr>
+          <a:lstStyle/>
+          <a:p>
+            <a:r>
+              <a:rPr lang="es-ES" dirty="0" smtClean="0"/>
+              <a:t>Green</a:t>
+            </a:r>
+            <a:endParaRPr lang="es-ES" dirty="0"/>
+          </a:p>
+        </p:txBody>
+      </p:sp>
     </p:spTree>
   </p:cSld>
   <p:clrMapOvr>
@@ -5124,6 +6961,96 @@
                       </p:childTnLst>
                     </p:cTn>
                   </p:par>
+                  <p:par>
+                    <p:cTn id="20" fill="hold">
+                      <p:stCondLst>
+                        <p:cond delay="indefinite"/>
+                      </p:stCondLst>
+                      <p:childTnLst>
+                        <p:par>
+                          <p:cTn id="21" fill="hold">
+                            <p:stCondLst>
+                              <p:cond delay="0"/>
+                            </p:stCondLst>
+                            <p:childTnLst>
+                              <p:par>
+                                <p:cTn id="22" presetID="1" presetClass="entr" presetSubtype="0" fill="hold" grpId="0" nodeType="clickEffect">
+                                  <p:stCondLst>
+                                    <p:cond delay="0"/>
+                                  </p:stCondLst>
+                                  <p:childTnLst>
+                                    <p:set>
+                                      <p:cBhvr>
+                                        <p:cTn id="23" dur="1" fill="hold">
+                                          <p:stCondLst>
+                                            <p:cond delay="0"/>
+                                          </p:stCondLst>
+                                        </p:cTn>
+                                        <p:tgtEl>
+                                          <p:spTgt spid="28"/>
+                                        </p:tgtEl>
+                                        <p:attrNameLst>
+                                          <p:attrName>style.visibility</p:attrName>
+                                        </p:attrNameLst>
+                                      </p:cBhvr>
+                                      <p:to>
+                                        <p:strVal val="visible"/>
+                                      </p:to>
+                                    </p:set>
+                                  </p:childTnLst>
+                                </p:cTn>
+                              </p:par>
+                            </p:childTnLst>
+                          </p:cTn>
+                        </p:par>
+                      </p:childTnLst>
+                    </p:cTn>
+                  </p:par>
+                  <p:par>
+                    <p:cTn id="24" fill="hold">
+                      <p:stCondLst>
+                        <p:cond delay="indefinite"/>
+                      </p:stCondLst>
+                      <p:childTnLst>
+                        <p:par>
+                          <p:cTn id="25" fill="hold">
+                            <p:stCondLst>
+                              <p:cond delay="0"/>
+                            </p:stCondLst>
+                            <p:childTnLst>
+                              <p:par>
+                                <p:cTn id="26" presetID="1" presetClass="entr" presetSubtype="0" fill="hold" grpId="0" nodeType="clickEffect">
+                                  <p:stCondLst>
+                                    <p:cond delay="0"/>
+                                  </p:stCondLst>
+                                  <p:childTnLst>
+                                    <p:set>
+                                      <p:cBhvr>
+                                        <p:cTn id="27" dur="1" fill="hold">
+                                          <p:stCondLst>
+                                            <p:cond delay="0"/>
+                                          </p:stCondLst>
+                                        </p:cTn>
+                                        <p:tgtEl>
+                                          <p:spTgt spid="29"/>
+                                        </p:tgtEl>
+                                        <p:attrNameLst>
+                                          <p:attrName>style.visibility</p:attrName>
+                                        </p:attrNameLst>
+                                      </p:cBhvr>
+                                      <p:to>
+                                        <p:strVal val="visible"/>
+                                      </p:to>
+                                    </p:set>
+                                  </p:childTnLst>
+                                </p:cTn>
+                              </p:par>
+                            </p:childTnLst>
+                          </p:cTn>
+                        </p:par>
+                      </p:childTnLst>
+                    </p:cTn>
+                  </p:par>
                 </p:childTnLst>
               </p:cTn>
               <p:prevCondLst>
@@ -5148,6 +7075,8 @@
     <p:bldLst>
       <p:bldP spid="26" grpId="0"/>
       <p:bldP spid="27" grpId="0"/>
+      <p:bldP spid="28" grpId="0" animBg="1"/>
+      <p:bldP spid="29" grpId="0"/>
     </p:bldLst>
   </p:timing>
 </p:sld>
@@ -5195,132 +7124,162 @@
           </a:p>
         </p:txBody>
       </p:sp>
-      <p:pic>
-        <p:nvPicPr>
-          <p:cNvPr id="3074" name="Picture 2"/>
-          <p:cNvPicPr>
-            <a:picLocks noChangeAspect="1" noChangeArrowheads="1"/>
-          </p:cNvPicPr>
+      <p:grpSp>
+        <p:nvGrpSpPr>
+          <p:cNvPr id="9" name="8 Grupo"/>
+          <p:cNvGrpSpPr/>
           <p:nvPr/>
-        </p:nvPicPr>
-        <p:blipFill>
-          <a:blip r:embed="rId2"/>
-          <a:srcRect/>
-          <a:stretch>
-            <a:fillRect/>
-          </a:stretch>
-        </p:blipFill>
-        <p:spPr bwMode="auto">
+        </p:nvGrpSpPr>
+        <p:grpSpPr>
           <a:xfrm>
-            <a:off x="428596" y="2285992"/>
-            <a:ext cx="3596882" cy="2714628"/>
+            <a:off x="428596" y="1714488"/>
+            <a:ext cx="3596882" cy="3286132"/>
+            <a:chOff x="428596" y="1714488"/>
+            <a:chExt cx="3596882" cy="3286132"/>
           </a:xfrm>
-          <a:prstGeom prst="rect">
-            <a:avLst/>
-          </a:prstGeom>
-          <a:noFill/>
-          <a:ln w="9525">
+        </p:grpSpPr>
+        <p:pic>
+          <p:nvPicPr>
+            <p:cNvPr id="3074" name="Picture 2"/>
+            <p:cNvPicPr>
+              <a:picLocks noChangeAspect="1" noChangeArrowheads="1"/>
+            </p:cNvPicPr>
+            <p:nvPr/>
+          </p:nvPicPr>
+          <p:blipFill>
+            <a:blip r:embed="rId3"/>
+            <a:srcRect/>
+            <a:stretch>
+              <a:fillRect/>
+            </a:stretch>
+          </p:blipFill>
+          <p:spPr bwMode="auto">
+            <a:xfrm>
+              <a:off x="428596" y="2285992"/>
+              <a:ext cx="3596882" cy="2714628"/>
+            </a:xfrm>
+            <a:prstGeom prst="rect">
+              <a:avLst/>
+            </a:prstGeom>
             <a:noFill/>
-            <a:miter lim="800000"/>
-            <a:headEnd/>
-            <a:tailEnd/>
-          </a:ln>
-          <a:effectLst/>
-        </p:spPr>
-      </p:pic>
-      <p:pic>
-        <p:nvPicPr>
-          <p:cNvPr id="3075" name="Picture 3"/>
-          <p:cNvPicPr>
-            <a:picLocks noChangeAspect="1" noChangeArrowheads="1"/>
-          </p:cNvPicPr>
+            <a:ln w="9525">
+              <a:noFill/>
+              <a:miter lim="800000"/>
+              <a:headEnd/>
+              <a:tailEnd/>
+            </a:ln>
+            <a:effectLst/>
+          </p:spPr>
+        </p:pic>
+        <p:sp>
+          <p:nvSpPr>
+            <p:cNvPr id="6" name="5 CuadroTexto"/>
+            <p:cNvSpPr txBox="1"/>
+            <p:nvPr/>
+          </p:nvSpPr>
+          <p:spPr>
+            <a:xfrm>
+              <a:off x="1643042" y="1714488"/>
+              <a:ext cx="917239" cy="369332"/>
+            </a:xfrm>
+            <a:prstGeom prst="rect">
+              <a:avLst/>
+            </a:prstGeom>
+            <a:noFill/>
+          </p:spPr>
+          <p:txBody>
+            <a:bodyPr wrap="none" rtlCol="0">
+              <a:spAutoFit/>
+            </a:bodyPr>
+            <a:lstStyle/>
+            <a:p>
+              <a:r>
+                <a:rPr lang="es-ES" dirty="0" smtClean="0"/>
+                <a:t>Original</a:t>
+              </a:r>
+              <a:endParaRPr lang="es-ES" dirty="0"/>
+            </a:p>
+          </p:txBody>
+        </p:sp>
+      </p:grpSp>
+      <p:grpSp>
+        <p:nvGrpSpPr>
+          <p:cNvPr id="10" name="9 Grupo"/>
+          <p:cNvGrpSpPr/>
           <p:nvPr/>
-        </p:nvPicPr>
-        <p:blipFill>
-          <a:blip r:embed="rId3"/>
-          <a:srcRect/>
-          <a:stretch>
-            <a:fillRect/>
-          </a:stretch>
-        </p:blipFill>
-        <p:spPr bwMode="auto">
+        </p:nvGrpSpPr>
+        <p:grpSpPr>
           <a:xfrm>
-            <a:off x="4572000" y="2285992"/>
-            <a:ext cx="3600454" cy="2717324"/>
+            <a:off x="4572000" y="1714488"/>
+            <a:ext cx="3600454" cy="3288828"/>
+            <a:chOff x="4572000" y="1714488"/>
+            <a:chExt cx="3600454" cy="3288828"/>
           </a:xfrm>
-          <a:prstGeom prst="rect">
-            <a:avLst/>
-          </a:prstGeom>
-          <a:noFill/>
-          <a:ln w="9525">
+        </p:grpSpPr>
+        <p:pic>
+          <p:nvPicPr>
+            <p:cNvPr id="3075" name="Picture 3"/>
+            <p:cNvPicPr>
+              <a:picLocks noChangeAspect="1" noChangeArrowheads="1"/>
+            </p:cNvPicPr>
+            <p:nvPr/>
+          </p:nvPicPr>
+          <p:blipFill>
+            <a:blip r:embed="rId4"/>
+            <a:srcRect/>
+            <a:stretch>
+              <a:fillRect/>
+            </a:stretch>
+          </p:blipFill>
+          <p:spPr bwMode="auto">
+            <a:xfrm>
+              <a:off x="4572000" y="2285992"/>
+              <a:ext cx="3600454" cy="2717324"/>
+            </a:xfrm>
+            <a:prstGeom prst="rect">
+              <a:avLst/>
+            </a:prstGeom>
             <a:noFill/>
-            <a:miter lim="800000"/>
-            <a:headEnd/>
-            <a:tailEnd/>
-          </a:ln>
-          <a:effectLst/>
-        </p:spPr>
-      </p:pic>
-      <p:sp>
-        <p:nvSpPr>
-          <p:cNvPr id="6" name="5 CuadroTexto"/>
-          <p:cNvSpPr txBox="1"/>
-          <p:nvPr/>
-        </p:nvSpPr>
-        <p:spPr>
-          <a:xfrm>
-            <a:off x="1643042" y="1785926"/>
-            <a:ext cx="917239" cy="369332"/>
-          </a:xfrm>
-          <a:prstGeom prst="rect">
-            <a:avLst/>
-          </a:prstGeom>
-          <a:noFill/>
-        </p:spPr>
-        <p:txBody>
-          <a:bodyPr wrap="none" rtlCol="0">
-            <a:spAutoFit/>
-          </a:bodyPr>
-          <a:lstStyle/>
-          <a:p>
-            <a:r>
-              <a:rPr lang="es-ES" dirty="0" smtClean="0"/>
-              <a:t>Original</a:t>
-            </a:r>
-            <a:endParaRPr lang="es-ES" dirty="0"/>
-          </a:p>
-        </p:txBody>
-      </p:sp>
-      <p:sp>
-        <p:nvSpPr>
-          <p:cNvPr id="8" name="7 CuadroTexto"/>
-          <p:cNvSpPr txBox="1"/>
-          <p:nvPr/>
-        </p:nvSpPr>
-        <p:spPr>
-          <a:xfrm>
-            <a:off x="5643570" y="1857364"/>
-            <a:ext cx="1351524" cy="369332"/>
-          </a:xfrm>
-          <a:prstGeom prst="rect">
-            <a:avLst/>
-          </a:prstGeom>
-          <a:noFill/>
-        </p:spPr>
-        <p:txBody>
-          <a:bodyPr wrap="none" rtlCol="0">
-            <a:spAutoFit/>
-          </a:bodyPr>
-          <a:lstStyle/>
-          <a:p>
-            <a:r>
-              <a:rPr lang="es-ES" dirty="0" smtClean="0"/>
-              <a:t>Segmentada</a:t>
-            </a:r>
-            <a:endParaRPr lang="es-ES" dirty="0"/>
-          </a:p>
-        </p:txBody>
-      </p:sp>
+            <a:ln w="9525">
+              <a:noFill/>
+              <a:miter lim="800000"/>
+              <a:headEnd/>
+              <a:tailEnd/>
+            </a:ln>
+            <a:effectLst/>
+          </p:spPr>
+        </p:pic>
+        <p:sp>
+          <p:nvSpPr>
+            <p:cNvPr id="8" name="7 CuadroTexto"/>
+            <p:cNvSpPr txBox="1"/>
+            <p:nvPr/>
+          </p:nvSpPr>
+          <p:spPr>
+            <a:xfrm>
+              <a:off x="5643570" y="1714488"/>
+              <a:ext cx="1351524" cy="369332"/>
+            </a:xfrm>
+            <a:prstGeom prst="rect">
+              <a:avLst/>
+            </a:prstGeom>
+            <a:noFill/>
+          </p:spPr>
+          <p:txBody>
+            <a:bodyPr wrap="none" rtlCol="0">
+              <a:spAutoFit/>
+            </a:bodyPr>
+            <a:lstStyle/>
+            <a:p>
+              <a:r>
+                <a:rPr lang="es-ES" dirty="0" smtClean="0"/>
+                <a:t>Segmentada</a:t>
+              </a:r>
+              <a:endParaRPr lang="es-ES" dirty="0"/>
+            </a:p>
+          </p:txBody>
+        </p:sp>
+      </p:grpSp>
     </p:spTree>
   </p:cSld>
   <p:clrMapOvr>
@@ -5329,7 +7288,136 @@
   <p:timing>
     <p:tnLst>
       <p:par>
-        <p:cTn id="1" dur="indefinite" restart="never" nodeType="tmRoot"/>
+        <p:cTn id="1" dur="indefinite" restart="never" nodeType="tmRoot">
+          <p:childTnLst>
+            <p:seq concurrent="1" nextAc="seek">
+              <p:cTn id="2" dur="indefinite" nodeType="mainSeq">
+                <p:childTnLst>
+                  <p:par>
+                    <p:cTn id="3" fill="hold">
+                      <p:stCondLst>
+                        <p:cond delay="indefinite"/>
+                      </p:stCondLst>
+                      <p:childTnLst>
+                        <p:par>
+                          <p:cTn id="4" fill="hold">
+                            <p:stCondLst>
+                              <p:cond delay="0"/>
+                            </p:stCondLst>
+                            <p:childTnLst>
+                              <p:par>
+                                <p:cTn id="5" presetID="22" presetClass="entr" presetSubtype="8" fill="hold" nodeType="clickEffect">
+                                  <p:stCondLst>
+                                    <p:cond delay="0"/>
+                                  </p:stCondLst>
+                                  <p:childTnLst>
+                                    <p:set>
+                                      <p:cBhvr>
+                                        <p:cTn id="6" dur="1" fill="hold">
+                                          <p:stCondLst>
+                                            <p:cond delay="0"/>
+                                          </p:stCondLst>
+                                        </p:cTn>
+                                        <p:tgtEl>
+                                          <p:spTgt spid="9"/>
+                                        </p:tgtEl>
+                                        <p:attrNameLst>
+                                          <p:attrName>style.visibility</p:attrName>
+                                        </p:attrNameLst>
+                                      </p:cBhvr>
+                                      <p:to>
+                                        <p:strVal val="visible"/>
+                                      </p:to>
+                                    </p:set>
+                                    <p:animEffect transition="in" filter="wipe(left)">
+                                      <p:cBhvr>
+                                        <p:cTn id="7" dur="500"/>
+                                        <p:tgtEl>
+                                          <p:spTgt spid="9"/>
+                                        </p:tgtEl>
+                                      </p:cBhvr>
+                                    </p:animEffect>
+                                  </p:childTnLst>
+                                </p:cTn>
+                              </p:par>
+                            </p:childTnLst>
+                          </p:cTn>
+                        </p:par>
+                      </p:childTnLst>
+                    </p:cTn>
+                  </p:par>
+                  <p:par>
+                    <p:cTn id="8" fill="hold">
+                      <p:stCondLst>
+                        <p:cond delay="indefinite"/>
+                      </p:stCondLst>
+                      <p:childTnLst>
+                        <p:par>
+                          <p:cTn id="9" fill="hold">
+                            <p:stCondLst>
+                              <p:cond delay="0"/>
+                            </p:stCondLst>
+                            <p:childTnLst>
+                              <p:par>
+                                <p:cTn id="10" presetID="22" presetClass="entr" presetSubtype="8" fill="hold" nodeType="clickEffect">
+                                  <p:stCondLst>
+                                    <p:cond delay="0"/>
+                                  </p:stCondLst>
+                                  <p:childTnLst>
+                                    <p:set>
+                                      <p:cBhvr>
+                                        <p:cTn id="11" dur="1" fill="hold">
+                                          <p:stCondLst>
+                                            <p:cond delay="0"/>
+                                          </p:stCondLst>
+                                        </p:cTn>
+                                        <p:tgtEl>
+                                          <p:spTgt spid="10"/>
+                                        </p:tgtEl>
+                                        <p:attrNameLst>
+                                          <p:attrName>style.visibility</p:attrName>
+                                        </p:attrNameLst>
+                                      </p:cBhvr>
+                                      <p:to>
+                                        <p:strVal val="visible"/>
+                                      </p:to>
+                                    </p:set>
+                                    <p:animEffect transition="in" filter="wipe(left)">
+                                      <p:cBhvr>
+                                        <p:cTn id="12" dur="500"/>
+                                        <p:tgtEl>
+                                          <p:spTgt spid="10"/>
+                                        </p:tgtEl>
+                                      </p:cBhvr>
+                                    </p:animEffect>
+                                  </p:childTnLst>
+                                </p:cTn>
+                              </p:par>
+                            </p:childTnLst>
+                          </p:cTn>
+                        </p:par>
+                      </p:childTnLst>
+                    </p:cTn>
+                  </p:par>
+                </p:childTnLst>
+              </p:cTn>
+              <p:prevCondLst>
+                <p:cond evt="onPrev" delay="0">
+                  <p:tgtEl>
+                    <p:sldTgt/>
+                  </p:tgtEl>
+                </p:cond>
+              </p:prevCondLst>
+              <p:nextCondLst>
+                <p:cond evt="onNext" delay="0">
+                  <p:tgtEl>
+                    <p:sldTgt/>
+                  </p:tgtEl>
+                </p:cond>
+              </p:nextCondLst>
+            </p:seq>
+          </p:childTnLst>
+        </p:cTn>
       </p:par>
     </p:tnLst>
   </p:timing>
@@ -5353,6 +7441,222 @@
           <a:chExt cx="0" cy="0"/>
         </a:xfrm>
       </p:grpSpPr>
+      <p:pic>
+        <p:nvPicPr>
+          <p:cNvPr id="12294" name="Picture 6" descr="http://media.engadget.com/img/products/447/9kzv/9kzv-800.jpg"/>
+          <p:cNvPicPr>
+            <a:picLocks noChangeAspect="1" noChangeArrowheads="1"/>
+          </p:cNvPicPr>
+          <p:nvPr/>
+        </p:nvPicPr>
+        <p:blipFill>
+          <a:blip r:embed="rId2" cstate="print"/>
+          <a:srcRect/>
+          <a:stretch>
+            <a:fillRect/>
+          </a:stretch>
+        </p:blipFill>
+        <p:spPr bwMode="auto">
+          <a:xfrm>
+            <a:off x="5214942" y="2786058"/>
+            <a:ext cx="1060435" cy="795326"/>
+          </a:xfrm>
+          <a:prstGeom prst="rect">
+            <a:avLst/>
+          </a:prstGeom>
+          <a:noFill/>
+        </p:spPr>
+      </p:pic>
+      <p:grpSp>
+        <p:nvGrpSpPr>
+          <p:cNvPr id="57" name="56 Grupo"/>
+          <p:cNvGrpSpPr/>
+          <p:nvPr/>
+        </p:nvGrpSpPr>
+        <p:grpSpPr>
+          <a:xfrm>
+            <a:off x="714348" y="2000240"/>
+            <a:ext cx="4929222" cy="1785950"/>
+            <a:chOff x="714348" y="2000240"/>
+            <a:chExt cx="4929222" cy="1785950"/>
+          </a:xfrm>
+        </p:grpSpPr>
+        <p:pic>
+          <p:nvPicPr>
+            <p:cNvPr id="5" name="Picture 10"/>
+            <p:cNvPicPr>
+              <a:picLocks noChangeAspect="1" noChangeArrowheads="1"/>
+            </p:cNvPicPr>
+            <p:nvPr/>
+          </p:nvPicPr>
+          <p:blipFill>
+            <a:blip r:embed="rId3"/>
+            <a:srcRect/>
+            <a:stretch>
+              <a:fillRect/>
+            </a:stretch>
+          </p:blipFill>
+          <p:spPr bwMode="auto">
+            <a:xfrm>
+              <a:off x="714348" y="2000240"/>
+              <a:ext cx="3327506" cy="1785950"/>
+            </a:xfrm>
+            <a:prstGeom prst="rect">
+              <a:avLst/>
+            </a:prstGeom>
+            <a:noFill/>
+            <a:ln w="9525">
+              <a:noFill/>
+              <a:miter lim="800000"/>
+              <a:headEnd/>
+              <a:tailEnd/>
+            </a:ln>
+            <a:effectLst/>
+          </p:spPr>
+        </p:pic>
+        <p:cxnSp>
+          <p:nvCxnSpPr>
+            <p:cNvPr id="51" name="50 Conector recto"/>
+            <p:cNvCxnSpPr/>
+            <p:nvPr/>
+          </p:nvCxnSpPr>
+          <p:spPr>
+            <a:xfrm rot="10800000">
+              <a:off x="4071934" y="2000240"/>
+              <a:ext cx="1500198" cy="1000132"/>
+            </a:xfrm>
+            <a:prstGeom prst="line">
+              <a:avLst/>
+            </a:prstGeom>
+          </p:spPr>
+          <p:style>
+            <a:lnRef idx="1">
+              <a:schemeClr val="accent1"/>
+            </a:lnRef>
+            <a:fillRef idx="0">
+              <a:schemeClr val="accent1"/>
+            </a:fillRef>
+            <a:effectRef idx="0">
+              <a:schemeClr val="accent1"/>
+            </a:effectRef>
+            <a:fontRef idx="minor">
+              <a:schemeClr val="tx1"/>
+            </a:fontRef>
+          </p:style>
+        </p:cxnSp>
+        <p:cxnSp>
+          <p:nvCxnSpPr>
+            <p:cNvPr id="53" name="52 Conector recto"/>
+            <p:cNvCxnSpPr/>
+            <p:nvPr/>
+          </p:nvCxnSpPr>
+          <p:spPr>
+            <a:xfrm rot="10800000" flipV="1">
+              <a:off x="4071934" y="3143248"/>
+              <a:ext cx="1500198" cy="642942"/>
+            </a:xfrm>
+            <a:prstGeom prst="line">
+              <a:avLst/>
+            </a:prstGeom>
+          </p:spPr>
+          <p:style>
+            <a:lnRef idx="1">
+              <a:schemeClr val="accent1"/>
+            </a:lnRef>
+            <a:fillRef idx="0">
+              <a:schemeClr val="accent1"/>
+            </a:fillRef>
+            <a:effectRef idx="0">
+              <a:schemeClr val="accent1"/>
+            </a:effectRef>
+            <a:fontRef idx="minor">
+              <a:schemeClr val="tx1"/>
+            </a:fontRef>
+          </p:style>
+        </p:cxnSp>
+        <p:sp>
+          <p:nvSpPr>
+            <p:cNvPr id="55" name="54 Elipse"/>
+            <p:cNvSpPr/>
+            <p:nvPr/>
+          </p:nvSpPr>
+          <p:spPr>
+            <a:xfrm>
+              <a:off x="5500694" y="3000372"/>
+              <a:ext cx="142876" cy="142876"/>
+            </a:xfrm>
+            <a:prstGeom prst="ellipse">
+              <a:avLst/>
+            </a:prstGeom>
+            <a:noFill/>
+          </p:spPr>
+          <p:style>
+            <a:lnRef idx="2">
+              <a:schemeClr val="accent1">
+                <a:shade val="50000"/>
+              </a:schemeClr>
+            </a:lnRef>
+            <a:fillRef idx="1">
+              <a:schemeClr val="accent1"/>
+            </a:fillRef>
+            <a:effectRef idx="0">
+              <a:schemeClr val="accent1"/>
+            </a:effectRef>
+            <a:fontRef idx="minor">
+              <a:schemeClr val="lt1"/>
+            </a:fontRef>
+          </p:style>
+          <p:txBody>
+            <a:bodyPr rtlCol="0" anchor="ctr"/>
+            <a:lstStyle/>
+            <a:p>
+              <a:pPr algn="ctr"/>
+              <a:endParaRPr lang="es-ES"/>
+            </a:p>
+          </p:txBody>
+        </p:sp>
+        <p:sp>
+          <p:nvSpPr>
+            <p:cNvPr id="56" name="55 Rectángulo"/>
+            <p:cNvSpPr/>
+            <p:nvPr/>
+          </p:nvSpPr>
+          <p:spPr>
+            <a:xfrm>
+              <a:off x="714348" y="2000240"/>
+              <a:ext cx="3357586" cy="1785950"/>
+            </a:xfrm>
+            <a:prstGeom prst="rect">
+              <a:avLst/>
+            </a:prstGeom>
+            <a:noFill/>
+          </p:spPr>
+          <p:style>
+            <a:lnRef idx="2">
+              <a:schemeClr val="accent1">
+                <a:shade val="50000"/>
+              </a:schemeClr>
+            </a:lnRef>
+            <a:fillRef idx="1">
+              <a:schemeClr val="accent1"/>
+            </a:fillRef>
+            <a:effectRef idx="0">
+              <a:schemeClr val="accent1"/>
+            </a:effectRef>
+            <a:fontRef idx="minor">
+              <a:schemeClr val="lt1"/>
+            </a:fontRef>
+          </p:style>
+          <p:txBody>
+            <a:bodyPr rtlCol="0" anchor="ctr"/>
+            <a:lstStyle/>
+            <a:p>
+              <a:pPr algn="ctr"/>
+              <a:endParaRPr lang="es-ES"/>
+            </a:p>
+          </p:txBody>
+        </p:sp>
+      </p:grpSp>
       <p:sp>
         <p:nvSpPr>
           <p:cNvPr id="2" name="1 Título"/>
@@ -5370,31 +7674,816 @@
           <a:p>
             <a:r>
               <a:rPr lang="es-ES" dirty="0" smtClean="0"/>
-              <a:t>Comunicación</a:t>
+              <a:t>Estimación</a:t>
             </a:r>
             <a:endParaRPr lang="es-ES" dirty="0"/>
           </a:p>
         </p:txBody>
       </p:sp>
-      <p:sp>
-        <p:nvSpPr>
-          <p:cNvPr id="3" name="2 Marcador de contenido"/>
-          <p:cNvSpPr>
-            <a:spLocks noGrp="1"/>
-          </p:cNvSpPr>
-          <p:nvPr>
-            <p:ph sz="quarter" idx="1"/>
-          </p:nvPr>
-        </p:nvSpPr>
-        <p:spPr/>
-        <p:txBody>
-          <a:bodyPr/>
+      <p:grpSp>
+        <p:nvGrpSpPr>
+          <p:cNvPr id="44" name="43 Grupo"/>
+          <p:cNvGrpSpPr/>
+          <p:nvPr/>
+        </p:nvGrpSpPr>
+        <p:grpSpPr>
+          <a:xfrm>
+            <a:off x="2214546" y="2143116"/>
+            <a:ext cx="857256" cy="1500198"/>
+            <a:chOff x="2214546" y="2143116"/>
+            <a:chExt cx="857256" cy="1500198"/>
+          </a:xfrm>
+        </p:grpSpPr>
+        <p:sp>
+          <p:nvSpPr>
+            <p:cNvPr id="8" name="7 Rectángulo"/>
+            <p:cNvSpPr/>
+            <p:nvPr/>
+          </p:nvSpPr>
+          <p:spPr>
+            <a:xfrm>
+              <a:off x="2357422" y="3429000"/>
+              <a:ext cx="214314" cy="214314"/>
+            </a:xfrm>
+            <a:prstGeom prst="rect">
+              <a:avLst/>
+            </a:prstGeom>
+            <a:noFill/>
+            <a:ln>
+              <a:solidFill>
+                <a:srgbClr val="FF0000"/>
+              </a:solidFill>
+            </a:ln>
+          </p:spPr>
+          <p:style>
+            <a:lnRef idx="2">
+              <a:schemeClr val="accent1">
+                <a:shade val="50000"/>
+              </a:schemeClr>
+            </a:lnRef>
+            <a:fillRef idx="1">
+              <a:schemeClr val="accent1"/>
+            </a:fillRef>
+            <a:effectRef idx="0">
+              <a:schemeClr val="accent1"/>
+            </a:effectRef>
+            <a:fontRef idx="minor">
+              <a:schemeClr val="lt1"/>
+            </a:fontRef>
+          </p:style>
+          <p:txBody>
+            <a:bodyPr rtlCol="0" anchor="ctr"/>
+            <a:lstStyle/>
+            <a:p>
+              <a:pPr algn="ctr"/>
+              <a:endParaRPr lang="es-ES"/>
+            </a:p>
+          </p:txBody>
+        </p:sp>
+        <p:sp>
+          <p:nvSpPr>
+            <p:cNvPr id="9" name="8 Rectángulo"/>
+            <p:cNvSpPr/>
+            <p:nvPr/>
+          </p:nvSpPr>
+          <p:spPr>
+            <a:xfrm>
+              <a:off x="2643174" y="2357430"/>
+              <a:ext cx="71438" cy="71438"/>
+            </a:xfrm>
+            <a:prstGeom prst="rect">
+              <a:avLst/>
+            </a:prstGeom>
+            <a:noFill/>
+            <a:ln>
+              <a:solidFill>
+                <a:srgbClr val="FF0000"/>
+              </a:solidFill>
+            </a:ln>
+          </p:spPr>
+          <p:style>
+            <a:lnRef idx="2">
+              <a:schemeClr val="accent1">
+                <a:shade val="50000"/>
+              </a:schemeClr>
+            </a:lnRef>
+            <a:fillRef idx="1">
+              <a:schemeClr val="accent1"/>
+            </a:fillRef>
+            <a:effectRef idx="0">
+              <a:schemeClr val="accent1"/>
+            </a:effectRef>
+            <a:fontRef idx="minor">
+              <a:schemeClr val="lt1"/>
+            </a:fontRef>
+          </p:style>
+          <p:txBody>
+            <a:bodyPr rtlCol="0" anchor="ctr"/>
+            <a:lstStyle/>
+            <a:p>
+              <a:pPr algn="ctr"/>
+              <a:endParaRPr lang="es-ES"/>
+            </a:p>
+          </p:txBody>
+        </p:sp>
+        <p:sp>
+          <p:nvSpPr>
+            <p:cNvPr id="10" name="9 Rectángulo"/>
+            <p:cNvSpPr/>
+            <p:nvPr/>
+          </p:nvSpPr>
+          <p:spPr>
+            <a:xfrm>
+              <a:off x="2428860" y="2143116"/>
+              <a:ext cx="142876" cy="71438"/>
+            </a:xfrm>
+            <a:prstGeom prst="rect">
+              <a:avLst/>
+            </a:prstGeom>
+            <a:noFill/>
+            <a:ln>
+              <a:solidFill>
+                <a:srgbClr val="FF0000"/>
+              </a:solidFill>
+            </a:ln>
+          </p:spPr>
+          <p:style>
+            <a:lnRef idx="2">
+              <a:schemeClr val="accent1">
+                <a:shade val="50000"/>
+              </a:schemeClr>
+            </a:lnRef>
+            <a:fillRef idx="1">
+              <a:schemeClr val="accent1"/>
+            </a:fillRef>
+            <a:effectRef idx="0">
+              <a:schemeClr val="accent1"/>
+            </a:effectRef>
+            <a:fontRef idx="minor">
+              <a:schemeClr val="lt1"/>
+            </a:fontRef>
+          </p:style>
+          <p:txBody>
+            <a:bodyPr rtlCol="0" anchor="ctr"/>
+            <a:lstStyle/>
+            <a:p>
+              <a:pPr algn="ctr"/>
+              <a:endParaRPr lang="es-ES"/>
+            </a:p>
+          </p:txBody>
+        </p:sp>
+        <p:sp>
+          <p:nvSpPr>
+            <p:cNvPr id="11" name="10 Rectángulo"/>
+            <p:cNvSpPr/>
+            <p:nvPr/>
+          </p:nvSpPr>
+          <p:spPr>
+            <a:xfrm>
+              <a:off x="3000364" y="2357430"/>
+              <a:ext cx="71438" cy="71438"/>
+            </a:xfrm>
+            <a:prstGeom prst="rect">
+              <a:avLst/>
+            </a:prstGeom>
+            <a:noFill/>
+            <a:ln>
+              <a:solidFill>
+                <a:srgbClr val="FF0000"/>
+              </a:solidFill>
+            </a:ln>
+          </p:spPr>
+          <p:style>
+            <a:lnRef idx="2">
+              <a:schemeClr val="accent1">
+                <a:shade val="50000"/>
+              </a:schemeClr>
+            </a:lnRef>
+            <a:fillRef idx="1">
+              <a:schemeClr val="accent1"/>
+            </a:fillRef>
+            <a:effectRef idx="0">
+              <a:schemeClr val="accent1"/>
+            </a:effectRef>
+            <a:fontRef idx="minor">
+              <a:schemeClr val="lt1"/>
+            </a:fontRef>
+          </p:style>
+          <p:txBody>
+            <a:bodyPr rtlCol="0" anchor="ctr"/>
+            <a:lstStyle/>
+            <a:p>
+              <a:pPr algn="ctr"/>
+              <a:endParaRPr lang="es-ES"/>
+            </a:p>
+          </p:txBody>
+        </p:sp>
+        <p:sp>
+          <p:nvSpPr>
+            <p:cNvPr id="13" name="12 Rectángulo"/>
+            <p:cNvSpPr/>
+            <p:nvPr/>
+          </p:nvSpPr>
+          <p:spPr>
+            <a:xfrm>
+              <a:off x="2214546" y="2143116"/>
+              <a:ext cx="71438" cy="71438"/>
+            </a:xfrm>
+            <a:prstGeom prst="rect">
+              <a:avLst/>
+            </a:prstGeom>
+            <a:noFill/>
+            <a:ln>
+              <a:solidFill>
+                <a:srgbClr val="FF0000"/>
+              </a:solidFill>
+            </a:ln>
+          </p:spPr>
+          <p:style>
+            <a:lnRef idx="2">
+              <a:schemeClr val="accent1">
+                <a:shade val="50000"/>
+              </a:schemeClr>
+            </a:lnRef>
+            <a:fillRef idx="1">
+              <a:schemeClr val="accent1"/>
+            </a:fillRef>
+            <a:effectRef idx="0">
+              <a:schemeClr val="accent1"/>
+            </a:effectRef>
+            <a:fontRef idx="minor">
+              <a:schemeClr val="lt1"/>
+            </a:fontRef>
+          </p:style>
+          <p:txBody>
+            <a:bodyPr rtlCol="0" anchor="ctr"/>
+            <a:lstStyle/>
+            <a:p>
+              <a:pPr algn="ctr"/>
+              <a:endParaRPr lang="es-ES"/>
+            </a:p>
+          </p:txBody>
+        </p:sp>
+      </p:grpSp>
+      <p:grpSp>
+        <p:nvGrpSpPr>
+          <p:cNvPr id="45" name="44 Grupo"/>
+          <p:cNvGrpSpPr/>
+          <p:nvPr/>
+        </p:nvGrpSpPr>
+        <p:grpSpPr>
+          <a:xfrm>
+            <a:off x="2250264" y="1857364"/>
+            <a:ext cx="3662305" cy="535785"/>
+            <a:chOff x="2250264" y="1857364"/>
+            <a:chExt cx="3662305" cy="535785"/>
+          </a:xfrm>
+        </p:grpSpPr>
+        <p:grpSp>
+          <p:nvGrpSpPr>
+            <p:cNvPr id="22" name="21 Grupo"/>
+            <p:cNvGrpSpPr/>
+            <p:nvPr/>
+          </p:nvGrpSpPr>
+          <p:grpSpPr>
+            <a:xfrm>
+              <a:off x="2250264" y="2042030"/>
+              <a:ext cx="2964678" cy="351119"/>
+              <a:chOff x="2250264" y="2042030"/>
+              <a:chExt cx="2964678" cy="351119"/>
+            </a:xfrm>
+          </p:grpSpPr>
+          <p:cxnSp>
+            <p:nvCxnSpPr>
+              <p:cNvPr id="15" name="14 Conector recto de flecha"/>
+              <p:cNvCxnSpPr>
+                <a:stCxn id="13" idx="0"/>
+                <a:endCxn id="25" idx="1"/>
+              </p:cNvCxnSpPr>
+              <p:nvPr/>
+            </p:nvCxnSpPr>
+            <p:spPr>
+              <a:xfrm rot="5400000" flipH="1" flipV="1">
+                <a:off x="3682060" y="610235"/>
+                <a:ext cx="101086" cy="2964677"/>
+              </a:xfrm>
+              <a:prstGeom prst="straightConnector1">
+                <a:avLst/>
+              </a:prstGeom>
+              <a:ln>
+                <a:solidFill>
+                  <a:srgbClr val="FF0000"/>
+                </a:solidFill>
+                <a:tailEnd type="triangle"/>
+              </a:ln>
+            </p:spPr>
+            <p:style>
+              <a:lnRef idx="1">
+                <a:schemeClr val="accent1"/>
+              </a:lnRef>
+              <a:fillRef idx="0">
+                <a:schemeClr val="accent1"/>
+              </a:fillRef>
+              <a:effectRef idx="0">
+                <a:schemeClr val="accent1"/>
+              </a:effectRef>
+              <a:fontRef idx="minor">
+                <a:schemeClr val="tx1"/>
+              </a:fontRef>
+            </p:style>
+          </p:cxnSp>
+          <p:cxnSp>
+            <p:nvCxnSpPr>
+              <p:cNvPr id="17" name="16 Conector recto de flecha"/>
+              <p:cNvCxnSpPr>
+                <a:stCxn id="10" idx="3"/>
+                <a:endCxn id="25" idx="1"/>
+              </p:cNvCxnSpPr>
+              <p:nvPr/>
+            </p:nvCxnSpPr>
+            <p:spPr>
+              <a:xfrm flipV="1">
+                <a:off x="2571736" y="2042030"/>
+                <a:ext cx="2643206" cy="136805"/>
+              </a:xfrm>
+              <a:prstGeom prst="straightConnector1">
+                <a:avLst/>
+              </a:prstGeom>
+              <a:ln>
+                <a:solidFill>
+                  <a:srgbClr val="FF0000"/>
+                </a:solidFill>
+                <a:tailEnd type="triangle"/>
+              </a:ln>
+            </p:spPr>
+            <p:style>
+              <a:lnRef idx="1">
+                <a:schemeClr val="accent1"/>
+              </a:lnRef>
+              <a:fillRef idx="0">
+                <a:schemeClr val="accent1"/>
+              </a:fillRef>
+              <a:effectRef idx="0">
+                <a:schemeClr val="accent1"/>
+              </a:effectRef>
+              <a:fontRef idx="minor">
+                <a:schemeClr val="tx1"/>
+              </a:fontRef>
+            </p:style>
+          </p:cxnSp>
+          <p:cxnSp>
+            <p:nvCxnSpPr>
+              <p:cNvPr id="19" name="18 Conector recto de flecha"/>
+              <p:cNvCxnSpPr>
+                <a:stCxn id="9" idx="0"/>
+                <a:endCxn id="25" idx="1"/>
+              </p:cNvCxnSpPr>
+              <p:nvPr/>
+            </p:nvCxnSpPr>
+            <p:spPr>
+              <a:xfrm rot="5400000" flipH="1" flipV="1">
+                <a:off x="3789217" y="931706"/>
+                <a:ext cx="315400" cy="2536049"/>
+              </a:xfrm>
+              <a:prstGeom prst="straightConnector1">
+                <a:avLst/>
+              </a:prstGeom>
+              <a:ln>
+                <a:solidFill>
+                  <a:srgbClr val="FF0000"/>
+                </a:solidFill>
+                <a:tailEnd type="triangle"/>
+              </a:ln>
+            </p:spPr>
+            <p:style>
+              <a:lnRef idx="1">
+                <a:schemeClr val="accent1"/>
+              </a:lnRef>
+              <a:fillRef idx="0">
+                <a:schemeClr val="accent1"/>
+              </a:fillRef>
+              <a:effectRef idx="0">
+                <a:schemeClr val="accent1"/>
+              </a:effectRef>
+              <a:fontRef idx="minor">
+                <a:schemeClr val="tx1"/>
+              </a:fontRef>
+            </p:style>
+          </p:cxnSp>
+          <p:cxnSp>
+            <p:nvCxnSpPr>
+              <p:cNvPr id="21" name="20 Conector recto de flecha"/>
+              <p:cNvCxnSpPr>
+                <a:stCxn id="11" idx="3"/>
+                <a:endCxn id="25" idx="1"/>
+              </p:cNvCxnSpPr>
+              <p:nvPr/>
+            </p:nvCxnSpPr>
+            <p:spPr>
+              <a:xfrm flipV="1">
+                <a:off x="3071802" y="2042030"/>
+                <a:ext cx="2143140" cy="351119"/>
+              </a:xfrm>
+              <a:prstGeom prst="straightConnector1">
+                <a:avLst/>
+              </a:prstGeom>
+              <a:ln>
+                <a:solidFill>
+                  <a:srgbClr val="FF0000"/>
+                </a:solidFill>
+                <a:tailEnd type="triangle"/>
+              </a:ln>
+            </p:spPr>
+            <p:style>
+              <a:lnRef idx="1">
+                <a:schemeClr val="accent1"/>
+              </a:lnRef>
+              <a:fillRef idx="0">
+                <a:schemeClr val="accent1"/>
+              </a:fillRef>
+              <a:effectRef idx="0">
+                <a:schemeClr val="accent1"/>
+              </a:effectRef>
+              <a:fontRef idx="minor">
+                <a:schemeClr val="tx1"/>
+              </a:fontRef>
+            </p:style>
+          </p:cxnSp>
+        </p:grpSp>
+        <p:sp>
+          <p:nvSpPr>
+            <p:cNvPr id="25" name="24 CuadroTexto"/>
+            <p:cNvSpPr txBox="1"/>
+            <p:nvPr/>
+          </p:nvSpPr>
+          <p:spPr>
+            <a:xfrm>
+              <a:off x="5214942" y="1857364"/>
+              <a:ext cx="697627" cy="369332"/>
+            </a:xfrm>
+            <a:prstGeom prst="rect">
+              <a:avLst/>
+            </a:prstGeom>
+            <a:noFill/>
+            <a:ln w="6350">
+              <a:solidFill>
+                <a:schemeClr val="tx1"/>
+              </a:solidFill>
+            </a:ln>
+          </p:spPr>
+          <p:txBody>
+            <a:bodyPr wrap="none" rtlCol="0">
+              <a:spAutoFit/>
+            </a:bodyPr>
+            <a:lstStyle/>
+            <a:p>
+              <a:r>
+                <a:rPr lang="es-ES" dirty="0" err="1" smtClean="0"/>
+                <a:t>Noise</a:t>
+              </a:r>
+              <a:endParaRPr lang="es-ES" dirty="0"/>
+            </a:p>
+          </p:txBody>
+        </p:sp>
+      </p:grpSp>
+      <p:grpSp>
+        <p:nvGrpSpPr>
+          <p:cNvPr id="46" name="45 Grupo"/>
+          <p:cNvGrpSpPr/>
+          <p:nvPr/>
+        </p:nvGrpSpPr>
+        <p:grpSpPr>
+          <a:xfrm>
+            <a:off x="1142976" y="3643315"/>
+            <a:ext cx="2452916" cy="2066337"/>
+            <a:chOff x="1142976" y="3643315"/>
+            <a:chExt cx="2452916" cy="2066337"/>
+          </a:xfrm>
+        </p:grpSpPr>
+        <p:sp>
+          <p:nvSpPr>
+            <p:cNvPr id="30" name="29 CuadroTexto"/>
+            <p:cNvSpPr txBox="1"/>
+            <p:nvPr/>
+          </p:nvSpPr>
+          <p:spPr>
+            <a:xfrm>
+              <a:off x="1142976" y="4786322"/>
+              <a:ext cx="2452916" cy="923330"/>
+            </a:xfrm>
+            <a:prstGeom prst="rect">
+              <a:avLst/>
+            </a:prstGeom>
+            <a:noFill/>
+            <a:ln>
+              <a:solidFill>
+                <a:schemeClr val="tx1"/>
+              </a:solidFill>
+            </a:ln>
+          </p:spPr>
+          <p:txBody>
+            <a:bodyPr wrap="none" rtlCol="0">
+              <a:spAutoFit/>
+            </a:bodyPr>
+            <a:lstStyle/>
+            <a:p>
+              <a:r>
+                <a:rPr lang="es-ES" dirty="0" err="1" smtClean="0"/>
+                <a:t>Obj</a:t>
+              </a:r>
+              <a:r>
+                <a:rPr lang="es-ES" dirty="0" smtClean="0"/>
+                <a:t>   =	Time</a:t>
+              </a:r>
+            </a:p>
+            <a:p>
+              <a:r>
+                <a:rPr lang="es-ES" dirty="0"/>
+                <a:t>	</a:t>
+              </a:r>
+              <a:r>
+                <a:rPr lang="es-ES" dirty="0" err="1" smtClean="0"/>
+                <a:t>Centroid</a:t>
+              </a:r>
+              <a:endParaRPr lang="es-ES" dirty="0" smtClean="0"/>
+            </a:p>
+            <a:p>
+              <a:r>
+                <a:rPr lang="es-ES" dirty="0"/>
+                <a:t>	</a:t>
+              </a:r>
+              <a:r>
+                <a:rPr lang="es-ES" dirty="0" err="1" smtClean="0"/>
+                <a:t>Bouncing</a:t>
+              </a:r>
+              <a:r>
+                <a:rPr lang="es-ES" dirty="0" smtClean="0"/>
+                <a:t> box </a:t>
+              </a:r>
+              <a:endParaRPr lang="es-ES" dirty="0"/>
+            </a:p>
+          </p:txBody>
+        </p:sp>
+        <p:cxnSp>
+          <p:nvCxnSpPr>
+            <p:cNvPr id="32" name="31 Conector recto de flecha"/>
+            <p:cNvCxnSpPr>
+              <a:stCxn id="8" idx="2"/>
+              <a:endCxn id="30" idx="0"/>
+            </p:cNvCxnSpPr>
+            <p:nvPr/>
+          </p:nvCxnSpPr>
+          <p:spPr>
+            <a:xfrm rot="5400000">
+              <a:off x="1845503" y="4167246"/>
+              <a:ext cx="1143008" cy="95145"/>
+            </a:xfrm>
+            <a:prstGeom prst="straightConnector1">
+              <a:avLst/>
+            </a:prstGeom>
+            <a:ln>
+              <a:solidFill>
+                <a:srgbClr val="FF0000"/>
+              </a:solidFill>
+              <a:tailEnd type="triangle"/>
+            </a:ln>
+          </p:spPr>
+          <p:style>
+            <a:lnRef idx="1">
+              <a:schemeClr val="accent1"/>
+            </a:lnRef>
+            <a:fillRef idx="0">
+              <a:schemeClr val="accent1"/>
+            </a:fillRef>
+            <a:effectRef idx="0">
+              <a:schemeClr val="accent1"/>
+            </a:effectRef>
+            <a:fontRef idx="minor">
+              <a:schemeClr val="tx1"/>
+            </a:fontRef>
+          </p:style>
+        </p:cxnSp>
+      </p:grpSp>
+      <p:sp>
+        <p:nvSpPr>
+          <p:cNvPr id="40" name="39 Flecha derecha"/>
+          <p:cNvSpPr/>
+          <p:nvPr/>
+        </p:nvSpPr>
+        <p:spPr>
+          <a:xfrm>
+            <a:off x="4572000" y="5000636"/>
+            <a:ext cx="1857388" cy="642942"/>
+          </a:xfrm>
+          <a:prstGeom prst="rightArrow">
+            <a:avLst/>
+          </a:prstGeom>
+        </p:spPr>
+        <p:style>
+          <a:lnRef idx="2">
+            <a:schemeClr val="accent1">
+              <a:shade val="50000"/>
+            </a:schemeClr>
+          </a:lnRef>
+          <a:fillRef idx="1">
+            <a:schemeClr val="accent1"/>
+          </a:fillRef>
+          <a:effectRef idx="0">
+            <a:schemeClr val="accent1"/>
+          </a:effectRef>
+          <a:fontRef idx="minor">
+            <a:schemeClr val="lt1"/>
+          </a:fontRef>
+        </p:style>
+        <p:txBody>
+          <a:bodyPr rtlCol="0" anchor="ctr"/>
           <a:lstStyle/>
           <a:p>
-            <a:endParaRPr lang="es-ES"/>
-          </a:p>
-        </p:txBody>
-      </p:sp>
+            <a:pPr algn="ctr"/>
+            <a:r>
+              <a:rPr lang="es-ES" dirty="0" smtClean="0"/>
+              <a:t>EKF</a:t>
+            </a:r>
+            <a:endParaRPr lang="es-ES" dirty="0"/>
+          </a:p>
+        </p:txBody>
+      </p:sp>
+      <p:sp>
+        <p:nvSpPr>
+          <p:cNvPr id="42" name="41 CuadroTexto"/>
+          <p:cNvSpPr txBox="1"/>
+          <p:nvPr/>
+        </p:nvSpPr>
+        <p:spPr>
+          <a:xfrm>
+            <a:off x="6786578" y="5143512"/>
+            <a:ext cx="1803442" cy="369332"/>
+          </a:xfrm>
+          <a:prstGeom prst="rect">
+            <a:avLst/>
+          </a:prstGeom>
+          <a:noFill/>
+          <a:ln w="6350">
+            <a:solidFill>
+              <a:schemeClr val="tx1"/>
+            </a:solidFill>
+          </a:ln>
+        </p:spPr>
+        <p:txBody>
+          <a:bodyPr wrap="none" rtlCol="0">
+            <a:spAutoFit/>
+          </a:bodyPr>
+          <a:lstStyle/>
+          <a:p>
+            <a:r>
+              <a:rPr lang="es-ES" dirty="0" err="1" smtClean="0"/>
+              <a:t>Estimated</a:t>
+            </a:r>
+            <a:r>
+              <a:rPr lang="es-ES" dirty="0" smtClean="0"/>
+              <a:t> Position</a:t>
+            </a:r>
+            <a:endParaRPr lang="es-ES" dirty="0"/>
+          </a:p>
+        </p:txBody>
+      </p:sp>
+      <p:grpSp>
+        <p:nvGrpSpPr>
+          <p:cNvPr id="61" name="60 Grupo"/>
+          <p:cNvGrpSpPr/>
+          <p:nvPr/>
+        </p:nvGrpSpPr>
+        <p:grpSpPr>
+          <a:xfrm>
+            <a:off x="4643438" y="3143248"/>
+            <a:ext cx="3178112" cy="2000264"/>
+            <a:chOff x="4643438" y="3143248"/>
+            <a:chExt cx="3178112" cy="2000264"/>
+          </a:xfrm>
+        </p:grpSpPr>
+        <p:grpSp>
+          <p:nvGrpSpPr>
+            <p:cNvPr id="58" name="57 Grupo"/>
+            <p:cNvGrpSpPr/>
+            <p:nvPr/>
+          </p:nvGrpSpPr>
+          <p:grpSpPr>
+            <a:xfrm>
+              <a:off x="4643438" y="3143248"/>
+              <a:ext cx="3178112" cy="1512340"/>
+              <a:chOff x="4643438" y="3143248"/>
+              <a:chExt cx="3178112" cy="1512340"/>
+            </a:xfrm>
+          </p:grpSpPr>
+          <p:sp>
+            <p:nvSpPr>
+              <p:cNvPr id="43" name="42 CuadroTexto"/>
+              <p:cNvSpPr txBox="1"/>
+              <p:nvPr/>
+            </p:nvSpPr>
+            <p:spPr>
+              <a:xfrm>
+                <a:off x="4643438" y="4286256"/>
+                <a:ext cx="1598707" cy="369332"/>
+              </a:xfrm>
+              <a:prstGeom prst="rect">
+                <a:avLst/>
+              </a:prstGeom>
+              <a:noFill/>
+              <a:ln w="6350">
+                <a:solidFill>
+                  <a:schemeClr val="tx1"/>
+                </a:solidFill>
+              </a:ln>
+            </p:spPr>
+            <p:txBody>
+              <a:bodyPr wrap="square" rtlCol="0">
+                <a:spAutoFit/>
+              </a:bodyPr>
+              <a:lstStyle/>
+              <a:p>
+                <a:r>
+                  <a:rPr lang="es-ES" dirty="0" err="1" smtClean="0"/>
+                  <a:t>System’s</a:t>
+                </a:r>
+                <a:r>
+                  <a:rPr lang="es-ES" dirty="0" smtClean="0"/>
+                  <a:t> </a:t>
+                </a:r>
+                <a:r>
+                  <a:rPr lang="es-ES" dirty="0" err="1" smtClean="0"/>
+                  <a:t>Model</a:t>
+                </a:r>
+                <a:endParaRPr lang="es-ES" dirty="0"/>
+              </a:p>
+            </p:txBody>
+          </p:sp>
+          <p:pic>
+            <p:nvPicPr>
+              <p:cNvPr id="12292" name="Picture 4" descr="http://www.epixea.com/research/dirImg/multi-view-coding-thesis16x.gif"/>
+              <p:cNvPicPr>
+                <a:picLocks noChangeAspect="1" noChangeArrowheads="1"/>
+              </p:cNvPicPr>
+              <p:nvPr/>
+            </p:nvPicPr>
+            <p:blipFill>
+              <a:blip r:embed="rId4"/>
+              <a:srcRect/>
+              <a:stretch>
+                <a:fillRect/>
+              </a:stretch>
+            </p:blipFill>
+            <p:spPr bwMode="auto">
+              <a:xfrm>
+                <a:off x="6572264" y="3143248"/>
+                <a:ext cx="1249286" cy="828673"/>
+              </a:xfrm>
+              <a:prstGeom prst="rect">
+                <a:avLst/>
+              </a:prstGeom>
+              <a:noFill/>
+            </p:spPr>
+          </p:pic>
+        </p:grpSp>
+        <p:cxnSp>
+          <p:nvCxnSpPr>
+            <p:cNvPr id="60" name="59 Conector recto de flecha"/>
+            <p:cNvCxnSpPr>
+              <a:stCxn id="43" idx="2"/>
+            </p:cNvCxnSpPr>
+            <p:nvPr/>
+          </p:nvCxnSpPr>
+          <p:spPr>
+            <a:xfrm rot="5400000">
+              <a:off x="5192062" y="4892782"/>
+              <a:ext cx="487924" cy="13536"/>
+            </a:xfrm>
+            <a:prstGeom prst="straightConnector1">
+              <a:avLst/>
+            </a:prstGeom>
+            <a:ln w="25400">
+              <a:solidFill>
+                <a:schemeClr val="tx1"/>
+              </a:solidFill>
+              <a:tailEnd type="arrow"/>
+            </a:ln>
+          </p:spPr>
+          <p:style>
+            <a:lnRef idx="1">
+              <a:schemeClr val="accent1"/>
+            </a:lnRef>
+            <a:fillRef idx="0">
+              <a:schemeClr val="accent1"/>
+            </a:fillRef>
+            <a:effectRef idx="0">
+              <a:schemeClr val="accent1"/>
+            </a:effectRef>
+            <a:fontRef idx="minor">
+              <a:schemeClr val="tx1"/>
+            </a:fontRef>
+          </p:style>
+        </p:cxnSp>
+      </p:grpSp>
     </p:spTree>
   </p:cSld>
   <p:clrMapOvr>
@@ -5403,9 +8492,351 @@
   <p:timing>
     <p:tnLst>
       <p:par>
-        <p:cTn id="1" dur="indefinite" restart="never" nodeType="tmRoot"/>
+        <p:cTn id="1" dur="indefinite" restart="never" nodeType="tmRoot">
+          <p:childTnLst>
+            <p:seq concurrent="1" nextAc="seek">
+              <p:cTn id="2" dur="indefinite" nodeType="mainSeq">
+                <p:childTnLst>
+                  <p:par>
+                    <p:cTn id="3" fill="hold">
+                      <p:stCondLst>
+                        <p:cond delay="indefinite"/>
+                      </p:stCondLst>
+                      <p:childTnLst>
+                        <p:par>
+                          <p:cTn id="4" fill="hold">
+                            <p:stCondLst>
+                              <p:cond delay="0"/>
+                            </p:stCondLst>
+                            <p:childTnLst>
+                              <p:par>
+                                <p:cTn id="5" presetID="1" presetClass="entr" presetSubtype="0" fill="hold" nodeType="clickEffect">
+                                  <p:stCondLst>
+                                    <p:cond delay="0"/>
+                                  </p:stCondLst>
+                                  <p:childTnLst>
+                                    <p:set>
+                                      <p:cBhvr>
+                                        <p:cTn id="6" dur="1" fill="hold">
+                                          <p:stCondLst>
+                                            <p:cond delay="0"/>
+                                          </p:stCondLst>
+                                        </p:cTn>
+                                        <p:tgtEl>
+                                          <p:spTgt spid="57"/>
+                                        </p:tgtEl>
+                                        <p:attrNameLst>
+                                          <p:attrName>style.visibility</p:attrName>
+                                        </p:attrNameLst>
+                                      </p:cBhvr>
+                                      <p:to>
+                                        <p:strVal val="visible"/>
+                                      </p:to>
+                                    </p:set>
+                                  </p:childTnLst>
+                                </p:cTn>
+                              </p:par>
+                            </p:childTnLst>
+                          </p:cTn>
+                        </p:par>
+                      </p:childTnLst>
+                    </p:cTn>
+                  </p:par>
+                  <p:par>
+                    <p:cTn id="7" fill="hold">
+                      <p:stCondLst>
+                        <p:cond delay="indefinite"/>
+                      </p:stCondLst>
+                      <p:childTnLst>
+                        <p:par>
+                          <p:cTn id="8" fill="hold">
+                            <p:stCondLst>
+                              <p:cond delay="0"/>
+                            </p:stCondLst>
+                            <p:childTnLst>
+                              <p:par>
+                                <p:cTn id="9" presetID="1" presetClass="entr" presetSubtype="0" fill="hold" nodeType="clickEffect">
+                                  <p:stCondLst>
+                                    <p:cond delay="0"/>
+                                  </p:stCondLst>
+                                  <p:childTnLst>
+                                    <p:set>
+                                      <p:cBhvr>
+                                        <p:cTn id="10" dur="1" fill="hold">
+                                          <p:stCondLst>
+                                            <p:cond delay="0"/>
+                                          </p:stCondLst>
+                                        </p:cTn>
+                                        <p:tgtEl>
+                                          <p:spTgt spid="44"/>
+                                        </p:tgtEl>
+                                        <p:attrNameLst>
+                                          <p:attrName>style.visibility</p:attrName>
+                                        </p:attrNameLst>
+                                      </p:cBhvr>
+                                      <p:to>
+                                        <p:strVal val="visible"/>
+                                      </p:to>
+                                    </p:set>
+                                  </p:childTnLst>
+                                </p:cTn>
+                              </p:par>
+                            </p:childTnLst>
+                          </p:cTn>
+                        </p:par>
+                      </p:childTnLst>
+                    </p:cTn>
+                  </p:par>
+                  <p:par>
+                    <p:cTn id="11" fill="hold">
+                      <p:stCondLst>
+                        <p:cond delay="indefinite"/>
+                      </p:stCondLst>
+                      <p:childTnLst>
+                        <p:par>
+                          <p:cTn id="12" fill="hold">
+                            <p:stCondLst>
+                              <p:cond delay="0"/>
+                            </p:stCondLst>
+                            <p:childTnLst>
+                              <p:par>
+                                <p:cTn id="13" presetID="1" presetClass="entr" presetSubtype="0" fill="hold" nodeType="clickEffect">
+                                  <p:stCondLst>
+                                    <p:cond delay="0"/>
+                                  </p:stCondLst>
+                                  <p:childTnLst>
+                                    <p:set>
+                                      <p:cBhvr>
+                                        <p:cTn id="14" dur="1" fill="hold">
+                                          <p:stCondLst>
+                                            <p:cond delay="0"/>
+                                          </p:stCondLst>
+                                        </p:cTn>
+                                        <p:tgtEl>
+                                          <p:spTgt spid="45"/>
+                                        </p:tgtEl>
+                                        <p:attrNameLst>
+                                          <p:attrName>style.visibility</p:attrName>
+                                        </p:attrNameLst>
+                                      </p:cBhvr>
+                                      <p:to>
+                                        <p:strVal val="visible"/>
+                                      </p:to>
+                                    </p:set>
+                                  </p:childTnLst>
+                                </p:cTn>
+                              </p:par>
+                            </p:childTnLst>
+                          </p:cTn>
+                        </p:par>
+                      </p:childTnLst>
+                    </p:cTn>
+                  </p:par>
+                  <p:par>
+                    <p:cTn id="15" fill="hold">
+                      <p:stCondLst>
+                        <p:cond delay="indefinite"/>
+                      </p:stCondLst>
+                      <p:childTnLst>
+                        <p:par>
+                          <p:cTn id="16" fill="hold">
+                            <p:stCondLst>
+                              <p:cond delay="0"/>
+                            </p:stCondLst>
+                            <p:childTnLst>
+                              <p:par>
+                                <p:cTn id="17" presetID="1" presetClass="entr" presetSubtype="0" fill="hold" nodeType="clickEffect">
+                                  <p:stCondLst>
+                                    <p:cond delay="0"/>
+                                  </p:stCondLst>
+                                  <p:childTnLst>
+                                    <p:set>
+                                      <p:cBhvr>
+                                        <p:cTn id="18" dur="1" fill="hold">
+                                          <p:stCondLst>
+                                            <p:cond delay="0"/>
+                                          </p:stCondLst>
+                                        </p:cTn>
+                                        <p:tgtEl>
+                                          <p:spTgt spid="46"/>
+                                        </p:tgtEl>
+                                        <p:attrNameLst>
+                                          <p:attrName>style.visibility</p:attrName>
+                                        </p:attrNameLst>
+                                      </p:cBhvr>
+                                      <p:to>
+                                        <p:strVal val="visible"/>
+                                      </p:to>
+                                    </p:set>
+                                  </p:childTnLst>
+                                </p:cTn>
+                              </p:par>
+                            </p:childTnLst>
+                          </p:cTn>
+                        </p:par>
+                      </p:childTnLst>
+                    </p:cTn>
+                  </p:par>
+                  <p:par>
+                    <p:cTn id="19" fill="hold">
+                      <p:stCondLst>
+                        <p:cond delay="indefinite"/>
+                      </p:stCondLst>
+                      <p:childTnLst>
+                        <p:par>
+                          <p:cTn id="20" fill="hold">
+                            <p:stCondLst>
+                              <p:cond delay="0"/>
+                            </p:stCondLst>
+                            <p:childTnLst>
+                              <p:par>
+                                <p:cTn id="21" presetID="1" presetClass="entr" presetSubtype="0" fill="hold" grpId="0" nodeType="clickEffect">
+                                  <p:stCondLst>
+                                    <p:cond delay="0"/>
+                                  </p:stCondLst>
+                                  <p:childTnLst>
+                                    <p:set>
+                                      <p:cBhvr>
+                                        <p:cTn id="22" dur="1" fill="hold">
+                                          <p:stCondLst>
+                                            <p:cond delay="0"/>
+                                          </p:stCondLst>
+                                        </p:cTn>
+                                        <p:tgtEl>
+                                          <p:spTgt spid="40"/>
+                                        </p:tgtEl>
+                                        <p:attrNameLst>
+                                          <p:attrName>style.visibility</p:attrName>
+                                        </p:attrNameLst>
+                                      </p:cBhvr>
+                                      <p:to>
+                                        <p:strVal val="visible"/>
+                                      </p:to>
+                                    </p:set>
+                                  </p:childTnLst>
+                                </p:cTn>
+                              </p:par>
+                            </p:childTnLst>
+                          </p:cTn>
+                        </p:par>
+                      </p:childTnLst>
+                    </p:cTn>
+                  </p:par>
+                  <p:par>
+                    <p:cTn id="23" fill="hold">
+                      <p:stCondLst>
+                        <p:cond delay="indefinite"/>
+                      </p:stCondLst>
+                      <p:childTnLst>
+                        <p:par>
+                          <p:cTn id="24" fill="hold">
+                            <p:stCondLst>
+                              <p:cond delay="0"/>
+                            </p:stCondLst>
+                            <p:childTnLst>
+                              <p:par>
+                                <p:cTn id="25" presetID="1" presetClass="entr" presetSubtype="0" fill="hold" nodeType="clickEffect">
+                                  <p:stCondLst>
+                                    <p:cond delay="0"/>
+                                  </p:stCondLst>
+                                  <p:childTnLst>
+                                    <p:set>
+                                      <p:cBhvr>
+                                        <p:cTn id="26" dur="1" fill="hold">
+                                          <p:stCondLst>
+                                            <p:cond delay="0"/>
+                                          </p:stCondLst>
+                                        </p:cTn>
+                                        <p:tgtEl>
+                                          <p:spTgt spid="61"/>
+                                        </p:tgtEl>
+                                        <p:attrNameLst>
+                                          <p:attrName>style.visibility</p:attrName>
+                                        </p:attrNameLst>
+                                      </p:cBhvr>
+                                      <p:to>
+                                        <p:strVal val="visible"/>
+                                      </p:to>
+                                    </p:set>
+                                  </p:childTnLst>
+                                </p:cTn>
+                              </p:par>
+                            </p:childTnLst>
+                          </p:cTn>
+                        </p:par>
+                      </p:childTnLst>
+                    </p:cTn>
+                  </p:par>
+                  <p:par>
+                    <p:cTn id="27" fill="hold">
+                      <p:stCondLst>
+                        <p:cond delay="indefinite"/>
+                      </p:stCondLst>
+                      <p:childTnLst>
+                        <p:par>
+                          <p:cTn id="28" fill="hold">
+                            <p:stCondLst>
+                              <p:cond delay="0"/>
+                            </p:stCondLst>
+                            <p:childTnLst>
+                              <p:par>
+                                <p:cTn id="29" presetID="1" presetClass="entr" presetSubtype="0" fill="hold" grpId="0" nodeType="clickEffect">
+                                  <p:stCondLst>
+                                    <p:cond delay="0"/>
+                                  </p:stCondLst>
+                                  <p:childTnLst>
+                                    <p:set>
+                                      <p:cBhvr>
+                                        <p:cTn id="30" dur="1" fill="hold">
+                                          <p:stCondLst>
+                                            <p:cond delay="0"/>
+                                          </p:stCondLst>
+                                        </p:cTn>
+                                        <p:tgtEl>
+                                          <p:spTgt spid="42"/>
+                                        </p:tgtEl>
+                                        <p:attrNameLst>
+                                          <p:attrName>style.visibility</p:attrName>
+                                        </p:attrNameLst>
+                                      </p:cBhvr>
+                                      <p:to>
+                                        <p:strVal val="visible"/>
+                                      </p:to>
+                                    </p:set>
+                                  </p:childTnLst>
+                                </p:cTn>
+                              </p:par>
+                            </p:childTnLst>
+                          </p:cTn>
+                        </p:par>
+                      </p:childTnLst>
+                    </p:cTn>
+                  </p:par>
+                </p:childTnLst>
+              </p:cTn>
+              <p:prevCondLst>
+                <p:cond evt="onPrev" delay="0">
+                  <p:tgtEl>
+                    <p:sldTgt/>
+                  </p:tgtEl>
+                </p:cond>
+              </p:prevCondLst>
+              <p:nextCondLst>
+                <p:cond evt="onNext" delay="0">
+                  <p:tgtEl>
+                    <p:sldTgt/>
+                  </p:tgtEl>
+                </p:cond>
+              </p:nextCondLst>
+            </p:seq>
+          </p:childTnLst>
+        </p:cTn>
       </p:par>
     </p:tnLst>
+    <p:bldLst>
+      <p:bldP spid="40" grpId="0" animBg="1"/>
+      <p:bldP spid="42" grpId="0" animBg="1"/>
+    </p:bldLst>
   </p:timing>
 </p:sld>
 </file>
@@ -5444,7 +8875,7 @@
           <a:p>
             <a:r>
               <a:rPr lang="es-ES" dirty="0" smtClean="0"/>
-              <a:t>Estimación</a:t>
+              <a:t>Simulaciones</a:t>
             </a:r>
             <a:endParaRPr lang="es-ES" dirty="0"/>
           </a:p>
@@ -5465,7 +8896,7 @@
           <a:bodyPr/>
           <a:lstStyle/>
           <a:p>
-            <a:endParaRPr lang="es-ES"/>
+            <a:endParaRPr lang="es-ES" dirty="0"/>
           </a:p>
         </p:txBody>
       </p:sp>
@@ -5518,78 +8949,7 @@
           <a:p>
             <a:r>
               <a:rPr lang="es-ES" dirty="0" smtClean="0"/>
-              <a:t>Simulaciones</a:t>
-            </a:r>
-            <a:endParaRPr lang="es-ES" dirty="0"/>
-          </a:p>
-        </p:txBody>
-      </p:sp>
-      <p:sp>
-        <p:nvSpPr>
-          <p:cNvPr id="3" name="2 Marcador de contenido"/>
-          <p:cNvSpPr>
-            <a:spLocks noGrp="1"/>
-          </p:cNvSpPr>
-          <p:nvPr>
-            <p:ph sz="quarter" idx="1"/>
-          </p:nvPr>
-        </p:nvSpPr>
-        <p:spPr/>
-        <p:txBody>
-          <a:bodyPr/>
-          <a:lstStyle/>
-          <a:p>
-            <a:endParaRPr lang="es-ES"/>
-          </a:p>
-        </p:txBody>
-      </p:sp>
-    </p:spTree>
-  </p:cSld>
-  <p:clrMapOvr>
-    <a:masterClrMapping/>
-  </p:clrMapOvr>
-</p:sld>
-</file>
-
-<file path=ppt/slides/slide9.xml><?xml version="1.0" encoding="utf-8"?>
-<p:sld xmlns:a="http://schemas.openxmlformats.org/drawingml/2006/main" xmlns:r="http://schemas.openxmlformats.org/officeDocument/2006/relationships" xmlns:p="http://schemas.openxmlformats.org/presentationml/2006/main">
-  <p:cSld>
-    <p:spTree>
-      <p:nvGrpSpPr>
-        <p:cNvPr id="1" name=""/>
-        <p:cNvGrpSpPr/>
-        <p:nvPr/>
-      </p:nvGrpSpPr>
-      <p:grpSpPr>
-        <a:xfrm>
-          <a:off x="0" y="0"/>
-          <a:ext cx="0" cy="0"/>
-          <a:chOff x="0" y="0"/>
-          <a:chExt cx="0" cy="0"/>
-        </a:xfrm>
-      </p:grpSpPr>
-      <p:sp>
-        <p:nvSpPr>
-          <p:cNvPr id="2" name="1 Título"/>
-          <p:cNvSpPr>
-            <a:spLocks noGrp="1"/>
-          </p:cNvSpPr>
-          <p:nvPr>
-            <p:ph type="title"/>
-          </p:nvPr>
-        </p:nvSpPr>
-        <p:spPr/>
-        <p:txBody>
-          <a:bodyPr/>
-          <a:lstStyle/>
-          <a:p>
-            <a:r>
-              <a:rPr lang="es-ES" dirty="0" smtClean="0"/>
-              <a:t>Estructura </a:t>
-            </a:r>
-            <a:r>
-              <a:rPr lang="es-ES" dirty="0" err="1" smtClean="0"/>
-              <a:t>apps</a:t>
+              <a:t>Estructura de los programas</a:t>
             </a:r>
             <a:endParaRPr lang="es-ES" dirty="0"/>
           </a:p>
@@ -5612,8 +8972,8 @@
         </p:blipFill>
         <p:spPr bwMode="auto">
           <a:xfrm>
-            <a:off x="0" y="1428736"/>
-            <a:ext cx="6191250" cy="4714875"/>
+            <a:off x="571472" y="3071810"/>
+            <a:ext cx="3564641" cy="2714611"/>
           </a:xfrm>
           <a:prstGeom prst="rect">
             <a:avLst/>
@@ -5645,8 +9005,76 @@
         </p:blipFill>
         <p:spPr bwMode="auto">
           <a:xfrm>
-            <a:off x="3643306" y="1714488"/>
-            <a:ext cx="6086475" cy="4676775"/>
+            <a:off x="4786314" y="3143248"/>
+            <a:ext cx="3443269" cy="2645768"/>
+          </a:xfrm>
+          <a:prstGeom prst="rect">
+            <a:avLst/>
+          </a:prstGeom>
+          <a:noFill/>
+          <a:ln w="9525">
+            <a:noFill/>
+            <a:miter lim="800000"/>
+            <a:headEnd/>
+            <a:tailEnd/>
+          </a:ln>
+          <a:effectLst/>
+        </p:spPr>
+      </p:pic>
+      <p:pic>
+        <p:nvPicPr>
+          <p:cNvPr id="7" name="Picture 3"/>
+          <p:cNvPicPr>
+            <a:picLocks noGrp="1" noChangeAspect="1" noChangeArrowheads="1"/>
+          </p:cNvPicPr>
+          <p:nvPr>
+            <p:ph sz="quarter" idx="1"/>
+          </p:nvPr>
+        </p:nvPicPr>
+        <p:blipFill>
+          <a:blip r:embed="rId4" cstate="print"/>
+          <a:srcRect/>
+          <a:stretch>
+            <a:fillRect/>
+          </a:stretch>
+        </p:blipFill>
+        <p:spPr bwMode="auto">
+          <a:xfrm>
+            <a:off x="1785918" y="1643050"/>
+            <a:ext cx="1357321" cy="864664"/>
+          </a:xfrm>
+          <a:prstGeom prst="rect">
+            <a:avLst/>
+          </a:prstGeom>
+          <a:noFill/>
+          <a:ln w="9525">
+            <a:noFill/>
+            <a:miter lim="800000"/>
+            <a:headEnd/>
+            <a:tailEnd/>
+          </a:ln>
+          <a:effectLst/>
+        </p:spPr>
+      </p:pic>
+      <p:pic>
+        <p:nvPicPr>
+          <p:cNvPr id="8" name="Picture 4"/>
+          <p:cNvPicPr>
+            <a:picLocks noChangeAspect="1" noChangeArrowheads="1"/>
+          </p:cNvPicPr>
+          <p:nvPr/>
+        </p:nvPicPr>
+        <p:blipFill>
+          <a:blip r:embed="rId5" cstate="print"/>
+          <a:srcRect/>
+          <a:stretch>
+            <a:fillRect/>
+          </a:stretch>
+        </p:blipFill>
+        <p:spPr bwMode="auto">
+          <a:xfrm>
+            <a:off x="5715008" y="1714488"/>
+            <a:ext cx="1491291" cy="1085825"/>
           </a:xfrm>
           <a:prstGeom prst="rect">
             <a:avLst/>
@@ -5666,6 +9094,93 @@
   <p:clrMapOvr>
     <a:masterClrMapping/>
   </p:clrMapOvr>
+  <p:timing>
+    <p:tnLst>
+      <p:par>
+        <p:cTn id="1" dur="indefinite" restart="never" nodeType="tmRoot"/>
+      </p:par>
+    </p:tnLst>
+  </p:timing>
+</p:sld>
+</file>
+
+<file path=ppt/slides/slide9.xml><?xml version="1.0" encoding="utf-8"?>
+<p:sld xmlns:a="http://schemas.openxmlformats.org/drawingml/2006/main" xmlns:r="http://schemas.openxmlformats.org/officeDocument/2006/relationships" xmlns:p="http://schemas.openxmlformats.org/presentationml/2006/main">
+  <p:cSld>
+    <p:spTree>
+      <p:nvGrpSpPr>
+        <p:cNvPr id="1" name=""/>
+        <p:cNvGrpSpPr/>
+        <p:nvPr/>
+      </p:nvGrpSpPr>
+      <p:grpSpPr>
+        <a:xfrm>
+          <a:off x="0" y="0"/>
+          <a:ext cx="0" cy="0"/>
+          <a:chOff x="0" y="0"/>
+          <a:chExt cx="0" cy="0"/>
+        </a:xfrm>
+      </p:grpSpPr>
+      <p:sp>
+        <p:nvSpPr>
+          <p:cNvPr id="2" name="1 Título"/>
+          <p:cNvSpPr>
+            <a:spLocks noGrp="1"/>
+          </p:cNvSpPr>
+          <p:nvPr>
+            <p:ph type="title"/>
+          </p:nvPr>
+        </p:nvSpPr>
+        <p:spPr/>
+        <p:txBody>
+          <a:bodyPr>
+            <a:normAutofit/>
+          </a:bodyPr>
+          <a:lstStyle/>
+          <a:p>
+            <a:r>
+              <a:rPr lang="es-ES" dirty="0" err="1" smtClean="0"/>
+              <a:t>Vrep</a:t>
+            </a:r>
+            <a:endParaRPr lang="es-ES" dirty="0"/>
+          </a:p>
+        </p:txBody>
+      </p:sp>
+      <p:sp>
+        <p:nvSpPr>
+          <p:cNvPr id="3" name="2 Marcador de contenido"/>
+          <p:cNvSpPr>
+            <a:spLocks noGrp="1"/>
+          </p:cNvSpPr>
+          <p:nvPr>
+            <p:ph sz="quarter" idx="1"/>
+          </p:nvPr>
+        </p:nvSpPr>
+        <p:spPr/>
+        <p:txBody>
+          <a:bodyPr/>
+          <a:lstStyle/>
+          <a:p>
+            <a:r>
+              <a:rPr lang="es-ES" dirty="0" smtClean="0"/>
+              <a:t>Experimento</a:t>
+            </a:r>
+            <a:endParaRPr lang="es-ES" dirty="0"/>
+          </a:p>
+        </p:txBody>
+      </p:sp>
+    </p:spTree>
+  </p:cSld>
+  <p:clrMapOvr>
+    <a:masterClrMapping/>
+  </p:clrMapOvr>
+  <p:timing>
+    <p:tnLst>
+      <p:par>
+        <p:cTn id="1" dur="indefinite" restart="never" nodeType="tmRoot"/>
+      </p:par>
+    </p:tnLst>
+  </p:timing>
 </p:sld>
 </file>
 
@@ -5899,4 +9414,287 @@
   <a:objectDefaults/>
   <a:extraClrSchemeLst/>
 </a:theme>
+</file>
+
+<file path=ppt/theme/theme2.xml><?xml version="1.0" encoding="utf-8"?>
+<a:theme xmlns:a="http://schemas.openxmlformats.org/drawingml/2006/main" name="Tema de Office">
+  <a:themeElements>
+    <a:clrScheme name="Office">
+      <a:dk1>
+        <a:sysClr val="windowText" lastClr="000000"/>
+      </a:dk1>
+      <a:lt1>
+        <a:sysClr val="window" lastClr="FFFFFF"/>
+      </a:lt1>
+      <a:dk2>
+        <a:srgbClr val="1F497D"/>
+      </a:dk2>
+      <a:lt2>
+        <a:srgbClr val="EEECE1"/>
+      </a:lt2>
+      <a:accent1>
+        <a:srgbClr val="4F81BD"/>
+      </a:accent1>
+      <a:accent2>
+        <a:srgbClr val="C0504D"/>
+      </a:accent2>
+      <a:accent3>
+        <a:srgbClr val="9BBB59"/>
+      </a:accent3>
+      <a:accent4>
+        <a:srgbClr val="8064A2"/>
+      </a:accent4>
+      <a:accent5>
+        <a:srgbClr val="4BACC6"/>
+      </a:accent5>
+      <a:accent6>
+        <a:srgbClr val="F79646"/>
+      </a:accent6>
+      <a:hlink>
+        <a:srgbClr val="0000FF"/>
+      </a:hlink>
+      <a:folHlink>
+        <a:srgbClr val="800080"/>
+      </a:folHlink>
+    </a:clrScheme>
+    <a:fontScheme name="Office">
+      <a:majorFont>
+        <a:latin typeface="Calibri"/>
+        <a:ea typeface=""/>
+        <a:cs typeface=""/>
+        <a:font script="Jpan" typeface="ＭＳ Ｐゴシック"/>
+        <a:font script="Hang" typeface="맑은 고딕"/>
+        <a:font script="Hans" typeface="宋体"/>
+        <a:font script="Hant" typeface="新細明體"/>
+        <a:font script="Arab" typeface="Times New Roman"/>
+        <a:font script="Hebr" typeface="Times New Roman"/>
+        <a:font script="Thai" typeface="Angsana New"/>
+        <a:font script="Ethi" typeface="Nyala"/>
+        <a:font script="Beng" typeface="Vrinda"/>
+        <a:font script="Gujr" typeface="Shruti"/>
+        <a:font script="Khmr" typeface="MoolBoran"/>
+        <a:font script="Knda" typeface="Tunga"/>
+        <a:font script="Guru" typeface="Raavi"/>
+        <a:font script="Cans" typeface="Euphemia"/>
+        <a:font script="Cher" typeface="Plantagenet Cherokee"/>
+        <a:font script="Yiii" typeface="Microsoft Yi Baiti"/>
+        <a:font script="Tibt" typeface="Microsoft Himalaya"/>
+        <a:font script="Thaa" typeface="MV Boli"/>
+        <a:font script="Deva" typeface="Mangal"/>
+        <a:font script="Telu" typeface="Gautami"/>
+        <a:font script="Taml" typeface="Latha"/>
+        <a:font script="Syrc" typeface="Estrangelo Edessa"/>
+        <a:font script="Orya" typeface="Kalinga"/>
+        <a:font script="Mlym" typeface="Kartika"/>
+        <a:font script="Laoo" typeface="DokChampa"/>
+        <a:font script="Sinh" typeface="Iskoola Pota"/>
+        <a:font script="Mong" typeface="Mongolian Baiti"/>
+        <a:font script="Viet" typeface="Times New Roman"/>
+        <a:font script="Uigh" typeface="Microsoft Uighur"/>
+      </a:majorFont>
+      <a:minorFont>
+        <a:latin typeface="Calibri"/>
+        <a:ea typeface=""/>
+        <a:cs typeface=""/>
+        <a:font script="Jpan" typeface="ＭＳ Ｐゴシック"/>
+        <a:font script="Hang" typeface="맑은 고딕"/>
+        <a:font script="Hans" typeface="宋体"/>
+        <a:font script="Hant" typeface="新細明體"/>
+        <a:font script="Arab" typeface="Arial"/>
+        <a:font script="Hebr" typeface="Arial"/>
+        <a:font script="Thai" typeface="Cordia New"/>
+        <a:font script="Ethi" typeface="Nyala"/>
+        <a:font script="Beng" typeface="Vrinda"/>
+        <a:font script="Gujr" typeface="Shruti"/>
+        <a:font script="Khmr" typeface="DaunPenh"/>
+        <a:font script="Knda" typeface="Tunga"/>
+        <a:font script="Guru" typeface="Raavi"/>
+        <a:font script="Cans" typeface="Euphemia"/>
+        <a:font script="Cher" typeface="Plantagenet Cherokee"/>
+        <a:font script="Yiii" typeface="Microsoft Yi Baiti"/>
+        <a:font script="Tibt" typeface="Microsoft Himalaya"/>
+        <a:font script="Thaa" typeface="MV Boli"/>
+        <a:font script="Deva" typeface="Mangal"/>
+        <a:font script="Telu" typeface="Gautami"/>
+        <a:font script="Taml" typeface="Latha"/>
+        <a:font script="Syrc" typeface="Estrangelo Edessa"/>
+        <a:font script="Orya" typeface="Kalinga"/>
+        <a:font script="Mlym" typeface="Kartika"/>
+        <a:font script="Laoo" typeface="DokChampa"/>
+        <a:font script="Sinh" typeface="Iskoola Pota"/>
+        <a:font script="Mong" typeface="Mongolian Baiti"/>
+        <a:font script="Viet" typeface="Arial"/>
+        <a:font script="Uigh" typeface="Microsoft Uighur"/>
+      </a:minorFont>
+    </a:fontScheme>
+    <a:fmtScheme name="Office">
+      <a:fillStyleLst>
+        <a:solidFill>
+          <a:schemeClr val="phClr"/>
+        </a:solidFill>
+        <a:gradFill rotWithShape="1">
+          <a:gsLst>
+            <a:gs pos="0">
+              <a:schemeClr val="phClr">
+                <a:tint val="50000"/>
+                <a:satMod val="300000"/>
+              </a:schemeClr>
+            </a:gs>
+            <a:gs pos="35000">
+              <a:schemeClr val="phClr">
+                <a:tint val="37000"/>
+                <a:satMod val="300000"/>
+              </a:schemeClr>
+            </a:gs>
+            <a:gs pos="100000">
+              <a:schemeClr val="phClr">
+                <a:tint val="15000"/>
+                <a:satMod val="350000"/>
+              </a:schemeClr>
+            </a:gs>
+          </a:gsLst>
+          <a:lin ang="16200000" scaled="1"/>
+        </a:gradFill>
+        <a:gradFill rotWithShape="1">
+          <a:gsLst>
+            <a:gs pos="0">
+              <a:schemeClr val="phClr">
+                <a:shade val="51000"/>
+                <a:satMod val="130000"/>
+              </a:schemeClr>
+            </a:gs>
+            <a:gs pos="80000">
+              <a:schemeClr val="phClr">
+                <a:shade val="93000"/>
+                <a:satMod val="130000"/>
+              </a:schemeClr>
+            </a:gs>
+            <a:gs pos="100000">
+              <a:schemeClr val="phClr">
+                <a:shade val="94000"/>
+                <a:satMod val="135000"/>
+              </a:schemeClr>
+            </a:gs>
+          </a:gsLst>
+          <a:lin ang="16200000" scaled="0"/>
+        </a:gradFill>
+      </a:fillStyleLst>
+      <a:lnStyleLst>
+        <a:ln w="9525" cap="flat" cmpd="sng" algn="ctr">
+          <a:solidFill>
+            <a:schemeClr val="phClr">
+              <a:shade val="95000"/>
+              <a:satMod val="105000"/>
+            </a:schemeClr>
+          </a:solidFill>
+          <a:prstDash val="solid"/>
+        </a:ln>
+        <a:ln w="25400" cap="flat" cmpd="sng" algn="ctr">
+          <a:solidFill>
+            <a:schemeClr val="phClr"/>
+          </a:solidFill>
+          <a:prstDash val="solid"/>
+        </a:ln>
+        <a:ln w="38100" cap="flat" cmpd="sng" algn="ctr">
+          <a:solidFill>
+            <a:schemeClr val="phClr"/>
+          </a:solidFill>
+          <a:prstDash val="solid"/>
+        </a:ln>
+      </a:lnStyleLst>
+      <a:effectStyleLst>
+        <a:effectStyle>
+          <a:effectLst>
+            <a:outerShdw blurRad="40000" dist="20000" dir="5400000" rotWithShape="0">
+              <a:srgbClr val="000000">
+                <a:alpha val="38000"/>
+              </a:srgbClr>
+            </a:outerShdw>
+          </a:effectLst>
+        </a:effectStyle>
+        <a:effectStyle>
+          <a:effectLst>
+            <a:outerShdw blurRad="40000" dist="23000" dir="5400000" rotWithShape="0">
+              <a:srgbClr val="000000">
+                <a:alpha val="35000"/>
+              </a:srgbClr>
+            </a:outerShdw>
+          </a:effectLst>
+        </a:effectStyle>
+        <a:effectStyle>
+          <a:effectLst>
+            <a:outerShdw blurRad="40000" dist="23000" dir="5400000" rotWithShape="0">
+              <a:srgbClr val="000000">
+                <a:alpha val="35000"/>
+              </a:srgbClr>
+            </a:outerShdw>
+          </a:effectLst>
+          <a:scene3d>
+            <a:camera prst="orthographicFront">
+              <a:rot lat="0" lon="0" rev="0"/>
+            </a:camera>
+            <a:lightRig rig="threePt" dir="t">
+              <a:rot lat="0" lon="0" rev="1200000"/>
+            </a:lightRig>
+          </a:scene3d>
+          <a:sp3d>
+            <a:bevelT w="63500" h="25400"/>
+          </a:sp3d>
+        </a:effectStyle>
+      </a:effectStyleLst>
+      <a:bgFillStyleLst>
+        <a:solidFill>
+          <a:schemeClr val="phClr"/>
+        </a:solidFill>
+        <a:gradFill rotWithShape="1">
+          <a:gsLst>
+            <a:gs pos="0">
+              <a:schemeClr val="phClr">
+                <a:tint val="40000"/>
+                <a:satMod val="350000"/>
+              </a:schemeClr>
+            </a:gs>
+            <a:gs pos="40000">
+              <a:schemeClr val="phClr">
+                <a:tint val="45000"/>
+                <a:shade val="99000"/>
+                <a:satMod val="350000"/>
+              </a:schemeClr>
+            </a:gs>
+            <a:gs pos="100000">
+              <a:schemeClr val="phClr">
+                <a:shade val="20000"/>
+                <a:satMod val="255000"/>
+              </a:schemeClr>
+            </a:gs>
+          </a:gsLst>
+          <a:path path="circle">
+            <a:fillToRect l="50000" t="-80000" r="50000" b="180000"/>
+          </a:path>
+        </a:gradFill>
+        <a:gradFill rotWithShape="1">
+          <a:gsLst>
+            <a:gs pos="0">
+              <a:schemeClr val="phClr">
+                <a:tint val="80000"/>
+                <a:satMod val="300000"/>
+              </a:schemeClr>
+            </a:gs>
+            <a:gs pos="100000">
+              <a:schemeClr val="phClr">
+                <a:shade val="30000"/>
+                <a:satMod val="200000"/>
+              </a:schemeClr>
+            </a:gs>
+          </a:gsLst>
+          <a:path path="circle">
+            <a:fillToRect l="50000" t="50000" r="50000" b="50000"/>
+          </a:path>
+        </a:gradFill>
+      </a:bgFillStyleLst>
+    </a:fmtScheme>
+  </a:themeElements>
+  <a:objectDefaults/>
+  <a:extraClrSchemeLst/>
+</a:theme>
 </file>
</xml_diff>

<commit_message>
ppt terminado, pero no revisado
</commit_message>
<xml_diff>
--- a/presentation.pptx
+++ b/presentation.pptx
@@ -5,7 +5,7 @@
     <p:sldMasterId id="2147483780" r:id="rId1"/>
   </p:sldMasterIdLst>
   <p:notesMasterIdLst>
-    <p:notesMasterId r:id="rId18"/>
+    <p:notesMasterId r:id="rId17"/>
   </p:notesMasterIdLst>
   <p:sldIdLst>
     <p:sldId id="256" r:id="rId2"/>
@@ -14,16 +14,15 @@
     <p:sldId id="260" r:id="rId5"/>
     <p:sldId id="271" r:id="rId6"/>
     <p:sldId id="262" r:id="rId7"/>
-    <p:sldId id="263" r:id="rId8"/>
-    <p:sldId id="266" r:id="rId9"/>
-    <p:sldId id="264" r:id="rId10"/>
-    <p:sldId id="267" r:id="rId11"/>
-    <p:sldId id="273" r:id="rId12"/>
-    <p:sldId id="272" r:id="rId13"/>
-    <p:sldId id="265" r:id="rId14"/>
-    <p:sldId id="268" r:id="rId15"/>
-    <p:sldId id="269" r:id="rId16"/>
-    <p:sldId id="270" r:id="rId17"/>
+    <p:sldId id="266" r:id="rId8"/>
+    <p:sldId id="264" r:id="rId9"/>
+    <p:sldId id="267" r:id="rId10"/>
+    <p:sldId id="273" r:id="rId11"/>
+    <p:sldId id="272" r:id="rId12"/>
+    <p:sldId id="265" r:id="rId13"/>
+    <p:sldId id="268" r:id="rId14"/>
+    <p:sldId id="269" r:id="rId15"/>
+    <p:sldId id="270" r:id="rId16"/>
   </p:sldIdLst>
   <p:sldSz cx="9144000" cy="6858000" type="screen4x3"/>
   <p:notesSz cx="6858000" cy="9144000"/>
@@ -4377,322 +4376,6 @@
           <a:p>
             <a:r>
               <a:rPr lang="es-ES" dirty="0" smtClean="0"/>
-              <a:t>Simulaciones</a:t>
-            </a:r>
-            <a:endParaRPr lang="es-ES" dirty="0"/>
-          </a:p>
-        </p:txBody>
-      </p:sp>
-      <p:pic>
-        <p:nvPicPr>
-          <p:cNvPr id="5121" name="Picture 1" descr="C:\Programming\PFC\Images\c3\sim4_set_up.jpg"/>
-          <p:cNvPicPr>
-            <a:picLocks noChangeAspect="1" noChangeArrowheads="1"/>
-          </p:cNvPicPr>
-          <p:nvPr/>
-        </p:nvPicPr>
-        <p:blipFill>
-          <a:blip r:embed="rId2"/>
-          <a:srcRect/>
-          <a:stretch>
-            <a:fillRect/>
-          </a:stretch>
-        </p:blipFill>
-        <p:spPr bwMode="auto">
-          <a:xfrm>
-            <a:off x="4572000" y="3071811"/>
-            <a:ext cx="3857652" cy="2679540"/>
-          </a:xfrm>
-          <a:prstGeom prst="rect">
-            <a:avLst/>
-          </a:prstGeom>
-          <a:noFill/>
-        </p:spPr>
-      </p:pic>
-      <p:pic>
-        <p:nvPicPr>
-          <p:cNvPr id="5122" name="Picture 2" descr="C:\Programming\PFC\Images\c3\sim3_set_up.jpg"/>
-          <p:cNvPicPr>
-            <a:picLocks noChangeAspect="1" noChangeArrowheads="1"/>
-          </p:cNvPicPr>
-          <p:nvPr/>
-        </p:nvPicPr>
-        <p:blipFill>
-          <a:blip r:embed="rId3"/>
-          <a:srcRect/>
-          <a:stretch>
-            <a:fillRect/>
-          </a:stretch>
-        </p:blipFill>
-        <p:spPr bwMode="auto">
-          <a:xfrm>
-            <a:off x="357158" y="3071810"/>
-            <a:ext cx="3917776" cy="2701914"/>
-          </a:xfrm>
-          <a:prstGeom prst="rect">
-            <a:avLst/>
-          </a:prstGeom>
-          <a:noFill/>
-        </p:spPr>
-      </p:pic>
-      <p:sp>
-        <p:nvSpPr>
-          <p:cNvPr id="6" name="2 Marcador de contenido"/>
-          <p:cNvSpPr txBox="1">
-            <a:spLocks/>
-          </p:cNvSpPr>
-          <p:nvPr/>
-        </p:nvSpPr>
-        <p:spPr>
-          <a:xfrm>
-            <a:off x="785786" y="2428868"/>
-            <a:ext cx="2786082" cy="571504"/>
-          </a:xfrm>
-          <a:prstGeom prst="rect">
-            <a:avLst/>
-          </a:prstGeom>
-        </p:spPr>
-        <p:txBody>
-          <a:bodyPr vert="horz">
-            <a:normAutofit/>
-          </a:bodyPr>
-          <a:lstStyle/>
-          <a:p>
-            <a:pPr marL="320040" marR="0" lvl="0" indent="-320040" algn="l" defTabSz="914400" rtl="0" eaLnBrk="1" fontAlgn="auto" latinLnBrk="0" hangingPunct="1">
-              <a:lnSpc>
-                <a:spcPct val="100000"/>
-              </a:lnSpc>
-              <a:spcBef>
-                <a:spcPts val="700"/>
-              </a:spcBef>
-              <a:spcAft>
-                <a:spcPts val="0"/>
-              </a:spcAft>
-              <a:buClr>
-                <a:schemeClr val="accent2"/>
-              </a:buClr>
-              <a:buSzPct val="60000"/>
-              <a:tabLst/>
-              <a:defRPr/>
-            </a:pPr>
-            <a:r>
-              <a:rPr kumimoji="0" lang="es-ES" sz="2900" b="0" i="0" u="none" strike="noStrike" kern="1200" cap="none" spc="0" normalizeH="0" baseline="0" noProof="0" dirty="0" err="1" smtClean="0">
-                <a:ln>
-                  <a:noFill/>
-                </a:ln>
-                <a:solidFill>
-                  <a:schemeClr val="tx1"/>
-                </a:solidFill>
-                <a:effectLst/>
-                <a:uLnTx/>
-                <a:uFillTx/>
-                <a:latin typeface="+mn-lt"/>
-                <a:ea typeface="+mn-ea"/>
-                <a:cs typeface="+mn-cs"/>
-              </a:rPr>
-              <a:t>Stereo</a:t>
-            </a:r>
-            <a:r>
-              <a:rPr lang="es-ES" sz="2900" baseline="0" dirty="0" smtClean="0"/>
-              <a:t>-Tracking</a:t>
-            </a:r>
-            <a:endParaRPr kumimoji="0" lang="es-ES" sz="2900" b="0" i="0" u="none" strike="noStrike" kern="1200" cap="none" spc="0" normalizeH="0" baseline="0" noProof="0" dirty="0">
-              <a:ln>
-                <a:noFill/>
-              </a:ln>
-              <a:solidFill>
-                <a:schemeClr val="tx1"/>
-              </a:solidFill>
-              <a:effectLst/>
-              <a:uLnTx/>
-              <a:uFillTx/>
-              <a:latin typeface="+mn-lt"/>
-              <a:ea typeface="+mn-ea"/>
-              <a:cs typeface="+mn-cs"/>
-            </a:endParaRPr>
-          </a:p>
-        </p:txBody>
-      </p:sp>
-      <p:sp>
-        <p:nvSpPr>
-          <p:cNvPr id="7" name="2 Marcador de contenido"/>
-          <p:cNvSpPr txBox="1">
-            <a:spLocks/>
-          </p:cNvSpPr>
-          <p:nvPr/>
-        </p:nvSpPr>
-        <p:spPr>
-          <a:xfrm>
-            <a:off x="5000628" y="2500306"/>
-            <a:ext cx="2786082" cy="571504"/>
-          </a:xfrm>
-          <a:prstGeom prst="rect">
-            <a:avLst/>
-          </a:prstGeom>
-        </p:spPr>
-        <p:txBody>
-          <a:bodyPr vert="horz">
-            <a:normAutofit/>
-          </a:bodyPr>
-          <a:lstStyle/>
-          <a:p>
-            <a:pPr marL="320040" marR="0" lvl="0" indent="-320040" algn="l" defTabSz="914400" rtl="0" eaLnBrk="1" fontAlgn="auto" latinLnBrk="0" hangingPunct="1">
-              <a:lnSpc>
-                <a:spcPct val="100000"/>
-              </a:lnSpc>
-              <a:spcBef>
-                <a:spcPts val="700"/>
-              </a:spcBef>
-              <a:spcAft>
-                <a:spcPts val="0"/>
-              </a:spcAft>
-              <a:buClr>
-                <a:schemeClr val="accent2"/>
-              </a:buClr>
-              <a:buSzPct val="60000"/>
-              <a:tabLst/>
-              <a:defRPr/>
-            </a:pPr>
-            <a:r>
-              <a:rPr kumimoji="0" lang="es-ES" sz="2900" b="0" i="0" u="none" strike="noStrike" kern="1200" cap="none" spc="0" normalizeH="0" baseline="0" noProof="0" dirty="0" err="1" smtClean="0">
-                <a:ln>
-                  <a:noFill/>
-                </a:ln>
-                <a:solidFill>
-                  <a:schemeClr val="tx1"/>
-                </a:solidFill>
-                <a:effectLst/>
-                <a:uLnTx/>
-                <a:uFillTx/>
-                <a:latin typeface="+mn-lt"/>
-                <a:ea typeface="+mn-ea"/>
-                <a:cs typeface="+mn-cs"/>
-              </a:rPr>
-              <a:t>Multiple</a:t>
-            </a:r>
-            <a:r>
-              <a:rPr kumimoji="0" lang="es-ES" sz="2900" b="0" i="0" u="none" strike="noStrike" kern="1200" cap="none" spc="0" normalizeH="0" noProof="0" dirty="0" smtClean="0">
-                <a:ln>
-                  <a:noFill/>
-                </a:ln>
-                <a:solidFill>
-                  <a:schemeClr val="tx1"/>
-                </a:solidFill>
-                <a:effectLst/>
-                <a:uLnTx/>
-                <a:uFillTx/>
-                <a:latin typeface="+mn-lt"/>
-                <a:ea typeface="+mn-ea"/>
-                <a:cs typeface="+mn-cs"/>
-              </a:rPr>
-              <a:t> </a:t>
-            </a:r>
-            <a:r>
-              <a:rPr kumimoji="0" lang="es-ES" sz="2900" b="0" i="0" u="none" strike="noStrike" kern="1200" cap="none" spc="0" normalizeH="0" baseline="0" noProof="0" dirty="0" err="1" smtClean="0">
-                <a:ln>
-                  <a:noFill/>
-                </a:ln>
-                <a:solidFill>
-                  <a:schemeClr val="tx1"/>
-                </a:solidFill>
-                <a:effectLst/>
-                <a:uLnTx/>
-                <a:uFillTx/>
-                <a:latin typeface="+mn-lt"/>
-                <a:ea typeface="+mn-ea"/>
-                <a:cs typeface="+mn-cs"/>
-              </a:rPr>
-              <a:t>objects</a:t>
-            </a:r>
-            <a:endParaRPr kumimoji="0" lang="es-ES" sz="2900" b="0" i="0" u="none" strike="noStrike" kern="1200" cap="none" spc="0" normalizeH="0" baseline="0" noProof="0" dirty="0">
-              <a:ln>
-                <a:noFill/>
-              </a:ln>
-              <a:solidFill>
-                <a:schemeClr val="tx1"/>
-              </a:solidFill>
-              <a:effectLst/>
-              <a:uLnTx/>
-              <a:uFillTx/>
-              <a:latin typeface="+mn-lt"/>
-              <a:ea typeface="+mn-ea"/>
-              <a:cs typeface="+mn-cs"/>
-            </a:endParaRPr>
-          </a:p>
-        </p:txBody>
-      </p:sp>
-    </p:spTree>
-  </p:cSld>
-  <p:clrMapOvr>
-    <a:masterClrMapping/>
-  </p:clrMapOvr>
-  <p:timing>
-    <p:tnLst>
-      <p:par>
-        <p:cTn id="1" dur="indefinite" restart="never" nodeType="tmRoot"/>
-      </p:par>
-    </p:tnLst>
-  </p:timing>
-</p:sld>
-</file>
-
-<file path=ppt/slides/slide11.xml><?xml version="1.0" encoding="utf-8"?>
-<p:sld xmlns:a="http://schemas.openxmlformats.org/drawingml/2006/main" xmlns:r="http://schemas.openxmlformats.org/officeDocument/2006/relationships" xmlns:p="http://schemas.openxmlformats.org/presentationml/2006/main">
-  <p:cSld>
-    <p:spTree>
-      <p:nvGrpSpPr>
-        <p:cNvPr id="1" name=""/>
-        <p:cNvGrpSpPr/>
-        <p:nvPr/>
-      </p:nvGrpSpPr>
-      <p:grpSpPr>
-        <a:xfrm>
-          <a:off x="0" y="0"/>
-          <a:ext cx="0" cy="0"/>
-          <a:chOff x="0" y="0"/>
-          <a:chExt cx="0" cy="0"/>
-        </a:xfrm>
-      </p:grpSpPr>
-      <p:sp>
-        <p:nvSpPr>
-          <p:cNvPr id="2" name="1 Título"/>
-          <p:cNvSpPr>
-            <a:spLocks noGrp="1"/>
-          </p:cNvSpPr>
-          <p:nvPr>
-            <p:ph type="title"/>
-          </p:nvPr>
-        </p:nvSpPr>
-        <p:spPr/>
-        <p:txBody>
-          <a:bodyPr/>
-          <a:lstStyle/>
-          <a:p>
-            <a:r>
-              <a:rPr lang="es-ES" dirty="0" err="1" smtClean="0"/>
-              <a:t>Vrep</a:t>
-            </a:r>
-            <a:endParaRPr lang="es-ES" dirty="0"/>
-          </a:p>
-        </p:txBody>
-      </p:sp>
-      <p:sp>
-        <p:nvSpPr>
-          <p:cNvPr id="3" name="2 Marcador de contenido"/>
-          <p:cNvSpPr>
-            <a:spLocks noGrp="1"/>
-          </p:cNvSpPr>
-          <p:nvPr>
-            <p:ph sz="quarter" idx="1"/>
-          </p:nvPr>
-        </p:nvSpPr>
-        <p:spPr/>
-        <p:txBody>
-          <a:bodyPr/>
-          <a:lstStyle/>
-          <a:p>
-            <a:r>
-              <a:rPr lang="es-ES" dirty="0" smtClean="0"/>
               <a:t>R</a:t>
             </a:r>
             <a:r>
@@ -4783,8 +4466,8 @@
         </p:blipFill>
         <p:spPr bwMode="auto">
           <a:xfrm>
-            <a:off x="2000232" y="3429000"/>
-            <a:ext cx="4339420" cy="2069716"/>
+            <a:off x="1214414" y="2857495"/>
+            <a:ext cx="6215106" cy="2964337"/>
           </a:xfrm>
           <a:prstGeom prst="rect">
             <a:avLst/>
@@ -4875,6 +4558,189 @@
 </p:sld>
 </file>
 
+<file path=ppt/slides/slide11.xml><?xml version="1.0" encoding="utf-8"?>
+<p:sld xmlns:a="http://schemas.openxmlformats.org/drawingml/2006/main" xmlns:r="http://schemas.openxmlformats.org/officeDocument/2006/relationships" xmlns:p="http://schemas.openxmlformats.org/presentationml/2006/main">
+  <p:cSld>
+    <p:spTree>
+      <p:nvGrpSpPr>
+        <p:cNvPr id="1" name=""/>
+        <p:cNvGrpSpPr/>
+        <p:nvPr/>
+      </p:nvGrpSpPr>
+      <p:grpSpPr>
+        <a:xfrm>
+          <a:off x="0" y="0"/>
+          <a:ext cx="0" cy="0"/>
+          <a:chOff x="0" y="0"/>
+          <a:chExt cx="0" cy="0"/>
+        </a:xfrm>
+      </p:grpSpPr>
+      <p:sp>
+        <p:nvSpPr>
+          <p:cNvPr id="2" name="1 Título"/>
+          <p:cNvSpPr>
+            <a:spLocks noGrp="1"/>
+          </p:cNvSpPr>
+          <p:nvPr>
+            <p:ph type="title"/>
+          </p:nvPr>
+        </p:nvSpPr>
+        <p:spPr/>
+        <p:txBody>
+          <a:bodyPr/>
+          <a:lstStyle/>
+          <a:p>
+            <a:r>
+              <a:rPr lang="es-ES" dirty="0" err="1" smtClean="0"/>
+              <a:t>Vrep</a:t>
+            </a:r>
+            <a:endParaRPr lang="es-ES" dirty="0"/>
+          </a:p>
+        </p:txBody>
+      </p:sp>
+      <p:sp>
+        <p:nvSpPr>
+          <p:cNvPr id="3" name="2 Marcador de contenido"/>
+          <p:cNvSpPr>
+            <a:spLocks noGrp="1"/>
+          </p:cNvSpPr>
+          <p:nvPr>
+            <p:ph sz="quarter" idx="1"/>
+          </p:nvPr>
+        </p:nvSpPr>
+        <p:spPr/>
+        <p:txBody>
+          <a:bodyPr/>
+          <a:lstStyle/>
+          <a:p>
+            <a:r>
+              <a:rPr lang="es-ES" dirty="0" smtClean="0"/>
+              <a:t>R</a:t>
+            </a:r>
+            <a:r>
+              <a:rPr lang="es-ES" dirty="0" smtClean="0"/>
+              <a:t>esultados:</a:t>
+            </a:r>
+          </a:p>
+          <a:p>
+            <a:pPr lvl="1"/>
+            <a:r>
+              <a:rPr lang="es-ES" dirty="0" err="1" smtClean="0"/>
+              <a:t>Multiple</a:t>
+            </a:r>
+            <a:r>
+              <a:rPr lang="es-ES" dirty="0" smtClean="0"/>
+              <a:t> </a:t>
+            </a:r>
+            <a:r>
+              <a:rPr lang="es-ES" dirty="0" err="1" smtClean="0"/>
+              <a:t>objects</a:t>
+            </a:r>
+            <a:endParaRPr lang="es-ES" dirty="0"/>
+          </a:p>
+        </p:txBody>
+      </p:sp>
+      <p:pic>
+        <p:nvPicPr>
+          <p:cNvPr id="30724" name="Picture 4" descr="C:\Programming\PFC\Images\c3\sim4_3dtraj.jpg"/>
+          <p:cNvPicPr>
+            <a:picLocks noChangeAspect="1" noChangeArrowheads="1"/>
+          </p:cNvPicPr>
+          <p:nvPr/>
+        </p:nvPicPr>
+        <p:blipFill>
+          <a:blip r:embed="rId2"/>
+          <a:srcRect/>
+          <a:stretch>
+            <a:fillRect/>
+          </a:stretch>
+        </p:blipFill>
+        <p:spPr bwMode="auto">
+          <a:xfrm>
+            <a:off x="1500166" y="2928934"/>
+            <a:ext cx="6286544" cy="3790588"/>
+          </a:xfrm>
+          <a:prstGeom prst="rect">
+            <a:avLst/>
+          </a:prstGeom>
+          <a:noFill/>
+        </p:spPr>
+      </p:pic>
+      <p:sp>
+        <p:nvSpPr>
+          <p:cNvPr id="7" name="6 CuadroTexto"/>
+          <p:cNvSpPr txBox="1"/>
+          <p:nvPr/>
+        </p:nvSpPr>
+        <p:spPr>
+          <a:xfrm>
+            <a:off x="2643174" y="2571744"/>
+            <a:ext cx="1185453" cy="369332"/>
+          </a:xfrm>
+          <a:prstGeom prst="rect">
+            <a:avLst/>
+          </a:prstGeom>
+          <a:noFill/>
+        </p:spPr>
+        <p:txBody>
+          <a:bodyPr wrap="none" rtlCol="0">
+            <a:spAutoFit/>
+          </a:bodyPr>
+          <a:lstStyle/>
+          <a:p>
+            <a:r>
+              <a:rPr lang="es-ES" dirty="0" smtClean="0"/>
+              <a:t>Red Target</a:t>
+            </a:r>
+            <a:endParaRPr lang="es-ES" dirty="0"/>
+          </a:p>
+        </p:txBody>
+      </p:sp>
+      <p:sp>
+        <p:nvSpPr>
+          <p:cNvPr id="8" name="7 CuadroTexto"/>
+          <p:cNvSpPr txBox="1"/>
+          <p:nvPr/>
+        </p:nvSpPr>
+        <p:spPr>
+          <a:xfrm>
+            <a:off x="5786446" y="2571744"/>
+            <a:ext cx="1217962" cy="369332"/>
+          </a:xfrm>
+          <a:prstGeom prst="rect">
+            <a:avLst/>
+          </a:prstGeom>
+          <a:noFill/>
+        </p:spPr>
+        <p:txBody>
+          <a:bodyPr wrap="none" rtlCol="0">
+            <a:spAutoFit/>
+          </a:bodyPr>
+          <a:lstStyle/>
+          <a:p>
+            <a:r>
+              <a:rPr lang="es-ES" dirty="0" smtClean="0"/>
+              <a:t>Blue Target</a:t>
+            </a:r>
+            <a:endParaRPr lang="es-ES" dirty="0"/>
+          </a:p>
+        </p:txBody>
+      </p:sp>
+    </p:spTree>
+  </p:cSld>
+  <p:clrMapOvr>
+    <a:masterClrMapping/>
+  </p:clrMapOvr>
+  <p:timing>
+    <p:tnLst>
+      <p:par>
+        <p:cTn id="1" dur="indefinite" restart="never" nodeType="tmRoot"/>
+      </p:par>
+    </p:tnLst>
+  </p:timing>
+</p:sld>
+</file>
+
 <file path=ppt/slides/slide12.xml><?xml version="1.0" encoding="utf-8"?>
 <p:sld xmlns:a="http://schemas.openxmlformats.org/drawingml/2006/main" xmlns:r="http://schemas.openxmlformats.org/officeDocument/2006/relationships" xmlns:p="http://schemas.openxmlformats.org/presentationml/2006/main">
   <p:cSld>
@@ -4909,7 +4775,7 @@
           <a:p>
             <a:r>
               <a:rPr lang="es-ES" dirty="0" err="1" smtClean="0"/>
-              <a:t>Vrep</a:t>
+              <a:t>DataSets</a:t>
             </a:r>
             <a:endParaRPr lang="es-ES" dirty="0"/>
           </a:p>
@@ -4925,33 +4791,19 @@
             <p:ph sz="quarter" idx="1"/>
           </p:nvPr>
         </p:nvSpPr>
-        <p:spPr/>
+        <p:spPr>
+          <a:xfrm>
+            <a:off x="612648" y="1600200"/>
+            <a:ext cx="8153400" cy="685792"/>
+          </a:xfrm>
+        </p:spPr>
         <p:txBody>
           <a:bodyPr/>
           <a:lstStyle/>
           <a:p>
             <a:r>
               <a:rPr lang="es-ES" dirty="0" smtClean="0"/>
-              <a:t>R</a:t>
-            </a:r>
-            <a:r>
-              <a:rPr lang="es-ES" dirty="0" smtClean="0"/>
-              <a:t>esultados:</a:t>
-            </a:r>
-          </a:p>
-          <a:p>
-            <a:pPr lvl="1"/>
-            <a:r>
-              <a:rPr lang="es-ES" dirty="0" err="1" smtClean="0"/>
-              <a:t>Multiple</a:t>
-            </a:r>
-            <a:r>
-              <a:rPr lang="es-ES" dirty="0" smtClean="0"/>
-              <a:t> </a:t>
-            </a:r>
-            <a:r>
-              <a:rPr lang="es-ES" dirty="0" err="1" smtClean="0"/>
-              <a:t>objects</a:t>
+              <a:t>Generalización de la estructura de las aplicaciones:</a:t>
             </a:r>
             <a:endParaRPr lang="es-ES" dirty="0"/>
           </a:p>
@@ -4959,7 +4811,7 @@
       </p:sp>
       <p:pic>
         <p:nvPicPr>
-          <p:cNvPr id="30724" name="Picture 4" descr="C:\Programming\PFC\Images\c3\sim4_3dtraj.jpg"/>
+          <p:cNvPr id="4097" name="Picture 1" descr="C:\Programming\PFC\Images\c4\Interfaces.jpg"/>
           <p:cNvPicPr>
             <a:picLocks noChangeAspect="1" noChangeArrowheads="1"/>
           </p:cNvPicPr>
@@ -4974,8 +4826,8 @@
         </p:blipFill>
         <p:spPr bwMode="auto">
           <a:xfrm>
-            <a:off x="1571604" y="3071810"/>
-            <a:ext cx="5643602" cy="3402914"/>
+            <a:off x="2214546" y="2428868"/>
+            <a:ext cx="4145972" cy="2306632"/>
           </a:xfrm>
           <a:prstGeom prst="rect">
             <a:avLst/>
@@ -4985,64 +4837,408 @@
       </p:pic>
       <p:sp>
         <p:nvSpPr>
-          <p:cNvPr id="7" name="6 CuadroTexto"/>
-          <p:cNvSpPr txBox="1"/>
+          <p:cNvPr id="5" name="2 Marcador de contenido"/>
+          <p:cNvSpPr txBox="1">
+            <a:spLocks/>
+          </p:cNvSpPr>
           <p:nvPr/>
         </p:nvSpPr>
         <p:spPr>
           <a:xfrm>
-            <a:off x="2571736" y="2714620"/>
-            <a:ext cx="1185453" cy="369332"/>
+            <a:off x="642910" y="2214554"/>
+            <a:ext cx="8153400" cy="1785950"/>
+          </a:xfrm>
+          <a:prstGeom prst="rect">
+            <a:avLst/>
+          </a:prstGeom>
+        </p:spPr>
+        <p:txBody>
+          <a:bodyPr vert="horz">
+            <a:normAutofit/>
+          </a:bodyPr>
+          <a:lstStyle/>
+          <a:p>
+            <a:pPr marL="320040" marR="0" lvl="0" indent="-320040" algn="l" defTabSz="914400" rtl="0" eaLnBrk="1" fontAlgn="auto" latinLnBrk="0" hangingPunct="1">
+              <a:lnSpc>
+                <a:spcPct val="100000"/>
+              </a:lnSpc>
+              <a:spcBef>
+                <a:spcPts val="700"/>
+              </a:spcBef>
+              <a:spcAft>
+                <a:spcPts val="0"/>
+              </a:spcAft>
+              <a:buClr>
+                <a:schemeClr val="accent2"/>
+              </a:buClr>
+              <a:buSzPct val="60000"/>
+              <a:buFont typeface="Wingdings"/>
+              <a:buChar char=""/>
+              <a:tabLst/>
+              <a:defRPr/>
+            </a:pPr>
+            <a:r>
+              <a:rPr kumimoji="0" lang="es-ES" sz="2900" b="0" i="0" u="none" strike="noStrike" kern="1200" cap="none" spc="0" normalizeH="0" baseline="0" noProof="0" dirty="0" smtClean="0">
+                <a:ln>
+                  <a:noFill/>
+                </a:ln>
+                <a:solidFill>
+                  <a:schemeClr val="tx1"/>
+                </a:solidFill>
+                <a:effectLst/>
+                <a:uLnTx/>
+                <a:uFillTx/>
+                <a:latin typeface="+mn-lt"/>
+                <a:ea typeface="+mn-ea"/>
+                <a:cs typeface="+mn-cs"/>
+              </a:rPr>
+              <a:t>Cambio</a:t>
+            </a:r>
+            <a:r>
+              <a:rPr kumimoji="0" lang="es-ES" sz="2900" b="0" i="0" u="none" strike="noStrike" kern="1200" cap="none" spc="0" normalizeH="0" noProof="0" dirty="0" smtClean="0">
+                <a:ln>
+                  <a:noFill/>
+                </a:ln>
+                <a:solidFill>
+                  <a:schemeClr val="tx1"/>
+                </a:solidFill>
+                <a:effectLst/>
+                <a:uLnTx/>
+                <a:uFillTx/>
+                <a:latin typeface="+mn-lt"/>
+                <a:ea typeface="+mn-ea"/>
+                <a:cs typeface="+mn-cs"/>
+              </a:rPr>
+              <a:t> de simulación de </a:t>
+            </a:r>
+            <a:r>
+              <a:rPr kumimoji="0" lang="es-ES" sz="2900" b="0" i="0" u="none" strike="noStrike" kern="1200" cap="none" spc="0" normalizeH="0" noProof="0" dirty="0" err="1" smtClean="0">
+                <a:ln>
+                  <a:noFill/>
+                </a:ln>
+                <a:solidFill>
+                  <a:schemeClr val="tx1"/>
+                </a:solidFill>
+                <a:effectLst/>
+                <a:uLnTx/>
+                <a:uFillTx/>
+                <a:latin typeface="+mn-lt"/>
+                <a:ea typeface="+mn-ea"/>
+                <a:cs typeface="+mn-cs"/>
+              </a:rPr>
+              <a:t>Quads</a:t>
+            </a:r>
+            <a:r>
+              <a:rPr kumimoji="0" lang="es-ES" sz="2900" b="0" i="0" u="none" strike="noStrike" kern="1200" cap="none" spc="0" normalizeH="0" noProof="0" dirty="0" smtClean="0">
+                <a:ln>
+                  <a:noFill/>
+                </a:ln>
+                <a:solidFill>
+                  <a:schemeClr val="tx1"/>
+                </a:solidFill>
+                <a:effectLst/>
+                <a:uLnTx/>
+                <a:uFillTx/>
+                <a:latin typeface="+mn-lt"/>
+                <a:ea typeface="+mn-ea"/>
+                <a:cs typeface="+mn-cs"/>
+              </a:rPr>
+              <a:t> por Imágenes de los </a:t>
+            </a:r>
+            <a:r>
+              <a:rPr kumimoji="0" lang="es-ES" sz="2900" b="0" i="0" u="none" strike="noStrike" kern="1200" cap="none" spc="0" normalizeH="0" noProof="0" dirty="0" err="1" smtClean="0">
+                <a:ln>
+                  <a:noFill/>
+                </a:ln>
+                <a:solidFill>
+                  <a:schemeClr val="tx1"/>
+                </a:solidFill>
+                <a:effectLst/>
+                <a:uLnTx/>
+                <a:uFillTx/>
+                <a:latin typeface="+mn-lt"/>
+                <a:ea typeface="+mn-ea"/>
+                <a:cs typeface="+mn-cs"/>
+              </a:rPr>
+              <a:t>datasets</a:t>
+            </a:r>
+            <a:endParaRPr kumimoji="0" lang="es-ES" sz="2900" b="0" i="0" u="none" strike="noStrike" kern="1200" cap="none" spc="0" normalizeH="0" noProof="0" dirty="0" smtClean="0">
+              <a:ln>
+                <a:noFill/>
+              </a:ln>
+              <a:solidFill>
+                <a:schemeClr val="tx1"/>
+              </a:solidFill>
+              <a:effectLst/>
+              <a:uLnTx/>
+              <a:uFillTx/>
+              <a:latin typeface="+mn-lt"/>
+              <a:ea typeface="+mn-ea"/>
+              <a:cs typeface="+mn-cs"/>
+            </a:endParaRPr>
+          </a:p>
+          <a:p>
+            <a:pPr marL="320040" marR="0" lvl="0" indent="-320040" algn="l" defTabSz="914400" rtl="0" eaLnBrk="1" fontAlgn="auto" latinLnBrk="0" hangingPunct="1">
+              <a:lnSpc>
+                <a:spcPct val="100000"/>
+              </a:lnSpc>
+              <a:spcBef>
+                <a:spcPts val="700"/>
+              </a:spcBef>
+              <a:spcAft>
+                <a:spcPts val="0"/>
+              </a:spcAft>
+              <a:buClr>
+                <a:schemeClr val="accent2"/>
+              </a:buClr>
+              <a:buSzPct val="60000"/>
+              <a:buFont typeface="Wingdings"/>
+              <a:buChar char=""/>
+              <a:tabLst/>
+              <a:defRPr/>
+            </a:pPr>
+            <a:r>
+              <a:rPr lang="es-ES" sz="2900" dirty="0" smtClean="0"/>
+              <a:t>La Estación de tierra se mantiene en el PC</a:t>
+            </a:r>
+            <a:endParaRPr kumimoji="0" lang="es-ES" sz="2900" b="0" i="0" u="none" strike="noStrike" kern="1200" cap="none" spc="0" normalizeH="0" noProof="0" dirty="0" smtClean="0">
+              <a:ln>
+                <a:noFill/>
+              </a:ln>
+              <a:solidFill>
+                <a:schemeClr val="tx1"/>
+              </a:solidFill>
+              <a:effectLst/>
+              <a:uLnTx/>
+              <a:uFillTx/>
+              <a:latin typeface="+mn-lt"/>
+              <a:ea typeface="+mn-ea"/>
+              <a:cs typeface="+mn-cs"/>
+            </a:endParaRPr>
+          </a:p>
+        </p:txBody>
+      </p:sp>
+      <p:sp>
+        <p:nvSpPr>
+          <p:cNvPr id="6" name="2 Marcador de contenido"/>
+          <p:cNvSpPr txBox="1">
+            <a:spLocks/>
+          </p:cNvSpPr>
+          <p:nvPr/>
+        </p:nvSpPr>
+        <p:spPr>
+          <a:xfrm>
+            <a:off x="642910" y="3929066"/>
+            <a:ext cx="8153400" cy="1500198"/>
+          </a:xfrm>
+          <a:prstGeom prst="rect">
+            <a:avLst/>
+          </a:prstGeom>
+        </p:spPr>
+        <p:txBody>
+          <a:bodyPr vert="horz">
+            <a:normAutofit/>
+          </a:bodyPr>
+          <a:lstStyle/>
+          <a:p>
+            <a:pPr marL="320040" marR="0" lvl="0" indent="-320040" algn="l" defTabSz="914400" rtl="0" eaLnBrk="1" fontAlgn="auto" latinLnBrk="0" hangingPunct="1">
+              <a:lnSpc>
+                <a:spcPct val="100000"/>
+              </a:lnSpc>
+              <a:spcBef>
+                <a:spcPts val="700"/>
+              </a:spcBef>
+              <a:spcAft>
+                <a:spcPts val="0"/>
+              </a:spcAft>
+              <a:buClr>
+                <a:schemeClr val="accent2"/>
+              </a:buClr>
+              <a:buSzPct val="60000"/>
+              <a:buFont typeface="Wingdings"/>
+              <a:buChar char=""/>
+              <a:tabLst/>
+              <a:defRPr/>
+            </a:pPr>
+            <a:r>
+              <a:rPr kumimoji="0" lang="es-ES" sz="2900" b="0" i="0" u="none" strike="noStrike" kern="1200" cap="none" spc="0" normalizeH="0" baseline="0" noProof="0" dirty="0" smtClean="0">
+                <a:ln>
+                  <a:noFill/>
+                </a:ln>
+                <a:solidFill>
+                  <a:schemeClr val="tx1"/>
+                </a:solidFill>
+                <a:effectLst/>
+                <a:uLnTx/>
+                <a:uFillTx/>
+                <a:latin typeface="+mn-lt"/>
+                <a:ea typeface="+mn-ea"/>
+                <a:cs typeface="+mn-cs"/>
+              </a:rPr>
+              <a:t>Visión</a:t>
+            </a:r>
+            <a:r>
+              <a:rPr kumimoji="0" lang="es-ES" sz="2900" b="0" i="0" u="none" strike="noStrike" kern="1200" cap="none" spc="0" normalizeH="0" noProof="0" dirty="0" smtClean="0">
+                <a:ln>
+                  <a:noFill/>
+                </a:ln>
+                <a:solidFill>
+                  <a:schemeClr val="tx1"/>
+                </a:solidFill>
+                <a:effectLst/>
+                <a:uLnTx/>
+                <a:uFillTx/>
+                <a:latin typeface="+mn-lt"/>
+                <a:ea typeface="+mn-ea"/>
+                <a:cs typeface="+mn-cs"/>
+              </a:rPr>
+              <a:t> artificial sobre los </a:t>
+            </a:r>
+            <a:r>
+              <a:rPr kumimoji="0" lang="es-ES" sz="2900" b="0" i="0" u="none" strike="noStrike" kern="1200" cap="none" spc="0" normalizeH="0" noProof="0" dirty="0" err="1" smtClean="0">
+                <a:ln>
+                  <a:noFill/>
+                </a:ln>
+                <a:solidFill>
+                  <a:schemeClr val="tx1"/>
+                </a:solidFill>
+                <a:effectLst/>
+                <a:uLnTx/>
+                <a:uFillTx/>
+                <a:latin typeface="+mn-lt"/>
+                <a:ea typeface="+mn-ea"/>
+                <a:cs typeface="+mn-cs"/>
+              </a:rPr>
+              <a:t>Quads</a:t>
+            </a:r>
+            <a:r>
+              <a:rPr kumimoji="0" lang="es-ES" sz="2900" b="0" i="0" u="none" strike="noStrike" kern="1200" cap="none" spc="0" normalizeH="0" noProof="0" dirty="0" smtClean="0">
+                <a:ln>
+                  <a:noFill/>
+                </a:ln>
+                <a:solidFill>
+                  <a:schemeClr val="tx1"/>
+                </a:solidFill>
+                <a:effectLst/>
+                <a:uLnTx/>
+                <a:uFillTx/>
+                <a:latin typeface="+mn-lt"/>
+                <a:ea typeface="+mn-ea"/>
+                <a:cs typeface="+mn-cs"/>
+              </a:rPr>
+              <a:t> usando “</a:t>
+            </a:r>
+            <a:r>
+              <a:rPr kumimoji="0" lang="es-ES" sz="2900" b="0" i="0" u="none" strike="noStrike" kern="1200" cap="none" spc="0" normalizeH="0" noProof="0" dirty="0" err="1" smtClean="0">
+                <a:ln>
+                  <a:noFill/>
+                </a:ln>
+                <a:solidFill>
+                  <a:schemeClr val="tx1"/>
+                </a:solidFill>
+                <a:effectLst/>
+                <a:uLnTx/>
+                <a:uFillTx/>
+                <a:latin typeface="+mn-lt"/>
+                <a:ea typeface="+mn-ea"/>
+                <a:cs typeface="+mn-cs"/>
+              </a:rPr>
+              <a:t>on-board</a:t>
+            </a:r>
+            <a:r>
+              <a:rPr kumimoji="0" lang="es-ES" sz="2900" b="0" i="0" u="none" strike="noStrike" kern="1200" cap="none" spc="0" normalizeH="0" noProof="0" dirty="0" smtClean="0">
+                <a:ln>
+                  <a:noFill/>
+                </a:ln>
+                <a:solidFill>
+                  <a:schemeClr val="tx1"/>
+                </a:solidFill>
+                <a:effectLst/>
+                <a:uLnTx/>
+                <a:uFillTx/>
+                <a:latin typeface="+mn-lt"/>
+                <a:ea typeface="+mn-ea"/>
+                <a:cs typeface="+mn-cs"/>
+              </a:rPr>
+              <a:t> </a:t>
+            </a:r>
+            <a:r>
+              <a:rPr kumimoji="0" lang="es-ES" sz="2900" b="0" i="0" u="none" strike="noStrike" kern="1200" cap="none" spc="0" normalizeH="0" noProof="0" dirty="0" err="1" smtClean="0">
+                <a:ln>
+                  <a:noFill/>
+                </a:ln>
+                <a:solidFill>
+                  <a:schemeClr val="tx1"/>
+                </a:solidFill>
+                <a:effectLst/>
+                <a:uLnTx/>
+                <a:uFillTx/>
+                <a:latin typeface="+mn-lt"/>
+                <a:ea typeface="+mn-ea"/>
+                <a:cs typeface="+mn-cs"/>
+              </a:rPr>
+              <a:t>computers</a:t>
+            </a:r>
+            <a:r>
+              <a:rPr kumimoji="0" lang="es-ES" sz="2900" b="0" i="0" u="none" strike="noStrike" kern="1200" cap="none" spc="0" normalizeH="0" noProof="0" dirty="0" smtClean="0">
+                <a:ln>
+                  <a:noFill/>
+                </a:ln>
+                <a:solidFill>
+                  <a:schemeClr val="tx1"/>
+                </a:solidFill>
+                <a:effectLst/>
+                <a:uLnTx/>
+                <a:uFillTx/>
+                <a:latin typeface="+mn-lt"/>
+                <a:ea typeface="+mn-ea"/>
+                <a:cs typeface="+mn-cs"/>
+              </a:rPr>
+              <a:t>”</a:t>
+            </a:r>
+            <a:endParaRPr kumimoji="0" lang="es-ES" sz="2900" b="0" i="0" u="none" strike="noStrike" kern="1200" cap="none" spc="0" normalizeH="0" baseline="0" noProof="0" dirty="0">
+              <a:ln>
+                <a:noFill/>
+              </a:ln>
+              <a:solidFill>
+                <a:schemeClr val="tx1"/>
+              </a:solidFill>
+              <a:effectLst/>
+              <a:uLnTx/>
+              <a:uFillTx/>
+              <a:latin typeface="+mn-lt"/>
+              <a:ea typeface="+mn-ea"/>
+              <a:cs typeface="+mn-cs"/>
+            </a:endParaRPr>
+          </a:p>
+        </p:txBody>
+      </p:sp>
+      <p:pic>
+        <p:nvPicPr>
+          <p:cNvPr id="4098" name="Picture 2" descr="C:\Programming\PFC\Images\c4\odroidu3.jpg"/>
+          <p:cNvPicPr>
+            <a:picLocks noChangeAspect="1" noChangeArrowheads="1"/>
+          </p:cNvPicPr>
+          <p:nvPr/>
+        </p:nvPicPr>
+        <p:blipFill>
+          <a:blip r:embed="rId3"/>
+          <a:srcRect/>
+          <a:stretch>
+            <a:fillRect/>
+          </a:stretch>
+        </p:blipFill>
+        <p:spPr bwMode="auto">
+          <a:xfrm>
+            <a:off x="4643438" y="4643446"/>
+            <a:ext cx="3030455" cy="1757664"/>
           </a:xfrm>
           <a:prstGeom prst="rect">
             <a:avLst/>
           </a:prstGeom>
           <a:noFill/>
         </p:spPr>
-        <p:txBody>
-          <a:bodyPr wrap="none" rtlCol="0">
-            <a:spAutoFit/>
-          </a:bodyPr>
-          <a:lstStyle/>
-          <a:p>
-            <a:r>
-              <a:rPr lang="es-ES" dirty="0" smtClean="0"/>
-              <a:t>Red Target</a:t>
-            </a:r>
-            <a:endParaRPr lang="es-ES" dirty="0"/>
-          </a:p>
-        </p:txBody>
-      </p:sp>
-      <p:sp>
-        <p:nvSpPr>
-          <p:cNvPr id="8" name="7 CuadroTexto"/>
-          <p:cNvSpPr txBox="1"/>
-          <p:nvPr/>
-        </p:nvSpPr>
-        <p:spPr>
-          <a:xfrm>
-            <a:off x="5286380" y="2643182"/>
-            <a:ext cx="1217962" cy="369332"/>
-          </a:xfrm>
-          <a:prstGeom prst="rect">
-            <a:avLst/>
-          </a:prstGeom>
-          <a:noFill/>
-        </p:spPr>
-        <p:txBody>
-          <a:bodyPr wrap="none" rtlCol="0">
-            <a:spAutoFit/>
-          </a:bodyPr>
-          <a:lstStyle/>
-          <a:p>
-            <a:r>
-              <a:rPr lang="es-ES" dirty="0" smtClean="0"/>
-              <a:t>Blue Target</a:t>
-            </a:r>
-            <a:endParaRPr lang="es-ES" dirty="0"/>
-          </a:p>
-        </p:txBody>
-      </p:sp>
+      </p:pic>
     </p:spTree>
   </p:cSld>
   <p:clrMapOvr>
@@ -5051,9 +5247,180 @@
   <p:timing>
     <p:tnLst>
       <p:par>
-        <p:cTn id="1" dur="indefinite" restart="never" nodeType="tmRoot"/>
+        <p:cTn id="1" dur="indefinite" restart="never" nodeType="tmRoot">
+          <p:childTnLst>
+            <p:seq concurrent="1" nextAc="seek">
+              <p:cTn id="2" dur="indefinite" nodeType="mainSeq">
+                <p:childTnLst>
+                  <p:par>
+                    <p:cTn id="3" fill="hold">
+                      <p:stCondLst>
+                        <p:cond delay="indefinite"/>
+                      </p:stCondLst>
+                      <p:childTnLst>
+                        <p:par>
+                          <p:cTn id="4" fill="hold">
+                            <p:stCondLst>
+                              <p:cond delay="0"/>
+                            </p:stCondLst>
+                            <p:childTnLst>
+                              <p:par>
+                                <p:cTn id="5" presetID="1" presetClass="exit" presetSubtype="0" fill="hold" nodeType="clickEffect">
+                                  <p:stCondLst>
+                                    <p:cond delay="0"/>
+                                  </p:stCondLst>
+                                  <p:childTnLst>
+                                    <p:set>
+                                      <p:cBhvr>
+                                        <p:cTn id="6" dur="1" fill="hold">
+                                          <p:stCondLst>
+                                            <p:cond delay="0"/>
+                                          </p:stCondLst>
+                                        </p:cTn>
+                                        <p:tgtEl>
+                                          <p:spTgt spid="4097"/>
+                                        </p:tgtEl>
+                                        <p:attrNameLst>
+                                          <p:attrName>style.visibility</p:attrName>
+                                        </p:attrNameLst>
+                                      </p:cBhvr>
+                                      <p:to>
+                                        <p:strVal val="hidden"/>
+                                      </p:to>
+                                    </p:set>
+                                  </p:childTnLst>
+                                </p:cTn>
+                              </p:par>
+                              <p:par>
+                                <p:cTn id="7" presetID="1" presetClass="entr" presetSubtype="0" fill="hold" grpId="0" nodeType="withEffect">
+                                  <p:stCondLst>
+                                    <p:cond delay="0"/>
+                                  </p:stCondLst>
+                                  <p:childTnLst>
+                                    <p:set>
+                                      <p:cBhvr>
+                                        <p:cTn id="8" dur="1" fill="hold">
+                                          <p:stCondLst>
+                                            <p:cond delay="0"/>
+                                          </p:stCondLst>
+                                        </p:cTn>
+                                        <p:tgtEl>
+                                          <p:spTgt spid="5"/>
+                                        </p:tgtEl>
+                                        <p:attrNameLst>
+                                          <p:attrName>style.visibility</p:attrName>
+                                        </p:attrNameLst>
+                                      </p:cBhvr>
+                                      <p:to>
+                                        <p:strVal val="visible"/>
+                                      </p:to>
+                                    </p:set>
+                                  </p:childTnLst>
+                                </p:cTn>
+                              </p:par>
+                            </p:childTnLst>
+                          </p:cTn>
+                        </p:par>
+                      </p:childTnLst>
+                    </p:cTn>
+                  </p:par>
+                  <p:par>
+                    <p:cTn id="9" fill="hold">
+                      <p:stCondLst>
+                        <p:cond delay="indefinite"/>
+                      </p:stCondLst>
+                      <p:childTnLst>
+                        <p:par>
+                          <p:cTn id="10" fill="hold">
+                            <p:stCondLst>
+                              <p:cond delay="0"/>
+                            </p:stCondLst>
+                            <p:childTnLst>
+                              <p:par>
+                                <p:cTn id="11" presetID="1" presetClass="entr" presetSubtype="0" fill="hold" nodeType="clickEffect">
+                                  <p:stCondLst>
+                                    <p:cond delay="0"/>
+                                  </p:stCondLst>
+                                  <p:childTnLst>
+                                    <p:set>
+                                      <p:cBhvr>
+                                        <p:cTn id="12" dur="1" fill="hold">
+                                          <p:stCondLst>
+                                            <p:cond delay="0"/>
+                                          </p:stCondLst>
+                                        </p:cTn>
+                                        <p:tgtEl>
+                                          <p:spTgt spid="4098"/>
+                                        </p:tgtEl>
+                                        <p:attrNameLst>
+                                          <p:attrName>style.visibility</p:attrName>
+                                        </p:attrNameLst>
+                                      </p:cBhvr>
+                                      <p:to>
+                                        <p:strVal val="visible"/>
+                                      </p:to>
+                                    </p:set>
+                                  </p:childTnLst>
+                                </p:cTn>
+                              </p:par>
+                              <p:par>
+                                <p:cTn id="13" presetID="1" presetClass="entr" presetSubtype="0" fill="hold" grpId="0" nodeType="withEffect">
+                                  <p:stCondLst>
+                                    <p:cond delay="0"/>
+                                  </p:stCondLst>
+                                  <p:childTnLst>
+                                    <p:set>
+                                      <p:cBhvr>
+                                        <p:cTn id="14" dur="1" fill="hold">
+                                          <p:stCondLst>
+                                            <p:cond delay="0"/>
+                                          </p:stCondLst>
+                                        </p:cTn>
+                                        <p:tgtEl>
+                                          <p:spTgt spid="6"/>
+                                        </p:tgtEl>
+                                        <p:attrNameLst>
+                                          <p:attrName>style.visibility</p:attrName>
+                                        </p:attrNameLst>
+                                      </p:cBhvr>
+                                      <p:to>
+                                        <p:strVal val="visible"/>
+                                      </p:to>
+                                    </p:set>
+                                  </p:childTnLst>
+                                </p:cTn>
+                              </p:par>
+                            </p:childTnLst>
+                          </p:cTn>
+                        </p:par>
+                      </p:childTnLst>
+                    </p:cTn>
+                  </p:par>
+                </p:childTnLst>
+              </p:cTn>
+              <p:prevCondLst>
+                <p:cond evt="onPrev" delay="0">
+                  <p:tgtEl>
+                    <p:sldTgt/>
+                  </p:tgtEl>
+                </p:cond>
+              </p:prevCondLst>
+              <p:nextCondLst>
+                <p:cond evt="onNext" delay="0">
+                  <p:tgtEl>
+                    <p:sldTgt/>
+                  </p:tgtEl>
+                </p:cond>
+              </p:nextCondLst>
+            </p:seq>
+          </p:childTnLst>
+        </p:cTn>
       </p:par>
     </p:tnLst>
+    <p:bldLst>
+      <p:bldP spid="5" grpId="0"/>
+      <p:bldP spid="6" grpId="0"/>
+    </p:bldLst>
   </p:timing>
 </p:sld>
 </file>
@@ -5115,12 +5482,64 @@
           <a:p>
             <a:r>
               <a:rPr lang="es-ES" dirty="0" smtClean="0"/>
-              <a:t>Estructura</a:t>
+              <a:t>Resultados</a:t>
             </a:r>
             <a:endParaRPr lang="es-ES" dirty="0"/>
           </a:p>
         </p:txBody>
       </p:sp>
+      <p:pic>
+        <p:nvPicPr>
+          <p:cNvPr id="3073" name="Picture 1" descr="C:\Programming\PFC\Images\c4\arch_trajs_stero.jpg"/>
+          <p:cNvPicPr>
+            <a:picLocks noChangeAspect="1" noChangeArrowheads="1"/>
+          </p:cNvPicPr>
+          <p:nvPr/>
+        </p:nvPicPr>
+        <p:blipFill>
+          <a:blip r:embed="rId2"/>
+          <a:srcRect/>
+          <a:stretch>
+            <a:fillRect/>
+          </a:stretch>
+        </p:blipFill>
+        <p:spPr bwMode="auto">
+          <a:xfrm>
+            <a:off x="714348" y="2586601"/>
+            <a:ext cx="3862361" cy="3059105"/>
+          </a:xfrm>
+          <a:prstGeom prst="rect">
+            <a:avLst/>
+          </a:prstGeom>
+          <a:noFill/>
+        </p:spPr>
+      </p:pic>
+      <p:pic>
+        <p:nvPicPr>
+          <p:cNvPr id="3074" name="Picture 2" descr="C:\Programming\PFC\Images\c4\errors_stereo.jpg"/>
+          <p:cNvPicPr>
+            <a:picLocks noChangeAspect="1" noChangeArrowheads="1"/>
+          </p:cNvPicPr>
+          <p:nvPr/>
+        </p:nvPicPr>
+        <p:blipFill>
+          <a:blip r:embed="rId3"/>
+          <a:srcRect/>
+          <a:stretch>
+            <a:fillRect/>
+          </a:stretch>
+        </p:blipFill>
+        <p:spPr bwMode="auto">
+          <a:xfrm>
+            <a:off x="4786314" y="2571744"/>
+            <a:ext cx="3857652" cy="2888081"/>
+          </a:xfrm>
+          <a:prstGeom prst="rect">
+            <a:avLst/>
+          </a:prstGeom>
+          <a:noFill/>
+        </p:spPr>
+      </p:pic>
     </p:spTree>
   </p:cSld>
   <p:clrMapOvr>
@@ -5170,7 +5589,11 @@
           <a:p>
             <a:r>
               <a:rPr lang="es-ES" dirty="0" err="1" smtClean="0"/>
-              <a:t>DataSets</a:t>
+              <a:t>Future</a:t>
+            </a:r>
+            <a:r>
+              <a:rPr lang="es-ES" dirty="0" smtClean="0"/>
+              <a:t> Works</a:t>
             </a:r>
             <a:endParaRPr lang="es-ES" dirty="0"/>
           </a:p>
@@ -5186,16 +5609,268 @@
             <p:ph sz="quarter" idx="1"/>
           </p:nvPr>
         </p:nvSpPr>
-        <p:spPr/>
+        <p:spPr>
+          <a:xfrm>
+            <a:off x="612648" y="1600200"/>
+            <a:ext cx="8153400" cy="1114420"/>
+          </a:xfrm>
+        </p:spPr>
         <p:txBody>
           <a:bodyPr/>
           <a:lstStyle/>
           <a:p>
             <a:r>
               <a:rPr lang="es-ES" dirty="0" smtClean="0"/>
-              <a:t>Resultados</a:t>
+              <a:t>Visión Artificial con procesamiento en Paralelo usando la GPU.</a:t>
             </a:r>
             <a:endParaRPr lang="es-ES" dirty="0"/>
+          </a:p>
+        </p:txBody>
+      </p:sp>
+      <p:pic>
+        <p:nvPicPr>
+          <p:cNvPr id="2049" name="Picture 1" descr="C:\Programming\PFC\Images\c5\gpu.jpg"/>
+          <p:cNvPicPr>
+            <a:picLocks noChangeAspect="1" noChangeArrowheads="1"/>
+          </p:cNvPicPr>
+          <p:nvPr/>
+        </p:nvPicPr>
+        <p:blipFill>
+          <a:blip r:embed="rId2"/>
+          <a:srcRect/>
+          <a:stretch>
+            <a:fillRect/>
+          </a:stretch>
+        </p:blipFill>
+        <p:spPr bwMode="auto">
+          <a:xfrm>
+            <a:off x="2214546" y="2714620"/>
+            <a:ext cx="4714908" cy="3387002"/>
+          </a:xfrm>
+          <a:prstGeom prst="rect">
+            <a:avLst/>
+          </a:prstGeom>
+          <a:noFill/>
+        </p:spPr>
+      </p:pic>
+      <p:pic>
+        <p:nvPicPr>
+          <p:cNvPr id="2050" name="Picture 2" descr="C:\Programming\PFC\Images\c6\shape_recogn.jpg"/>
+          <p:cNvPicPr>
+            <a:picLocks noChangeAspect="1" noChangeArrowheads="1"/>
+          </p:cNvPicPr>
+          <p:nvPr/>
+        </p:nvPicPr>
+        <p:blipFill>
+          <a:blip r:embed="rId3"/>
+          <a:srcRect/>
+          <a:stretch>
+            <a:fillRect/>
+          </a:stretch>
+        </p:blipFill>
+        <p:spPr bwMode="auto">
+          <a:xfrm>
+            <a:off x="2643174" y="3357562"/>
+            <a:ext cx="3634288" cy="2725716"/>
+          </a:xfrm>
+          <a:prstGeom prst="rect">
+            <a:avLst/>
+          </a:prstGeom>
+          <a:noFill/>
+        </p:spPr>
+      </p:pic>
+      <p:pic>
+        <p:nvPicPr>
+          <p:cNvPr id="2051" name="Picture 3" descr="C:\Programming\PFC\Images\c6\big_data.jpg"/>
+          <p:cNvPicPr>
+            <a:picLocks noChangeAspect="1" noChangeArrowheads="1"/>
+          </p:cNvPicPr>
+          <p:nvPr/>
+        </p:nvPicPr>
+        <p:blipFill>
+          <a:blip r:embed="rId4"/>
+          <a:srcRect/>
+          <a:stretch>
+            <a:fillRect/>
+          </a:stretch>
+        </p:blipFill>
+        <p:spPr bwMode="auto">
+          <a:xfrm>
+            <a:off x="2571736" y="4500570"/>
+            <a:ext cx="3500462" cy="1951772"/>
+          </a:xfrm>
+          <a:prstGeom prst="rect">
+            <a:avLst/>
+          </a:prstGeom>
+          <a:noFill/>
+        </p:spPr>
+      </p:pic>
+      <p:sp>
+        <p:nvSpPr>
+          <p:cNvPr id="7" name="2 Marcador de contenido"/>
+          <p:cNvSpPr txBox="1">
+            <a:spLocks/>
+          </p:cNvSpPr>
+          <p:nvPr/>
+        </p:nvSpPr>
+        <p:spPr>
+          <a:xfrm>
+            <a:off x="642910" y="2643182"/>
+            <a:ext cx="8153400" cy="1114420"/>
+          </a:xfrm>
+          <a:prstGeom prst="rect">
+            <a:avLst/>
+          </a:prstGeom>
+        </p:spPr>
+        <p:txBody>
+          <a:bodyPr vert="horz">
+            <a:normAutofit/>
+          </a:bodyPr>
+          <a:lstStyle/>
+          <a:p>
+            <a:pPr marL="320040" marR="0" lvl="0" indent="-320040" algn="l" defTabSz="914400" rtl="0" eaLnBrk="1" fontAlgn="auto" latinLnBrk="0" hangingPunct="1">
+              <a:lnSpc>
+                <a:spcPct val="100000"/>
+              </a:lnSpc>
+              <a:spcBef>
+                <a:spcPts val="700"/>
+              </a:spcBef>
+              <a:spcAft>
+                <a:spcPts val="0"/>
+              </a:spcAft>
+              <a:buClr>
+                <a:schemeClr val="accent2"/>
+              </a:buClr>
+              <a:buSzPct val="60000"/>
+              <a:buFont typeface="Wingdings"/>
+              <a:buChar char=""/>
+              <a:tabLst/>
+              <a:defRPr/>
+            </a:pPr>
+            <a:r>
+              <a:rPr kumimoji="0" lang="es-ES" sz="2900" b="0" i="0" u="none" strike="noStrike" kern="1200" cap="none" spc="0" normalizeH="0" baseline="0" noProof="0" dirty="0" smtClean="0">
+                <a:ln>
+                  <a:noFill/>
+                </a:ln>
+                <a:solidFill>
+                  <a:schemeClr val="tx1"/>
+                </a:solidFill>
+                <a:effectLst/>
+                <a:uLnTx/>
+                <a:uFillTx/>
+                <a:latin typeface="+mn-lt"/>
+                <a:ea typeface="+mn-ea"/>
+                <a:cs typeface="+mn-cs"/>
+              </a:rPr>
+              <a:t>Reconocimiento de formas.</a:t>
+            </a:r>
+            <a:endParaRPr kumimoji="0" lang="es-ES" sz="2900" b="0" i="0" u="none" strike="noStrike" kern="1200" cap="none" spc="0" normalizeH="0" baseline="0" noProof="0" dirty="0">
+              <a:ln>
+                <a:noFill/>
+              </a:ln>
+              <a:solidFill>
+                <a:schemeClr val="tx1"/>
+              </a:solidFill>
+              <a:effectLst/>
+              <a:uLnTx/>
+              <a:uFillTx/>
+              <a:latin typeface="+mn-lt"/>
+              <a:ea typeface="+mn-ea"/>
+              <a:cs typeface="+mn-cs"/>
+            </a:endParaRPr>
+          </a:p>
+        </p:txBody>
+      </p:sp>
+      <p:sp>
+        <p:nvSpPr>
+          <p:cNvPr id="8" name="2 Marcador de contenido"/>
+          <p:cNvSpPr txBox="1">
+            <a:spLocks/>
+          </p:cNvSpPr>
+          <p:nvPr/>
+        </p:nvSpPr>
+        <p:spPr>
+          <a:xfrm>
+            <a:off x="642910" y="3286124"/>
+            <a:ext cx="8153400" cy="1114420"/>
+          </a:xfrm>
+          <a:prstGeom prst="rect">
+            <a:avLst/>
+          </a:prstGeom>
+        </p:spPr>
+        <p:txBody>
+          <a:bodyPr vert="horz">
+            <a:normAutofit/>
+          </a:bodyPr>
+          <a:lstStyle/>
+          <a:p>
+            <a:pPr marL="320040" marR="0" lvl="0" indent="-320040" algn="l" defTabSz="914400" rtl="0" eaLnBrk="1" fontAlgn="auto" latinLnBrk="0" hangingPunct="1">
+              <a:lnSpc>
+                <a:spcPct val="100000"/>
+              </a:lnSpc>
+              <a:spcBef>
+                <a:spcPts val="700"/>
+              </a:spcBef>
+              <a:spcAft>
+                <a:spcPts val="0"/>
+              </a:spcAft>
+              <a:buClr>
+                <a:schemeClr val="accent2"/>
+              </a:buClr>
+              <a:buSzPct val="60000"/>
+              <a:buFont typeface="Wingdings"/>
+              <a:buChar char=""/>
+              <a:tabLst/>
+              <a:defRPr/>
+            </a:pPr>
+            <a:r>
+              <a:rPr kumimoji="0" lang="es-ES" sz="2900" b="0" i="0" u="none" strike="noStrike" kern="1200" cap="none" spc="0" normalizeH="0" baseline="0" noProof="0" dirty="0" smtClean="0">
+                <a:ln>
+                  <a:noFill/>
+                </a:ln>
+                <a:solidFill>
+                  <a:schemeClr val="tx1"/>
+                </a:solidFill>
+                <a:effectLst/>
+                <a:uLnTx/>
+                <a:uFillTx/>
+                <a:latin typeface="+mn-lt"/>
+                <a:ea typeface="+mn-ea"/>
+                <a:cs typeface="+mn-cs"/>
+              </a:rPr>
+              <a:t>Arquitectura para el almacenamiento</a:t>
+            </a:r>
+            <a:r>
+              <a:rPr kumimoji="0" lang="es-ES" sz="2900" b="0" i="0" u="none" strike="noStrike" kern="1200" cap="none" spc="0" normalizeH="0" noProof="0" dirty="0" smtClean="0">
+                <a:ln>
+                  <a:noFill/>
+                </a:ln>
+                <a:solidFill>
+                  <a:schemeClr val="tx1"/>
+                </a:solidFill>
+                <a:effectLst/>
+                <a:uLnTx/>
+                <a:uFillTx/>
+                <a:latin typeface="+mn-lt"/>
+                <a:ea typeface="+mn-ea"/>
+                <a:cs typeface="+mn-cs"/>
+              </a:rPr>
+              <a:t> y uso posterior de la cantidad masiva de datos.</a:t>
+            </a:r>
+            <a:endParaRPr kumimoji="0" lang="es-ES" sz="2900" b="0" i="0" u="none" strike="noStrike" kern="1200" cap="none" spc="0" normalizeH="0" baseline="0" noProof="0" dirty="0">
+              <a:ln>
+                <a:noFill/>
+              </a:ln>
+              <a:solidFill>
+                <a:schemeClr val="tx1"/>
+              </a:solidFill>
+              <a:effectLst/>
+              <a:uLnTx/>
+              <a:uFillTx/>
+              <a:latin typeface="+mn-lt"/>
+              <a:ea typeface="+mn-ea"/>
+              <a:cs typeface="+mn-cs"/>
+            </a:endParaRPr>
           </a:p>
         </p:txBody>
       </p:sp>
@@ -5207,9 +5882,234 @@
   <p:timing>
     <p:tnLst>
       <p:par>
-        <p:cTn id="1" dur="indefinite" restart="never" nodeType="tmRoot"/>
+        <p:cTn id="1" dur="indefinite" restart="never" nodeType="tmRoot">
+          <p:childTnLst>
+            <p:seq concurrent="1" nextAc="seek">
+              <p:cTn id="2" dur="indefinite" nodeType="mainSeq">
+                <p:childTnLst>
+                  <p:par>
+                    <p:cTn id="3" fill="hold">
+                      <p:stCondLst>
+                        <p:cond delay="indefinite"/>
+                      </p:stCondLst>
+                      <p:childTnLst>
+                        <p:par>
+                          <p:cTn id="4" fill="hold">
+                            <p:stCondLst>
+                              <p:cond delay="0"/>
+                            </p:stCondLst>
+                            <p:childTnLst>
+                              <p:par>
+                                <p:cTn id="5" presetID="1" presetClass="entr" presetSubtype="0" fill="hold" grpId="0" nodeType="clickEffect">
+                                  <p:stCondLst>
+                                    <p:cond delay="0"/>
+                                  </p:stCondLst>
+                                  <p:childTnLst>
+                                    <p:set>
+                                      <p:cBhvr>
+                                        <p:cTn id="6" dur="1" fill="hold">
+                                          <p:stCondLst>
+                                            <p:cond delay="0"/>
+                                          </p:stCondLst>
+                                        </p:cTn>
+                                        <p:tgtEl>
+                                          <p:spTgt spid="7"/>
+                                        </p:tgtEl>
+                                        <p:attrNameLst>
+                                          <p:attrName>style.visibility</p:attrName>
+                                        </p:attrNameLst>
+                                      </p:cBhvr>
+                                      <p:to>
+                                        <p:strVal val="visible"/>
+                                      </p:to>
+                                    </p:set>
+                                  </p:childTnLst>
+                                </p:cTn>
+                              </p:par>
+                              <p:par>
+                                <p:cTn id="7" presetID="1" presetClass="entr" presetSubtype="0" fill="hold" nodeType="withEffect">
+                                  <p:stCondLst>
+                                    <p:cond delay="0"/>
+                                  </p:stCondLst>
+                                  <p:childTnLst>
+                                    <p:set>
+                                      <p:cBhvr>
+                                        <p:cTn id="8" dur="1" fill="hold">
+                                          <p:stCondLst>
+                                            <p:cond delay="0"/>
+                                          </p:stCondLst>
+                                        </p:cTn>
+                                        <p:tgtEl>
+                                          <p:spTgt spid="2050"/>
+                                        </p:tgtEl>
+                                        <p:attrNameLst>
+                                          <p:attrName>style.visibility</p:attrName>
+                                        </p:attrNameLst>
+                                      </p:cBhvr>
+                                      <p:to>
+                                        <p:strVal val="visible"/>
+                                      </p:to>
+                                    </p:set>
+                                  </p:childTnLst>
+                                </p:cTn>
+                              </p:par>
+                              <p:par>
+                                <p:cTn id="9" presetID="1" presetClass="exit" presetSubtype="0" fill="hold" nodeType="withEffect">
+                                  <p:stCondLst>
+                                    <p:cond delay="0"/>
+                                  </p:stCondLst>
+                                  <p:childTnLst>
+                                    <p:set>
+                                      <p:cBhvr>
+                                        <p:cTn id="10" dur="1" fill="hold">
+                                          <p:stCondLst>
+                                            <p:cond delay="0"/>
+                                          </p:stCondLst>
+                                        </p:cTn>
+                                        <p:tgtEl>
+                                          <p:spTgt spid="2049"/>
+                                        </p:tgtEl>
+                                        <p:attrNameLst>
+                                          <p:attrName>style.visibility</p:attrName>
+                                        </p:attrNameLst>
+                                      </p:cBhvr>
+                                      <p:to>
+                                        <p:strVal val="hidden"/>
+                                      </p:to>
+                                    </p:set>
+                                  </p:childTnLst>
+                                </p:cTn>
+                              </p:par>
+                            </p:childTnLst>
+                          </p:cTn>
+                        </p:par>
+                      </p:childTnLst>
+                    </p:cTn>
+                  </p:par>
+                  <p:par>
+                    <p:cTn id="11" fill="hold">
+                      <p:stCondLst>
+                        <p:cond delay="indefinite"/>
+                      </p:stCondLst>
+                      <p:childTnLst>
+                        <p:par>
+                          <p:cTn id="12" fill="hold">
+                            <p:stCondLst>
+                              <p:cond delay="0"/>
+                            </p:stCondLst>
+                            <p:childTnLst>
+                              <p:par>
+                                <p:cTn id="13" presetID="1" presetClass="entr" presetSubtype="0" fill="hold" nodeType="clickEffect">
+                                  <p:stCondLst>
+                                    <p:cond delay="0"/>
+                                  </p:stCondLst>
+                                  <p:childTnLst>
+                                    <p:set>
+                                      <p:cBhvr>
+                                        <p:cTn id="14" dur="1" fill="hold">
+                                          <p:stCondLst>
+                                            <p:cond delay="0"/>
+                                          </p:stCondLst>
+                                        </p:cTn>
+                                        <p:tgtEl>
+                                          <p:spTgt spid="2051"/>
+                                        </p:tgtEl>
+                                        <p:attrNameLst>
+                                          <p:attrName>style.visibility</p:attrName>
+                                        </p:attrNameLst>
+                                      </p:cBhvr>
+                                      <p:to>
+                                        <p:strVal val="visible"/>
+                                      </p:to>
+                                    </p:set>
+                                  </p:childTnLst>
+                                </p:cTn>
+                              </p:par>
+                              <p:par>
+                                <p:cTn id="15" presetID="1" presetClass="entr" presetSubtype="0" fill="hold" grpId="0" nodeType="withEffect">
+                                  <p:stCondLst>
+                                    <p:cond delay="0"/>
+                                  </p:stCondLst>
+                                  <p:childTnLst>
+                                    <p:set>
+                                      <p:cBhvr>
+                                        <p:cTn id="16" dur="1" fill="hold">
+                                          <p:stCondLst>
+                                            <p:cond delay="0"/>
+                                          </p:stCondLst>
+                                        </p:cTn>
+                                        <p:tgtEl>
+                                          <p:spTgt spid="8"/>
+                                        </p:tgtEl>
+                                        <p:attrNameLst>
+                                          <p:attrName>style.visibility</p:attrName>
+                                        </p:attrNameLst>
+                                      </p:cBhvr>
+                                      <p:to>
+                                        <p:strVal val="visible"/>
+                                      </p:to>
+                                    </p:set>
+                                  </p:childTnLst>
+                                </p:cTn>
+                              </p:par>
+                              <p:par>
+                                <p:cTn id="17" presetID="1" presetClass="exit" presetSubtype="0" fill="hold" nodeType="withEffect">
+                                  <p:stCondLst>
+                                    <p:cond delay="0"/>
+                                  </p:stCondLst>
+                                  <p:childTnLst>
+                                    <p:set>
+                                      <p:cBhvr>
+                                        <p:cTn id="18" dur="1" fill="hold">
+                                          <p:stCondLst>
+                                            <p:cond delay="0"/>
+                                          </p:stCondLst>
+                                        </p:cTn>
+                                        <p:tgtEl>
+                                          <p:spTgt spid="2050"/>
+                                        </p:tgtEl>
+                                        <p:attrNameLst>
+                                          <p:attrName>style.visibility</p:attrName>
+                                        </p:attrNameLst>
+                                      </p:cBhvr>
+                                      <p:to>
+                                        <p:strVal val="hidden"/>
+                                      </p:to>
+                                    </p:set>
+                                  </p:childTnLst>
+                                </p:cTn>
+                              </p:par>
+                            </p:childTnLst>
+                          </p:cTn>
+                        </p:par>
+                      </p:childTnLst>
+                    </p:cTn>
+                  </p:par>
+                </p:childTnLst>
+              </p:cTn>
+              <p:prevCondLst>
+                <p:cond evt="onPrev" delay="0">
+                  <p:tgtEl>
+                    <p:sldTgt/>
+                  </p:tgtEl>
+                </p:cond>
+              </p:prevCondLst>
+              <p:nextCondLst>
+                <p:cond evt="onNext" delay="0">
+                  <p:tgtEl>
+                    <p:sldTgt/>
+                  </p:tgtEl>
+                </p:cond>
+              </p:nextCondLst>
+            </p:seq>
+          </p:childTnLst>
+        </p:cTn>
       </p:par>
     </p:tnLst>
+    <p:bldLst>
+      <p:bldP spid="7" grpId="0"/>
+      <p:bldP spid="8" grpId="0"/>
+    </p:bldLst>
   </p:timing>
 </p:sld>
 </file>
@@ -5248,11 +6148,7 @@
           <a:p>
             <a:r>
               <a:rPr lang="es-ES" dirty="0" err="1" smtClean="0"/>
-              <a:t>Future</a:t>
-            </a:r>
-            <a:r>
-              <a:rPr lang="es-ES" dirty="0" smtClean="0"/>
-              <a:t> Works</a:t>
+              <a:t>BOViL</a:t>
             </a:r>
             <a:endParaRPr lang="es-ES" dirty="0"/>
           </a:p>
@@ -5270,87 +6166,211 @@
         </p:nvSpPr>
         <p:spPr/>
         <p:txBody>
-          <a:bodyPr/>
+          <a:bodyPr>
+            <a:normAutofit fontScale="92500" lnSpcReduction="10000"/>
+          </a:bodyPr>
           <a:lstStyle/>
           <a:p>
-            <a:endParaRPr lang="es-ES"/>
-          </a:p>
-        </p:txBody>
-      </p:sp>
-    </p:spTree>
-  </p:cSld>
-  <p:clrMapOvr>
-    <a:masterClrMapping/>
-  </p:clrMapOvr>
-  <p:timing>
-    <p:tnLst>
-      <p:par>
-        <p:cTn id="1" dur="indefinite" restart="never" nodeType="tmRoot"/>
-      </p:par>
-    </p:tnLst>
-  </p:timing>
-</p:sld>
-</file>
-
-<file path=ppt/slides/slide16.xml><?xml version="1.0" encoding="utf-8"?>
-<p:sld xmlns:a="http://schemas.openxmlformats.org/drawingml/2006/main" xmlns:r="http://schemas.openxmlformats.org/officeDocument/2006/relationships" xmlns:p="http://schemas.openxmlformats.org/presentationml/2006/main">
-  <p:cSld>
-    <p:spTree>
-      <p:nvGrpSpPr>
-        <p:cNvPr id="1" name=""/>
-        <p:cNvGrpSpPr/>
-        <p:nvPr/>
-      </p:nvGrpSpPr>
-      <p:grpSpPr>
-        <a:xfrm>
-          <a:off x="0" y="0"/>
-          <a:ext cx="0" cy="0"/>
-          <a:chOff x="0" y="0"/>
-          <a:chExt cx="0" cy="0"/>
-        </a:xfrm>
-      </p:grpSpPr>
-      <p:sp>
-        <p:nvSpPr>
-          <p:cNvPr id="2" name="1 Título"/>
-          <p:cNvSpPr>
-            <a:spLocks noGrp="1"/>
-          </p:cNvSpPr>
-          <p:nvPr>
-            <p:ph type="title"/>
-          </p:nvPr>
-        </p:nvSpPr>
-        <p:spPr/>
-        <p:txBody>
-          <a:bodyPr/>
-          <a:lstStyle/>
-          <a:p>
+            <a:r>
+              <a:rPr lang="es-ES" dirty="0" smtClean="0"/>
+              <a:t>Librería de visión Artificial:</a:t>
+            </a:r>
+          </a:p>
+          <a:p>
+            <a:pPr lvl="1"/>
             <a:r>
               <a:rPr lang="es-ES" dirty="0" err="1" smtClean="0"/>
-              <a:t>BOViL</a:t>
-            </a:r>
-            <a:endParaRPr lang="es-ES" dirty="0"/>
-          </a:p>
-        </p:txBody>
-      </p:sp>
-      <p:sp>
-        <p:nvSpPr>
-          <p:cNvPr id="3" name="2 Marcador de contenido"/>
-          <p:cNvSpPr>
-            <a:spLocks noGrp="1"/>
-          </p:cNvSpPr>
-          <p:nvPr>
-            <p:ph sz="quarter" idx="1"/>
-          </p:nvPr>
-        </p:nvSpPr>
-        <p:spPr/>
-        <p:txBody>
-          <a:bodyPr/>
-          <a:lstStyle/>
-          <a:p>
-            <a:endParaRPr lang="es-ES"/>
-          </a:p>
-        </p:txBody>
-      </p:sp>
+              <a:t>Core</a:t>
+            </a:r>
+            <a:r>
+              <a:rPr lang="es-ES" dirty="0" smtClean="0"/>
+              <a:t>:</a:t>
+            </a:r>
+          </a:p>
+          <a:p>
+            <a:pPr lvl="2"/>
+            <a:r>
+              <a:rPr lang="es-ES" dirty="0" err="1" smtClean="0"/>
+              <a:t>Communication</a:t>
+            </a:r>
+            <a:r>
+              <a:rPr lang="es-ES" dirty="0" smtClean="0"/>
+              <a:t>: Sockets</a:t>
+            </a:r>
+          </a:p>
+          <a:p>
+            <a:pPr lvl="2"/>
+            <a:r>
+              <a:rPr lang="es-ES" dirty="0" err="1" smtClean="0"/>
+              <a:t>Math</a:t>
+            </a:r>
+            <a:r>
+              <a:rPr lang="es-ES" dirty="0" smtClean="0"/>
+              <a:t>: </a:t>
+            </a:r>
+            <a:r>
+              <a:rPr lang="es-ES" dirty="0" err="1" smtClean="0"/>
+              <a:t>Matrix</a:t>
+            </a:r>
+            <a:r>
+              <a:rPr lang="es-ES" dirty="0" smtClean="0"/>
+              <a:t>, </a:t>
+            </a:r>
+            <a:r>
+              <a:rPr lang="es-ES" dirty="0" err="1" smtClean="0"/>
+              <a:t>geometrics</a:t>
+            </a:r>
+            <a:r>
+              <a:rPr lang="es-ES" dirty="0" smtClean="0"/>
+              <a:t>.</a:t>
+            </a:r>
+          </a:p>
+          <a:p>
+            <a:pPr lvl="2"/>
+            <a:r>
+              <a:rPr lang="es-ES" dirty="0" smtClean="0"/>
+              <a:t>Time</a:t>
+            </a:r>
+          </a:p>
+          <a:p>
+            <a:pPr lvl="2"/>
+            <a:r>
+              <a:rPr lang="es-ES" dirty="0" err="1" smtClean="0"/>
+              <a:t>basicTypes</a:t>
+            </a:r>
+            <a:r>
+              <a:rPr lang="es-ES" dirty="0" smtClean="0"/>
+              <a:t>:</a:t>
+            </a:r>
+            <a:endParaRPr lang="es-ES" dirty="0" smtClean="0"/>
+          </a:p>
+          <a:p>
+            <a:pPr lvl="1"/>
+            <a:r>
+              <a:rPr lang="es-ES" dirty="0" err="1" smtClean="0"/>
+              <a:t>Algorithms</a:t>
+            </a:r>
+            <a:r>
+              <a:rPr lang="es-ES" dirty="0" smtClean="0"/>
+              <a:t>:</a:t>
+            </a:r>
+          </a:p>
+          <a:p>
+            <a:pPr lvl="2"/>
+            <a:r>
+              <a:rPr lang="es-ES" dirty="0" err="1" smtClean="0"/>
+              <a:t>State</a:t>
+            </a:r>
+            <a:r>
+              <a:rPr lang="es-ES" dirty="0" smtClean="0"/>
+              <a:t> </a:t>
+            </a:r>
+            <a:r>
+              <a:rPr lang="es-ES" dirty="0" err="1" smtClean="0"/>
+              <a:t>Estimators</a:t>
+            </a:r>
+            <a:r>
+              <a:rPr lang="es-ES" dirty="0" smtClean="0"/>
+              <a:t>:</a:t>
+            </a:r>
+            <a:endParaRPr lang="es-ES" dirty="0" smtClean="0"/>
+          </a:p>
+          <a:p>
+            <a:pPr lvl="3"/>
+            <a:r>
+              <a:rPr lang="es-ES" dirty="0" err="1" smtClean="0"/>
+              <a:t>GroundTrackingEKF</a:t>
+            </a:r>
+            <a:r>
+              <a:rPr lang="es-ES" dirty="0" smtClean="0"/>
+              <a:t>.</a:t>
+            </a:r>
+            <a:endParaRPr lang="es-ES" dirty="0" smtClean="0"/>
+          </a:p>
+          <a:p>
+            <a:pPr lvl="3"/>
+            <a:r>
+              <a:rPr lang="es-ES" dirty="0" err="1" smtClean="0"/>
+              <a:t>StereoTrackingEKF</a:t>
+            </a:r>
+            <a:r>
+              <a:rPr lang="es-ES" dirty="0" smtClean="0"/>
+              <a:t>.</a:t>
+            </a:r>
+          </a:p>
+          <a:p>
+            <a:pPr lvl="2"/>
+            <a:r>
+              <a:rPr lang="es-ES" dirty="0" err="1" smtClean="0"/>
+              <a:t>Segmentation</a:t>
+            </a:r>
+            <a:r>
+              <a:rPr lang="es-ES" dirty="0" smtClean="0"/>
+              <a:t>:</a:t>
+            </a:r>
+          </a:p>
+          <a:p>
+            <a:pPr lvl="3"/>
+            <a:r>
+              <a:rPr lang="es-ES" dirty="0" smtClean="0"/>
+              <a:t>Color </a:t>
+            </a:r>
+            <a:r>
+              <a:rPr lang="es-ES" dirty="0" err="1" smtClean="0"/>
+              <a:t>Cluster</a:t>
+            </a:r>
+            <a:r>
+              <a:rPr lang="es-ES" dirty="0" smtClean="0"/>
+              <a:t> </a:t>
+            </a:r>
+            <a:r>
+              <a:rPr lang="es-ES" dirty="0" err="1" smtClean="0"/>
+              <a:t>Segmentation</a:t>
+            </a:r>
+            <a:r>
+              <a:rPr lang="es-ES" dirty="0" smtClean="0"/>
+              <a:t>.</a:t>
+            </a:r>
+          </a:p>
+          <a:p>
+            <a:pPr lvl="1"/>
+            <a:endParaRPr lang="es-ES" dirty="0" smtClean="0"/>
+          </a:p>
+        </p:txBody>
+      </p:sp>
+      <p:pic>
+        <p:nvPicPr>
+          <p:cNvPr id="1026" name="Picture 2"/>
+          <p:cNvPicPr>
+            <a:picLocks noChangeAspect="1" noChangeArrowheads="1"/>
+          </p:cNvPicPr>
+          <p:nvPr/>
+        </p:nvPicPr>
+        <p:blipFill>
+          <a:blip r:embed="rId2"/>
+          <a:srcRect/>
+          <a:stretch>
+            <a:fillRect/>
+          </a:stretch>
+        </p:blipFill>
+        <p:spPr bwMode="auto">
+          <a:xfrm>
+            <a:off x="5929322" y="1928802"/>
+            <a:ext cx="1785950" cy="1785950"/>
+          </a:xfrm>
+          <a:prstGeom prst="rect">
+            <a:avLst/>
+          </a:prstGeom>
+          <a:noFill/>
+          <a:ln w="9525">
+            <a:noFill/>
+            <a:miter lim="800000"/>
+            <a:headEnd/>
+            <a:tailEnd/>
+          </a:ln>
+          <a:effectLst/>
+        </p:spPr>
+      </p:pic>
     </p:spTree>
   </p:cSld>
   <p:clrMapOvr>
@@ -9559,80 +10579,6 @@
           <a:p>
             <a:r>
               <a:rPr lang="es-ES" dirty="0" smtClean="0"/>
-              <a:t>Simulaciones</a:t>
-            </a:r>
-            <a:endParaRPr lang="es-ES" dirty="0"/>
-          </a:p>
-        </p:txBody>
-      </p:sp>
-      <p:sp>
-        <p:nvSpPr>
-          <p:cNvPr id="3" name="2 Marcador de contenido"/>
-          <p:cNvSpPr>
-            <a:spLocks noGrp="1"/>
-          </p:cNvSpPr>
-          <p:nvPr>
-            <p:ph sz="quarter" idx="1"/>
-          </p:nvPr>
-        </p:nvSpPr>
-        <p:spPr/>
-        <p:txBody>
-          <a:bodyPr/>
-          <a:lstStyle/>
-          <a:p>
-            <a:endParaRPr lang="es-ES" dirty="0"/>
-          </a:p>
-        </p:txBody>
-      </p:sp>
-    </p:spTree>
-  </p:cSld>
-  <p:clrMapOvr>
-    <a:masterClrMapping/>
-  </p:clrMapOvr>
-  <p:timing>
-    <p:tnLst>
-      <p:par>
-        <p:cTn id="1" dur="indefinite" restart="never" nodeType="tmRoot"/>
-      </p:par>
-    </p:tnLst>
-  </p:timing>
-</p:sld>
-</file>
-
-<file path=ppt/slides/slide8.xml><?xml version="1.0" encoding="utf-8"?>
-<p:sld xmlns:a="http://schemas.openxmlformats.org/drawingml/2006/main" xmlns:r="http://schemas.openxmlformats.org/officeDocument/2006/relationships" xmlns:p="http://schemas.openxmlformats.org/presentationml/2006/main">
-  <p:cSld>
-    <p:spTree>
-      <p:nvGrpSpPr>
-        <p:cNvPr id="1" name=""/>
-        <p:cNvGrpSpPr/>
-        <p:nvPr/>
-      </p:nvGrpSpPr>
-      <p:grpSpPr>
-        <a:xfrm>
-          <a:off x="0" y="0"/>
-          <a:ext cx="0" cy="0"/>
-          <a:chOff x="0" y="0"/>
-          <a:chExt cx="0" cy="0"/>
-        </a:xfrm>
-      </p:grpSpPr>
-      <p:sp>
-        <p:nvSpPr>
-          <p:cNvPr id="2" name="1 Título"/>
-          <p:cNvSpPr>
-            <a:spLocks noGrp="1"/>
-          </p:cNvSpPr>
-          <p:nvPr>
-            <p:ph type="title"/>
-          </p:nvPr>
-        </p:nvSpPr>
-        <p:spPr/>
-        <p:txBody>
-          <a:bodyPr/>
-          <a:lstStyle/>
-          <a:p>
-            <a:r>
-              <a:rPr lang="es-ES" dirty="0" smtClean="0"/>
               <a:t>Estructura de los programas</a:t>
             </a:r>
             <a:endParaRPr lang="es-ES" dirty="0"/>
@@ -10309,6 +11255,33 @@
                                   </p:childTnLst>
                                 </p:cTn>
                               </p:par>
+                              <p:par>
+                                <p:cTn id="17" presetID="1" presetClass="exit" presetSubtype="0" fill="hold" nodeType="withEffect">
+                                  <p:stCondLst>
+                                    <p:cond delay="0"/>
+                                  </p:stCondLst>
+                                  <p:childTnLst>
+                                    <p:set>
+                                      <p:cBhvr>
+                                        <p:cTn id="18" dur="1" fill="hold">
+                                          <p:stCondLst>
+                                            <p:cond delay="0"/>
+                                          </p:stCondLst>
+                                        </p:cTn>
+                                        <p:tgtEl>
+                                          <p:spTgt spid="14"/>
+                                        </p:tgtEl>
+                                        <p:attrNameLst>
+                                          <p:attrName>style.visibility</p:attrName>
+                                        </p:attrNameLst>
+                                      </p:cBhvr>
+                                      <p:to>
+                                        <p:strVal val="hidden"/>
+                                      </p:to>
+                                    </p:set>
+                                  </p:childTnLst>
+                                </p:cTn>
+                              </p:par>
                             </p:childTnLst>
                           </p:cTn>
                         </p:par>
@@ -10316,26 +11289,26 @@
                     </p:cTn>
                   </p:par>
                   <p:par>
-                    <p:cTn id="17" fill="hold">
+                    <p:cTn id="19" fill="hold">
                       <p:stCondLst>
                         <p:cond delay="indefinite"/>
                       </p:stCondLst>
                       <p:childTnLst>
                         <p:par>
-                          <p:cTn id="18" fill="hold">
+                          <p:cTn id="20" fill="hold">
                             <p:stCondLst>
                               <p:cond delay="0"/>
                             </p:stCondLst>
                             <p:childTnLst>
                               <p:par>
-                                <p:cTn id="19" presetID="1" presetClass="entr" presetSubtype="0" fill="hold" grpId="0" nodeType="clickEffect">
+                                <p:cTn id="21" presetID="1" presetClass="entr" presetSubtype="0" fill="hold" grpId="0" nodeType="clickEffect">
                                   <p:stCondLst>
                                     <p:cond delay="0"/>
                                   </p:stCondLst>
                                   <p:childTnLst>
                                     <p:set>
                                       <p:cBhvr>
-                                        <p:cTn id="20" dur="1" fill="hold">
+                                        <p:cTn id="22" dur="1" fill="hold">
                                           <p:stCondLst>
                                             <p:cond delay="0"/>
                                           </p:stCondLst>
@@ -10349,6 +11322,33 @@
                                       </p:cBhvr>
                                       <p:to>
                                         <p:strVal val="visible"/>
+                                      </p:to>
+                                    </p:set>
+                                  </p:childTnLst>
+                                </p:cTn>
+                              </p:par>
+                              <p:par>
+                                <p:cTn id="23" presetID="1" presetClass="exit" presetSubtype="0" fill="hold" nodeType="withEffect">
+                                  <p:stCondLst>
+                                    <p:cond delay="0"/>
+                                  </p:stCondLst>
+                                  <p:childTnLst>
+                                    <p:set>
+                                      <p:cBhvr>
+                                        <p:cTn id="24" dur="1" fill="hold">
+                                          <p:stCondLst>
+                                            <p:cond delay="0"/>
+                                          </p:stCondLst>
+                                        </p:cTn>
+                                        <p:tgtEl>
+                                          <p:spTgt spid="18"/>
+                                        </p:tgtEl>
+                                        <p:attrNameLst>
+                                          <p:attrName>style.visibility</p:attrName>
+                                        </p:attrNameLst>
+                                      </p:cBhvr>
+                                      <p:to>
+                                        <p:strVal val="hidden"/>
                                       </p:to>
                                     </p:set>
                                   </p:childTnLst>
@@ -10388,7 +11388,7 @@
 </p:sld>
 </file>
 
-<file path=ppt/slides/slide9.xml><?xml version="1.0" encoding="utf-8"?>
+<file path=ppt/slides/slide8.xml><?xml version="1.0" encoding="utf-8"?>
 <p:sld xmlns:a="http://schemas.openxmlformats.org/drawingml/2006/main" xmlns:r="http://schemas.openxmlformats.org/officeDocument/2006/relationships" xmlns:p="http://schemas.openxmlformats.org/presentationml/2006/main">
   <p:cSld>
     <p:spTree>
@@ -10428,48 +11428,108 @@
             <a:endParaRPr lang="en-US" sz="2000" dirty="0" smtClean="0"/>
           </a:p>
           <a:p>
-            <a:pPr marL="0" indent="0">
-              <a:buNone/>
-            </a:pPr>
+            <a:pPr marL="0" indent="0"/>
+            <a:r>
+              <a:rPr lang="en-US" sz="2800" dirty="0" err="1" smtClean="0"/>
+              <a:t>Simulador</a:t>
+            </a:r>
             <a:r>
               <a:rPr lang="en-US" sz="2800" dirty="0" smtClean="0"/>
-              <a:t>The </a:t>
+              <a:t> de robots con </a:t>
+            </a:r>
+            <a:r>
+              <a:rPr lang="en-US" sz="2800" dirty="0" err="1" smtClean="0"/>
+              <a:t>entorno</a:t>
             </a:r>
             <a:r>
               <a:rPr lang="en-US" sz="2800" dirty="0" smtClean="0"/>
-              <a:t>robot simulator </a:t>
+              <a:t> de </a:t>
+            </a:r>
+            <a:r>
+              <a:rPr lang="en-US" sz="2800" dirty="0" err="1" smtClean="0"/>
+              <a:t>desarrollo</a:t>
             </a:r>
             <a:r>
               <a:rPr lang="en-US" sz="2800" dirty="0" smtClean="0"/>
-              <a:t>V-REP</a:t>
+              <a:t> </a:t>
+            </a:r>
+            <a:r>
+              <a:rPr lang="en-US" sz="2800" dirty="0" err="1" smtClean="0"/>
+              <a:t>integrado</a:t>
             </a:r>
             <a:r>
               <a:rPr lang="en-US" sz="2800" dirty="0" smtClean="0"/>
-              <a:t>, with </a:t>
+              <a:t>. </a:t>
+            </a:r>
+          </a:p>
+          <a:p>
+            <a:pPr marL="0" indent="0"/>
+            <a:r>
+              <a:rPr lang="en-US" sz="2800" dirty="0" err="1" smtClean="0"/>
+              <a:t>Arquitectura</a:t>
             </a:r>
             <a:r>
               <a:rPr lang="en-US" sz="2800" dirty="0" smtClean="0"/>
-              <a:t>integrated development environment</a:t>
+              <a:t> de control </a:t>
+            </a:r>
+            <a:r>
+              <a:rPr lang="en-US" sz="2800" dirty="0" err="1" smtClean="0"/>
+              <a:t>distribuido</a:t>
             </a:r>
             <a:r>
               <a:rPr lang="en-US" sz="2800" dirty="0" smtClean="0"/>
-              <a:t>, is based </a:t>
+              <a:t> </a:t>
             </a:r>
             <a:r>
               <a:rPr lang="en-US" sz="2800" dirty="0" smtClean="0"/>
-              <a:t>on </a:t>
+              <a:t>(Scripts de </a:t>
+            </a:r>
+            <a:r>
+              <a:rPr lang="en-US" sz="2800" dirty="0" err="1" smtClean="0"/>
+              <a:t>lua</a:t>
             </a:r>
             <a:r>
               <a:rPr lang="en-US" sz="2800" dirty="0" smtClean="0"/>
-              <a:t>a distributed control architecture: each object/model can be individually controlled via an embedded script, a </a:t>
+              <a:t>, </a:t>
             </a:r>
             <a:r>
               <a:rPr lang="en-US" sz="2800" dirty="0" err="1" smtClean="0"/>
-              <a:t>plugin</a:t>
+              <a:t>plugins</a:t>
             </a:r>
             <a:r>
               <a:rPr lang="en-US" sz="2800" dirty="0" smtClean="0"/>
-              <a:t>, a ROS node, a remote API client, or a custom solution. This makes V-REP very versatile and ideal for multi-robot applications. Controllers can be written in C/C++, Python, Java, </a:t>
+              <a:t>, </a:t>
+            </a:r>
+            <a:r>
+              <a:rPr lang="en-US" sz="2800" dirty="0" err="1" smtClean="0"/>
+              <a:t>nodos</a:t>
+            </a:r>
+            <a:r>
+              <a:rPr lang="en-US" sz="2800" dirty="0" smtClean="0"/>
+              <a:t> de ROS…)</a:t>
+            </a:r>
+          </a:p>
+          <a:p>
+            <a:pPr marL="0" indent="0"/>
+            <a:r>
+              <a:rPr lang="en-US" sz="2800" dirty="0" smtClean="0"/>
+              <a:t>Multiples </a:t>
+            </a:r>
+            <a:r>
+              <a:rPr lang="en-US" sz="2800" dirty="0" err="1" smtClean="0"/>
+              <a:t>lenguajes</a:t>
+            </a:r>
+            <a:r>
+              <a:rPr lang="en-US" sz="2800" dirty="0" smtClean="0"/>
+              <a:t> de </a:t>
+            </a:r>
+            <a:r>
+              <a:rPr lang="en-US" sz="2800" dirty="0" err="1" smtClean="0"/>
+              <a:t>programación</a:t>
+            </a:r>
+            <a:r>
+              <a:rPr lang="en-US" sz="2800" dirty="0" smtClean="0"/>
+              <a:t>: C++, Python, Java, </a:t>
             </a:r>
             <a:r>
               <a:rPr lang="en-US" sz="2800" dirty="0" err="1" smtClean="0"/>
@@ -10485,15 +11545,11 @@
             </a:r>
             <a:r>
               <a:rPr lang="en-US" sz="2800" dirty="0" smtClean="0"/>
-              <a:t>, Octave or </a:t>
+              <a:t>, Octave o </a:t>
             </a:r>
             <a:r>
               <a:rPr lang="en-US" sz="2800" dirty="0" err="1" smtClean="0"/>
               <a:t>Urbi</a:t>
-            </a:r>
-            <a:r>
-              <a:rPr lang="en-US" sz="2800" dirty="0" smtClean="0"/>
-              <a:t>.</a:t>
             </a:r>
             <a:endParaRPr lang="es-ES" sz="2800" dirty="0"/>
           </a:p>
@@ -10525,6 +11581,322 @@
           <a:noFill/>
         </p:spPr>
       </p:pic>
+    </p:spTree>
+  </p:cSld>
+  <p:clrMapOvr>
+    <a:masterClrMapping/>
+  </p:clrMapOvr>
+  <p:timing>
+    <p:tnLst>
+      <p:par>
+        <p:cTn id="1" dur="indefinite" restart="never" nodeType="tmRoot"/>
+      </p:par>
+    </p:tnLst>
+  </p:timing>
+</p:sld>
+</file>
+
+<file path=ppt/slides/slide9.xml><?xml version="1.0" encoding="utf-8"?>
+<p:sld xmlns:a="http://schemas.openxmlformats.org/drawingml/2006/main" xmlns:r="http://schemas.openxmlformats.org/officeDocument/2006/relationships" xmlns:p="http://schemas.openxmlformats.org/presentationml/2006/main">
+  <p:cSld>
+    <p:spTree>
+      <p:nvGrpSpPr>
+        <p:cNvPr id="1" name=""/>
+        <p:cNvGrpSpPr/>
+        <p:nvPr/>
+      </p:nvGrpSpPr>
+      <p:grpSpPr>
+        <a:xfrm>
+          <a:off x="0" y="0"/>
+          <a:ext cx="0" cy="0"/>
+          <a:chOff x="0" y="0"/>
+          <a:chExt cx="0" cy="0"/>
+        </a:xfrm>
+      </p:grpSpPr>
+      <p:sp>
+        <p:nvSpPr>
+          <p:cNvPr id="2" name="1 Título"/>
+          <p:cNvSpPr>
+            <a:spLocks noGrp="1"/>
+          </p:cNvSpPr>
+          <p:nvPr>
+            <p:ph type="title"/>
+          </p:nvPr>
+        </p:nvSpPr>
+        <p:spPr/>
+        <p:txBody>
+          <a:bodyPr/>
+          <a:lstStyle/>
+          <a:p>
+            <a:r>
+              <a:rPr lang="es-ES" dirty="0" err="1" smtClean="0"/>
+              <a:t>Vrep</a:t>
+            </a:r>
+            <a:endParaRPr lang="es-ES" dirty="0"/>
+          </a:p>
+        </p:txBody>
+      </p:sp>
+      <p:sp>
+        <p:nvSpPr>
+          <p:cNvPr id="3" name="2 Marcador de contenido"/>
+          <p:cNvSpPr>
+            <a:spLocks noGrp="1"/>
+          </p:cNvSpPr>
+          <p:nvPr>
+            <p:ph sz="quarter" idx="1"/>
+          </p:nvPr>
+        </p:nvSpPr>
+        <p:spPr/>
+        <p:txBody>
+          <a:bodyPr/>
+          <a:lstStyle/>
+          <a:p>
+            <a:r>
+              <a:rPr lang="es-ES" dirty="0" smtClean="0"/>
+              <a:t>Simulaciones</a:t>
+            </a:r>
+            <a:endParaRPr lang="es-ES" dirty="0"/>
+          </a:p>
+        </p:txBody>
+      </p:sp>
+      <p:pic>
+        <p:nvPicPr>
+          <p:cNvPr id="5121" name="Picture 1" descr="C:\Programming\PFC\Images\c3\sim4_set_up.jpg"/>
+          <p:cNvPicPr>
+            <a:picLocks noChangeAspect="1" noChangeArrowheads="1"/>
+          </p:cNvPicPr>
+          <p:nvPr/>
+        </p:nvPicPr>
+        <p:blipFill>
+          <a:blip r:embed="rId2"/>
+          <a:srcRect/>
+          <a:stretch>
+            <a:fillRect/>
+          </a:stretch>
+        </p:blipFill>
+        <p:spPr bwMode="auto">
+          <a:xfrm>
+            <a:off x="4572000" y="3071811"/>
+            <a:ext cx="3857652" cy="2679540"/>
+          </a:xfrm>
+          <a:prstGeom prst="rect">
+            <a:avLst/>
+          </a:prstGeom>
+          <a:noFill/>
+        </p:spPr>
+      </p:pic>
+      <p:pic>
+        <p:nvPicPr>
+          <p:cNvPr id="5122" name="Picture 2" descr="C:\Programming\PFC\Images\c3\sim3_set_up.jpg"/>
+          <p:cNvPicPr>
+            <a:picLocks noChangeAspect="1" noChangeArrowheads="1"/>
+          </p:cNvPicPr>
+          <p:nvPr/>
+        </p:nvPicPr>
+        <p:blipFill>
+          <a:blip r:embed="rId3"/>
+          <a:srcRect/>
+          <a:stretch>
+            <a:fillRect/>
+          </a:stretch>
+        </p:blipFill>
+        <p:spPr bwMode="auto">
+          <a:xfrm>
+            <a:off x="357158" y="3071810"/>
+            <a:ext cx="3917776" cy="2701914"/>
+          </a:xfrm>
+          <a:prstGeom prst="rect">
+            <a:avLst/>
+          </a:prstGeom>
+          <a:noFill/>
+        </p:spPr>
+      </p:pic>
+      <p:sp>
+        <p:nvSpPr>
+          <p:cNvPr id="6" name="2 Marcador de contenido"/>
+          <p:cNvSpPr txBox="1">
+            <a:spLocks/>
+          </p:cNvSpPr>
+          <p:nvPr/>
+        </p:nvSpPr>
+        <p:spPr>
+          <a:xfrm>
+            <a:off x="785786" y="2428868"/>
+            <a:ext cx="2786082" cy="571504"/>
+          </a:xfrm>
+          <a:prstGeom prst="rect">
+            <a:avLst/>
+          </a:prstGeom>
+        </p:spPr>
+        <p:txBody>
+          <a:bodyPr vert="horz">
+            <a:normAutofit/>
+          </a:bodyPr>
+          <a:lstStyle/>
+          <a:p>
+            <a:pPr marL="320040" marR="0" lvl="0" indent="-320040" algn="l" defTabSz="914400" rtl="0" eaLnBrk="1" fontAlgn="auto" latinLnBrk="0" hangingPunct="1">
+              <a:lnSpc>
+                <a:spcPct val="100000"/>
+              </a:lnSpc>
+              <a:spcBef>
+                <a:spcPts val="700"/>
+              </a:spcBef>
+              <a:spcAft>
+                <a:spcPts val="0"/>
+              </a:spcAft>
+              <a:buClr>
+                <a:schemeClr val="accent2"/>
+              </a:buClr>
+              <a:buSzPct val="60000"/>
+              <a:tabLst/>
+              <a:defRPr/>
+            </a:pPr>
+            <a:r>
+              <a:rPr kumimoji="0" lang="es-ES" sz="2900" b="0" i="0" u="none" strike="noStrike" kern="1200" cap="none" spc="0" normalizeH="0" baseline="0" noProof="0" dirty="0" err="1" smtClean="0">
+                <a:ln>
+                  <a:noFill/>
+                </a:ln>
+                <a:solidFill>
+                  <a:schemeClr val="tx1"/>
+                </a:solidFill>
+                <a:effectLst/>
+                <a:uLnTx/>
+                <a:uFillTx/>
+                <a:latin typeface="+mn-lt"/>
+                <a:ea typeface="+mn-ea"/>
+                <a:cs typeface="+mn-cs"/>
+              </a:rPr>
+              <a:t>Stereo</a:t>
+            </a:r>
+            <a:r>
+              <a:rPr lang="es-ES" sz="2900" baseline="0" dirty="0" smtClean="0"/>
+              <a:t>-Tracking</a:t>
+            </a:r>
+            <a:endParaRPr kumimoji="0" lang="es-ES" sz="2900" b="0" i="0" u="none" strike="noStrike" kern="1200" cap="none" spc="0" normalizeH="0" baseline="0" noProof="0" dirty="0">
+              <a:ln>
+                <a:noFill/>
+              </a:ln>
+              <a:solidFill>
+                <a:schemeClr val="tx1"/>
+              </a:solidFill>
+              <a:effectLst/>
+              <a:uLnTx/>
+              <a:uFillTx/>
+              <a:latin typeface="+mn-lt"/>
+              <a:ea typeface="+mn-ea"/>
+              <a:cs typeface="+mn-cs"/>
+            </a:endParaRPr>
+          </a:p>
+        </p:txBody>
+      </p:sp>
+      <p:sp>
+        <p:nvSpPr>
+          <p:cNvPr id="7" name="2 Marcador de contenido"/>
+          <p:cNvSpPr txBox="1">
+            <a:spLocks/>
+          </p:cNvSpPr>
+          <p:nvPr/>
+        </p:nvSpPr>
+        <p:spPr>
+          <a:xfrm>
+            <a:off x="5000628" y="2500306"/>
+            <a:ext cx="2786082" cy="571504"/>
+          </a:xfrm>
+          <a:prstGeom prst="rect">
+            <a:avLst/>
+          </a:prstGeom>
+        </p:spPr>
+        <p:txBody>
+          <a:bodyPr vert="horz">
+            <a:normAutofit/>
+          </a:bodyPr>
+          <a:lstStyle/>
+          <a:p>
+            <a:pPr marL="320040" marR="0" lvl="0" indent="-320040" algn="l" defTabSz="914400" rtl="0" eaLnBrk="1" fontAlgn="auto" latinLnBrk="0" hangingPunct="1">
+              <a:lnSpc>
+                <a:spcPct val="100000"/>
+              </a:lnSpc>
+              <a:spcBef>
+                <a:spcPts val="700"/>
+              </a:spcBef>
+              <a:spcAft>
+                <a:spcPts val="0"/>
+              </a:spcAft>
+              <a:buClr>
+                <a:schemeClr val="accent2"/>
+              </a:buClr>
+              <a:buSzPct val="60000"/>
+              <a:tabLst/>
+              <a:defRPr/>
+            </a:pPr>
+            <a:r>
+              <a:rPr kumimoji="0" lang="es-ES" sz="2900" b="0" i="0" u="none" strike="noStrike" kern="1200" cap="none" spc="0" normalizeH="0" baseline="0" noProof="0" dirty="0" err="1" smtClean="0">
+                <a:ln>
+                  <a:noFill/>
+                </a:ln>
+                <a:solidFill>
+                  <a:schemeClr val="tx1"/>
+                </a:solidFill>
+                <a:effectLst/>
+                <a:uLnTx/>
+                <a:uFillTx/>
+                <a:latin typeface="+mn-lt"/>
+                <a:ea typeface="+mn-ea"/>
+                <a:cs typeface="+mn-cs"/>
+              </a:rPr>
+              <a:t>Multiple</a:t>
+            </a:r>
+            <a:r>
+              <a:rPr kumimoji="0" lang="es-ES" sz="2900" b="0" i="0" u="none" strike="noStrike" kern="1200" cap="none" spc="0" normalizeH="0" noProof="0" dirty="0" smtClean="0">
+                <a:ln>
+                  <a:noFill/>
+                </a:ln>
+                <a:solidFill>
+                  <a:schemeClr val="tx1"/>
+                </a:solidFill>
+                <a:effectLst/>
+                <a:uLnTx/>
+                <a:uFillTx/>
+                <a:latin typeface="+mn-lt"/>
+                <a:ea typeface="+mn-ea"/>
+                <a:cs typeface="+mn-cs"/>
+              </a:rPr>
+              <a:t> </a:t>
+            </a:r>
+            <a:r>
+              <a:rPr kumimoji="0" lang="es-ES" sz="2900" b="0" i="0" u="none" strike="noStrike" kern="1200" cap="none" spc="0" normalizeH="0" baseline="0" noProof="0" dirty="0" err="1" smtClean="0">
+                <a:ln>
+                  <a:noFill/>
+                </a:ln>
+                <a:solidFill>
+                  <a:schemeClr val="tx1"/>
+                </a:solidFill>
+                <a:effectLst/>
+                <a:uLnTx/>
+                <a:uFillTx/>
+                <a:latin typeface="+mn-lt"/>
+                <a:ea typeface="+mn-ea"/>
+                <a:cs typeface="+mn-cs"/>
+              </a:rPr>
+              <a:t>objects</a:t>
+            </a:r>
+            <a:endParaRPr kumimoji="0" lang="es-ES" sz="2900" b="0" i="0" u="none" strike="noStrike" kern="1200" cap="none" spc="0" normalizeH="0" baseline="0" noProof="0" dirty="0">
+              <a:ln>
+                <a:noFill/>
+              </a:ln>
+              <a:solidFill>
+                <a:schemeClr val="tx1"/>
+              </a:solidFill>
+              <a:effectLst/>
+              <a:uLnTx/>
+              <a:uFillTx/>
+              <a:latin typeface="+mn-lt"/>
+              <a:ea typeface="+mn-ea"/>
+              <a:cs typeface="+mn-cs"/>
+            </a:endParaRPr>
+          </a:p>
+        </p:txBody>
+      </p:sp>
     </p:spTree>
   </p:cSld>
   <p:clrMapOvr>

</xml_diff>